<commit_message>
notes for updated L1.1
</commit_message>
<xml_diff>
--- a/Slides/Lesson 1.1 Course Introduction.pptx
+++ b/Slides/Lesson 1.1 Course Introduction.pptx
@@ -5,7 +5,7 @@
     <p:sldMasterId id="2147483648" r:id="rId1"/>
   </p:sldMasterIdLst>
   <p:notesMasterIdLst>
-    <p:notesMasterId r:id="rId27"/>
+    <p:notesMasterId r:id="rId22"/>
   </p:notesMasterIdLst>
   <p:sldIdLst>
     <p:sldId id="256" r:id="rId2"/>
@@ -21,18 +21,13 @@
     <p:sldId id="292" r:id="rId12"/>
     <p:sldId id="308" r:id="rId13"/>
     <p:sldId id="299" r:id="rId14"/>
-    <p:sldId id="309" r:id="rId15"/>
-    <p:sldId id="310" r:id="rId16"/>
-    <p:sldId id="311" r:id="rId17"/>
-    <p:sldId id="312" r:id="rId18"/>
-    <p:sldId id="313" r:id="rId19"/>
-    <p:sldId id="279" r:id="rId20"/>
-    <p:sldId id="280" r:id="rId21"/>
-    <p:sldId id="297" r:id="rId22"/>
-    <p:sldId id="306" r:id="rId23"/>
-    <p:sldId id="314" r:id="rId24"/>
-    <p:sldId id="305" r:id="rId25"/>
-    <p:sldId id="298" r:id="rId26"/>
+    <p:sldId id="279" r:id="rId15"/>
+    <p:sldId id="280" r:id="rId16"/>
+    <p:sldId id="297" r:id="rId17"/>
+    <p:sldId id="306" r:id="rId18"/>
+    <p:sldId id="314" r:id="rId19"/>
+    <p:sldId id="305" r:id="rId20"/>
+    <p:sldId id="298" r:id="rId21"/>
   </p:sldIdLst>
   <p:sldSz cx="12192000" cy="6858000"/>
   <p:notesSz cx="6858000" cy="9144000"/>
@@ -221,7 +216,7 @@
           <a:p>
             <a:fld id="{7C7E5181-6CF5-45F7-A87A-E0E0B1FD7549}" type="datetimeFigureOut">
               <a:rPr lang="en-US" smtClean="0"/>
-              <a:t>12/29/2021</a:t>
+              <a:t>1/5/2022</a:t>
             </a:fld>
             <a:endParaRPr lang="en-US"/>
           </a:p>
@@ -785,7 +780,7 @@
           <a:p>
             <a:fld id="{5D2A64DE-480B-420F-9649-4F8E696E08E0}" type="datetime1">
               <a:rPr lang="en-US" smtClean="0"/>
-              <a:t>12/29/2021</a:t>
+              <a:t>1/5/2022</a:t>
             </a:fld>
             <a:endParaRPr lang="en-US"/>
           </a:p>
@@ -1019,7 +1014,7 @@
           <a:p>
             <a:fld id="{0D3616D0-8311-4107-9726-6B805E7D05BA}" type="datetime1">
               <a:rPr lang="en-US" smtClean="0"/>
-              <a:t>12/29/2021</a:t>
+              <a:t>1/5/2022</a:t>
             </a:fld>
             <a:endParaRPr lang="en-US"/>
           </a:p>
@@ -1227,7 +1222,7 @@
           <a:p>
             <a:fld id="{3BC2557A-5C88-417A-A763-5AC779462A5F}" type="datetime1">
               <a:rPr lang="en-US" smtClean="0"/>
-              <a:t>12/29/2021</a:t>
+              <a:t>1/5/2022</a:t>
             </a:fld>
             <a:endParaRPr lang="en-US"/>
           </a:p>
@@ -1751,7 +1746,7 @@
           <a:p>
             <a:fld id="{07C7BFD4-467E-4EDE-93EA-052F5B39A4E5}" type="datetime1">
               <a:rPr lang="en-US" smtClean="0"/>
-              <a:t>12/29/2021</a:t>
+              <a:t>1/5/2022</a:t>
             </a:fld>
             <a:endParaRPr lang="en-US"/>
           </a:p>
@@ -2064,7 +2059,7 @@
           <a:p>
             <a:fld id="{A533CBE2-D5BE-47AC-ADC2-9CDFC1D0CF90}" type="datetime1">
               <a:rPr lang="en-US" smtClean="0"/>
-              <a:t>12/29/2021</a:t>
+              <a:t>1/5/2022</a:t>
             </a:fld>
             <a:endParaRPr lang="en-US"/>
           </a:p>
@@ -2365,7 +2360,7 @@
           <a:p>
             <a:fld id="{39B7EDB1-CE74-4951-85A2-0B01C2128E28}" type="datetime1">
               <a:rPr lang="en-US" smtClean="0"/>
-              <a:t>12/29/2021</a:t>
+              <a:t>1/5/2022</a:t>
             </a:fld>
             <a:endParaRPr lang="en-US"/>
           </a:p>
@@ -2813,7 +2808,7 @@
           <a:p>
             <a:fld id="{2BC7EB92-A5C2-4807-A9DC-9EDE6CBFB241}" type="datetime1">
               <a:rPr lang="en-US" smtClean="0"/>
-              <a:t>12/29/2021</a:t>
+              <a:t>1/5/2022</a:t>
             </a:fld>
             <a:endParaRPr lang="en-US"/>
           </a:p>
@@ -2959,7 +2954,7 @@
           <a:p>
             <a:fld id="{109E55A0-C911-4F03-82FC-7E5926047D46}" type="datetime1">
               <a:rPr lang="en-US" smtClean="0"/>
-              <a:t>12/29/2021</a:t>
+              <a:t>1/5/2022</a:t>
             </a:fld>
             <a:endParaRPr lang="en-US"/>
           </a:p>
@@ -3108,7 +3103,7 @@
           <a:p>
             <a:fld id="{2B7B7EE0-7771-4CD5-9B2B-3550753A54A1}" type="datetime1">
               <a:rPr lang="en-US" smtClean="0"/>
-              <a:t>12/29/2021</a:t>
+              <a:t>1/5/2022</a:t>
             </a:fld>
             <a:endParaRPr lang="en-US"/>
           </a:p>
@@ -3419,7 +3414,7 @@
           <a:p>
             <a:fld id="{F8B318B3-0E87-4416-A9B8-D891968C2727}" type="datetime1">
               <a:rPr lang="en-US" smtClean="0"/>
-              <a:t>12/29/2021</a:t>
+              <a:t>1/5/2022</a:t>
             </a:fld>
             <a:endParaRPr lang="en-US"/>
           </a:p>
@@ -3707,7 +3702,7 @@
           <a:p>
             <a:fld id="{EA476A42-A091-4468-A075-64A31BE59948}" type="datetime1">
               <a:rPr lang="en-US" smtClean="0"/>
-              <a:t>12/29/2021</a:t>
+              <a:t>1/5/2022</a:t>
             </a:fld>
             <a:endParaRPr lang="en-US"/>
           </a:p>
@@ -3948,7 +3943,7 @@
           <a:p>
             <a:fld id="{54D997E8-DDEE-43F1-8D9B-F8A1E11DE488}" type="datetime1">
               <a:rPr lang="en-US" smtClean="0"/>
-              <a:t>12/29/2021</a:t>
+              <a:t>1/5/2022</a:t>
             </a:fld>
             <a:endParaRPr lang="en-US"/>
           </a:p>
@@ -4370,6 +4365,59 @@
       </p:grpSpPr>
       <p:sp>
         <p:nvSpPr>
+          <p:cNvPr id="5" name="Rectangle 4">
+            <a:extLst>
+              <a:ext uri="{FF2B5EF4-FFF2-40B4-BE49-F238E27FC236}">
+                <a16:creationId xmlns:a16="http://schemas.microsoft.com/office/drawing/2014/main" id="{17144CC5-E8A6-432B-890F-819AE2E71C63}"/>
+              </a:ext>
+            </a:extLst>
+          </p:cNvPr>
+          <p:cNvSpPr/>
+          <p:nvPr/>
+        </p:nvSpPr>
+        <p:spPr>
+          <a:xfrm>
+            <a:off x="539260" y="2593592"/>
+            <a:ext cx="8394347" cy="638991"/>
+          </a:xfrm>
+          <a:prstGeom prst="rect">
+            <a:avLst/>
+          </a:prstGeom>
+          <a:solidFill>
+            <a:srgbClr val="FFFF00"/>
+          </a:solidFill>
+        </p:spPr>
+        <p:style>
+          <a:lnRef idx="2">
+            <a:schemeClr val="accent1">
+              <a:shade val="50000"/>
+            </a:schemeClr>
+          </a:lnRef>
+          <a:fillRef idx="1">
+            <a:schemeClr val="accent1"/>
+          </a:fillRef>
+          <a:effectRef idx="0">
+            <a:schemeClr val="accent1"/>
+          </a:effectRef>
+          <a:fontRef idx="minor">
+            <a:schemeClr val="lt1"/>
+          </a:fontRef>
+        </p:style>
+        <p:txBody>
+          <a:bodyPr rtlCol="0" anchor="ctr"/>
+          <a:lstStyle/>
+          <a:p>
+            <a:pPr algn="ctr"/>
+            <a:endParaRPr lang="en-US" sz="2400" dirty="0">
+              <a:solidFill>
+                <a:sysClr val="windowText" lastClr="000000"/>
+              </a:solidFill>
+            </a:endParaRPr>
+          </a:p>
+        </p:txBody>
+      </p:sp>
+      <p:sp>
+        <p:nvSpPr>
           <p:cNvPr id="2" name="Title 1">
             <a:extLst>
               <a:ext uri="{FF2B5EF4-FFF2-40B4-BE49-F238E27FC236}">
@@ -4520,7 +4568,7 @@
         <p:spPr>
           <a:xfrm>
             <a:off x="539260" y="5710019"/>
-            <a:ext cx="6096000" cy="646331"/>
+            <a:ext cx="6096000" cy="369332"/>
           </a:xfrm>
           <a:prstGeom prst="rect">
             <a:avLst/>
@@ -4538,23 +4586,7 @@
                   <a:srgbClr val="5C5962"/>
                 </a:solidFill>
               </a:rPr>
-              <a:t>© 2021 Jonathan Bell, John </a:t>
-            </a:r>
-            <a:r>
-              <a:rPr lang="en-US" dirty="0" err="1">
-                <a:solidFill>
-                  <a:srgbClr val="5C5962"/>
-                </a:solidFill>
-              </a:rPr>
-              <a:t>Boyland</a:t>
-            </a:r>
-            <a:r>
-              <a:rPr lang="en-US" dirty="0">
-                <a:solidFill>
-                  <a:srgbClr val="5C5962"/>
-                </a:solidFill>
-              </a:rPr>
-              <a:t>, Mitch Wand, Frank Tip. Released under the </a:t>
+              <a:t>© 2022 Released under the </a:t>
             </a:r>
             <a:r>
               <a:rPr lang="en-US" dirty="0">
@@ -4628,8 +4660,22 @@
                   <a:sysClr val="windowText" lastClr="000000"/>
                 </a:solidFill>
               </a:rPr>
-              <a:t>What shall we put for the copyright line?</a:t>
-            </a:r>
+              <a:t>Update all copyright lines </a:t>
+            </a:r>
+            <a:r>
+              <a:rPr lang="en-US" sz="2400" dirty="0">
+                <a:solidFill>
+                  <a:sysClr val="windowText" lastClr="000000"/>
+                </a:solidFill>
+                <a:sym typeface="Wingdings" panose="05000000000000000000" pitchFamily="2" charset="2"/>
+              </a:rPr>
+              <a:t></a:t>
+            </a:r>
+            <a:endParaRPr lang="en-US" sz="2400" dirty="0">
+              <a:solidFill>
+                <a:sysClr val="windowText" lastClr="000000"/>
+              </a:solidFill>
+            </a:endParaRPr>
           </a:p>
         </p:txBody>
       </p:sp>
@@ -4863,16 +4909,8 @@
           </a:p>
           <a:p>
             <a:r>
-              <a:rPr lang="en-US" dirty="0">
-                <a:highlight>
-                  <a:srgbClr val="FFFF00"/>
-                </a:highlight>
-              </a:rPr>
-              <a:t>Weekly slides will be posted in advance, </a:t>
-            </a:r>
-            <a:r>
-              <a:rPr lang="en-US" dirty="0"/>
-              <a:t>so be prepared to ask and answer questions about the material.</a:t>
+              <a:rPr lang="en-US" dirty="0"/>
+              <a:t>Weekly slides will be posted in advance, so be prepared to ask and answer questions about the material.</a:t>
             </a:r>
           </a:p>
         </p:txBody>
@@ -4909,62 +4947,6 @@
               <a:t>11</a:t>
             </a:fld>
             <a:endParaRPr lang="en-US"/>
-          </a:p>
-        </p:txBody>
-      </p:sp>
-      <p:sp>
-        <p:nvSpPr>
-          <p:cNvPr id="5" name="Rectangle 4">
-            <a:extLst>
-              <a:ext uri="{FF2B5EF4-FFF2-40B4-BE49-F238E27FC236}">
-                <a16:creationId xmlns:a16="http://schemas.microsoft.com/office/drawing/2014/main" id="{0B96B0F1-3B78-4B98-849B-A047E65B0CDB}"/>
-              </a:ext>
-            </a:extLst>
-          </p:cNvPr>
-          <p:cNvSpPr/>
-          <p:nvPr/>
-        </p:nvSpPr>
-        <p:spPr>
-          <a:xfrm>
-            <a:off x="8725546" y="4292563"/>
-            <a:ext cx="3086019" cy="1325563"/>
-          </a:xfrm>
-          <a:prstGeom prst="rect">
-            <a:avLst/>
-          </a:prstGeom>
-          <a:solidFill>
-            <a:srgbClr val="FFFF00"/>
-          </a:solidFill>
-        </p:spPr>
-        <p:style>
-          <a:lnRef idx="2">
-            <a:schemeClr val="accent1">
-              <a:shade val="50000"/>
-            </a:schemeClr>
-          </a:lnRef>
-          <a:fillRef idx="1">
-            <a:schemeClr val="accent1"/>
-          </a:fillRef>
-          <a:effectRef idx="0">
-            <a:schemeClr val="accent1"/>
-          </a:effectRef>
-          <a:fontRef idx="minor">
-            <a:schemeClr val="lt1"/>
-          </a:fontRef>
-        </p:style>
-        <p:txBody>
-          <a:bodyPr rtlCol="0" anchor="ctr"/>
-          <a:lstStyle/>
-          <a:p>
-            <a:pPr algn="ctr"/>
-            <a:r>
-              <a:rPr lang="en-US" sz="2400" dirty="0">
-                <a:solidFill>
-                  <a:sysClr val="windowText" lastClr="000000"/>
-                </a:solidFill>
-              </a:rPr>
-              <a:t>Let's discuss.  Having lessons online in advance is important for me.</a:t>
-            </a:r>
           </a:p>
         </p:txBody>
       </p:sp>
@@ -5016,7 +4998,7 @@
           <a:p>
             <a:r>
               <a:rPr lang="en-US" dirty="0"/>
-              <a:t>Laboratories (Tutorials)</a:t>
+              <a:t>In-Class Exercises and Tutorials</a:t>
             </a:r>
           </a:p>
         </p:txBody>
@@ -5044,13 +5026,13 @@
           <a:p>
             <a:r>
               <a:rPr lang="en-US" dirty="0"/>
-              <a:t>There will be regular laboratory exercises to give you practice with the technologies we will use.</a:t>
-            </a:r>
-          </a:p>
-          <a:p>
-            <a:r>
-              <a:rPr lang="en-US" dirty="0"/>
-              <a:t>Not graded, but highly recommended</a:t>
+              <a:t>There will often be in-class exercises to give you practice with the technologies we will use.</a:t>
+            </a:r>
+          </a:p>
+          <a:p>
+            <a:r>
+              <a:rPr lang="en-US" dirty="0"/>
+              <a:t>In addition, there will be tutorials posted on the web.</a:t>
             </a:r>
           </a:p>
           <a:p>
@@ -5058,6 +5040,9 @@
               <a:rPr lang="en-US" dirty="0"/>
               <a:t>Typically, will consist of structured steps that will guide you through a typical task</a:t>
             </a:r>
+          </a:p>
+          <a:p>
+            <a:endParaRPr lang="en-US" dirty="0"/>
           </a:p>
           <a:p>
             <a:endParaRPr lang="en-US" dirty="0"/>
@@ -5090,62 +5075,6 @@
               <a:t>12</a:t>
             </a:fld>
             <a:endParaRPr lang="en-US"/>
-          </a:p>
-        </p:txBody>
-      </p:sp>
-      <p:sp>
-        <p:nvSpPr>
-          <p:cNvPr id="5" name="Rectangle 4">
-            <a:extLst>
-              <a:ext uri="{FF2B5EF4-FFF2-40B4-BE49-F238E27FC236}">
-                <a16:creationId xmlns:a16="http://schemas.microsoft.com/office/drawing/2014/main" id="{10B80419-5BD5-4434-91A5-2712ED09B2FB}"/>
-              </a:ext>
-            </a:extLst>
-          </p:cNvPr>
-          <p:cNvSpPr/>
-          <p:nvPr/>
-        </p:nvSpPr>
-        <p:spPr>
-          <a:xfrm>
-            <a:off x="8610600" y="2103437"/>
-            <a:ext cx="3086019" cy="1325563"/>
-          </a:xfrm>
-          <a:prstGeom prst="rect">
-            <a:avLst/>
-          </a:prstGeom>
-          <a:solidFill>
-            <a:srgbClr val="FFFF00"/>
-          </a:solidFill>
-        </p:spPr>
-        <p:style>
-          <a:lnRef idx="2">
-            <a:schemeClr val="accent1">
-              <a:shade val="50000"/>
-            </a:schemeClr>
-          </a:lnRef>
-          <a:fillRef idx="1">
-            <a:schemeClr val="accent1"/>
-          </a:fillRef>
-          <a:effectRef idx="0">
-            <a:schemeClr val="accent1"/>
-          </a:effectRef>
-          <a:fontRef idx="minor">
-            <a:schemeClr val="lt1"/>
-          </a:fontRef>
-        </p:style>
-        <p:txBody>
-          <a:bodyPr rtlCol="0" anchor="ctr"/>
-          <a:lstStyle/>
-          <a:p>
-            <a:pPr algn="ctr"/>
-            <a:r>
-              <a:rPr lang="en-US" sz="2400" dirty="0">
-                <a:solidFill>
-                  <a:sysClr val="windowText" lastClr="000000"/>
-                </a:solidFill>
-              </a:rPr>
-              <a:t>Update?</a:t>
-            </a:r>
           </a:p>
         </p:txBody>
       </p:sp>
@@ -5226,31 +5155,19 @@
         <p:spPr/>
         <p:txBody>
           <a:bodyPr>
-            <a:normAutofit fontScale="92500" lnSpcReduction="10000"/>
+            <a:normAutofit/>
           </a:bodyPr>
           <a:lstStyle/>
           <a:p>
             <a:r>
               <a:rPr lang="en-US" dirty="0"/>
-              <a:t>There will be </a:t>
-            </a:r>
-            <a:r>
-              <a:rPr lang="en-US" dirty="0">
-                <a:highlight>
-                  <a:srgbClr val="FFFF00"/>
-                </a:highlight>
-              </a:rPr>
-              <a:t>three</a:t>
-            </a:r>
-            <a:r>
-              <a:rPr lang="en-US" dirty="0"/>
-              <a:t> homework assignments due during the first half of the term, plus a final project that will be due at the end of the term.</a:t>
-            </a:r>
-          </a:p>
-          <a:p>
-            <a:r>
-              <a:rPr lang="en-US" dirty="0"/>
-              <a:t>You will complete the assignments individually, and the project in a group of 3 or 4.</a:t>
+              <a:t>There will be four homework assignments due during the first half of the term, plus a final project that will be due at the end of the term.</a:t>
+            </a:r>
+          </a:p>
+          <a:p>
+            <a:r>
+              <a:rPr lang="en-US" dirty="0"/>
+              <a:t>You will complete the assignments individually, and the project in a group of 4 or 5.</a:t>
             </a:r>
           </a:p>
           <a:p>
@@ -5285,24 +5202,6 @@
             <a:r>
               <a:rPr lang="en-US" dirty="0"/>
               <a:t>20% Final Exam</a:t>
-            </a:r>
-          </a:p>
-          <a:p>
-            <a:r>
-              <a:rPr lang="en-US" dirty="0"/>
-              <a:t>There </a:t>
-            </a:r>
-            <a:r>
-              <a:rPr lang="en-US" dirty="0">
-                <a:highlight>
-                  <a:srgbClr val="FFFF00"/>
-                </a:highlight>
-              </a:rPr>
-              <a:t>will/will not </a:t>
-            </a:r>
-            <a:r>
-              <a:rPr lang="en-US" dirty="0"/>
-              <a:t>be a final exam</a:t>
             </a:r>
           </a:p>
         </p:txBody>
@@ -5339,118 +5238,6 @@
               <a:t>13</a:t>
             </a:fld>
             <a:endParaRPr lang="en-US"/>
-          </a:p>
-        </p:txBody>
-      </p:sp>
-      <p:sp>
-        <p:nvSpPr>
-          <p:cNvPr id="5" name="Rectangle 4">
-            <a:extLst>
-              <a:ext uri="{FF2B5EF4-FFF2-40B4-BE49-F238E27FC236}">
-                <a16:creationId xmlns:a16="http://schemas.microsoft.com/office/drawing/2014/main" id="{504FF00B-0249-4228-A3A2-C6300741096B}"/>
-              </a:ext>
-            </a:extLst>
-          </p:cNvPr>
-          <p:cNvSpPr/>
-          <p:nvPr/>
-        </p:nvSpPr>
-        <p:spPr>
-          <a:xfrm>
-            <a:off x="8834510" y="1718175"/>
-            <a:ext cx="3086019" cy="1325563"/>
-          </a:xfrm>
-          <a:prstGeom prst="rect">
-            <a:avLst/>
-          </a:prstGeom>
-          <a:solidFill>
-            <a:srgbClr val="FFFF00"/>
-          </a:solidFill>
-        </p:spPr>
-        <p:style>
-          <a:lnRef idx="2">
-            <a:schemeClr val="accent1">
-              <a:shade val="50000"/>
-            </a:schemeClr>
-          </a:lnRef>
-          <a:fillRef idx="1">
-            <a:schemeClr val="accent1"/>
-          </a:fillRef>
-          <a:effectRef idx="0">
-            <a:schemeClr val="accent1"/>
-          </a:effectRef>
-          <a:fontRef idx="minor">
-            <a:schemeClr val="lt1"/>
-          </a:fontRef>
-        </p:style>
-        <p:txBody>
-          <a:bodyPr rtlCol="0" anchor="ctr"/>
-          <a:lstStyle/>
-          <a:p>
-            <a:pPr algn="ctr"/>
-            <a:r>
-              <a:rPr lang="en-US" sz="2400" dirty="0">
-                <a:solidFill>
-                  <a:sysClr val="windowText" lastClr="000000"/>
-                </a:solidFill>
-              </a:rPr>
-              <a:t>Need to decide on # of assignments</a:t>
-            </a:r>
-          </a:p>
-        </p:txBody>
-      </p:sp>
-      <p:sp>
-        <p:nvSpPr>
-          <p:cNvPr id="9" name="Rectangle 8">
-            <a:extLst>
-              <a:ext uri="{FF2B5EF4-FFF2-40B4-BE49-F238E27FC236}">
-                <a16:creationId xmlns:a16="http://schemas.microsoft.com/office/drawing/2014/main" id="{E665BE3B-C0AD-4BDF-8BE7-4FD3E92244C5}"/>
-              </a:ext>
-            </a:extLst>
-          </p:cNvPr>
-          <p:cNvSpPr/>
-          <p:nvPr/>
-        </p:nvSpPr>
-        <p:spPr>
-          <a:xfrm>
-            <a:off x="7067590" y="4388692"/>
-            <a:ext cx="3086019" cy="1325563"/>
-          </a:xfrm>
-          <a:prstGeom prst="rect">
-            <a:avLst/>
-          </a:prstGeom>
-          <a:solidFill>
-            <a:srgbClr val="FFFF00"/>
-          </a:solidFill>
-        </p:spPr>
-        <p:style>
-          <a:lnRef idx="2">
-            <a:schemeClr val="accent1">
-              <a:shade val="50000"/>
-            </a:schemeClr>
-          </a:lnRef>
-          <a:fillRef idx="1">
-            <a:schemeClr val="accent1"/>
-          </a:fillRef>
-          <a:effectRef idx="0">
-            <a:schemeClr val="accent1"/>
-          </a:effectRef>
-          <a:fontRef idx="minor">
-            <a:schemeClr val="lt1"/>
-          </a:fontRef>
-        </p:style>
-        <p:txBody>
-          <a:bodyPr rtlCol="0" anchor="ctr"/>
-          <a:lstStyle/>
-          <a:p>
-            <a:pPr algn="ctr"/>
-            <a:r>
-              <a:rPr lang="en-US" sz="2400" dirty="0">
-                <a:solidFill>
-                  <a:sysClr val="windowText" lastClr="000000"/>
-                </a:solidFill>
-              </a:rPr>
-              <a:t>Need to decide about final</a:t>
-            </a:r>
           </a:p>
         </p:txBody>
       </p:sp>
@@ -5486,14 +5273,8 @@
       </p:grpSpPr>
       <p:sp>
         <p:nvSpPr>
-          <p:cNvPr id="2" name="Title 1">
-            <a:extLst>
-              <a:ext uri="{FF2B5EF4-FFF2-40B4-BE49-F238E27FC236}">
-                <a16:creationId xmlns:a16="http://schemas.microsoft.com/office/drawing/2014/main" id="{A1BA0624-E7B4-45F7-A5DE-3FD3F9B35D8B}"/>
-              </a:ext>
-            </a:extLst>
-          </p:cNvPr>
-          <p:cNvSpPr>
+          <p:cNvPr id="253" name="Grade Appeal Policy"/>
+          <p:cNvSpPr txBox="1">
             <a:spLocks noGrp="1"/>
           </p:cNvSpPr>
           <p:nvPr>
@@ -5503,25 +5284,31 @@
         <p:spPr/>
         <p:txBody>
           <a:bodyPr/>
-          <a:lstStyle/>
-          <a:p>
-            <a:r>
-              <a:rPr lang="en-US" dirty="0"/>
-              <a:t>Grading (1)</a:t>
-            </a:r>
-          </a:p>
-        </p:txBody>
-      </p:sp>
-      <p:sp>
-        <p:nvSpPr>
-          <p:cNvPr id="3" name="Content Placeholder 2">
-            <a:extLst>
-              <a:ext uri="{FF2B5EF4-FFF2-40B4-BE49-F238E27FC236}">
-                <a16:creationId xmlns:a16="http://schemas.microsoft.com/office/drawing/2014/main" id="{3754B52A-36FE-4269-8A34-5FF576C4DD06}"/>
-              </a:ext>
-            </a:extLst>
-          </p:cNvPr>
-          <p:cNvSpPr>
+          <a:lstStyle>
+            <a:lvl1pPr>
+              <a:defRPr>
+                <a:solidFill>
+                  <a:srgbClr val="005493"/>
+                </a:solidFill>
+              </a:defRPr>
+            </a:lvl1pPr>
+          </a:lstStyle>
+          <a:p>
+            <a:r>
+              <a:rPr lang="en-US" dirty="0">
+                <a:solidFill>
+                  <a:srgbClr val="0070C0"/>
+                </a:solidFill>
+              </a:rPr>
+              <a:t>Grade Appeal Policy</a:t>
+            </a:r>
+          </a:p>
+        </p:txBody>
+      </p:sp>
+      <p:sp>
+        <p:nvSpPr>
+          <p:cNvPr id="254" name="scores for homeworks/projects/midterms will be final two weeks after it has been returned to you"/>
+          <p:cNvSpPr txBox="1">
             <a:spLocks noGrp="1"/>
           </p:cNvSpPr>
           <p:nvPr>
@@ -5533,58 +5320,79 @@
           <a:bodyPr>
             <a:normAutofit/>
           </a:bodyPr>
-          <a:lstStyle/>
-          <a:p>
-            <a:r>
-              <a:rPr lang="en-US" dirty="0"/>
-              <a:t>We will be using a new grading system this semester, called "specification grading".</a:t>
-            </a:r>
-          </a:p>
-          <a:p>
-            <a:r>
-              <a:rPr lang="en-US" dirty="0"/>
-              <a:t>In this system, we will give a rating on each element of each assignment.</a:t>
-            </a:r>
-          </a:p>
-          <a:p>
-            <a:r>
-              <a:rPr lang="en-US" dirty="0"/>
-              <a:t>there will be exactly three possible ratings for each element:</a:t>
+          <a:lstStyle>
+            <a:lvl1pPr>
+              <a:defRPr>
+                <a:solidFill>
+                  <a:srgbClr val="000000"/>
+                </a:solidFill>
+              </a:defRPr>
+            </a:lvl1pPr>
+          </a:lstStyle>
+          <a:p>
+            <a:r>
+              <a:rPr lang="en-US" dirty="0"/>
+              <a:t>If you have concerns regarding the grading of your work, please let us know right away by opening a regrade request in </a:t>
+            </a:r>
+            <a:r>
+              <a:rPr lang="en-US" dirty="0" err="1"/>
+              <a:t>GradeScope</a:t>
+            </a:r>
+            <a:r>
+              <a:rPr lang="en-US" dirty="0"/>
+              <a:t>. </a:t>
             </a:r>
           </a:p>
           <a:p>
             <a:pPr lvl="1"/>
             <a:r>
               <a:rPr lang="en-US" dirty="0"/>
-              <a:t>below minimum expectations</a:t>
+              <a:t>Do </a:t>
+            </a:r>
+            <a:r>
+              <a:rPr lang="en-US" dirty="0">
+                <a:solidFill>
+                  <a:srgbClr val="FF0000"/>
+                </a:solidFill>
+              </a:rPr>
+              <a:t>not</a:t>
+            </a:r>
+            <a:r>
+              <a:rPr lang="en-US" dirty="0"/>
+              <a:t> post on Piazza or email your TA or instructor </a:t>
+            </a:r>
+          </a:p>
+          <a:p>
+            <a:pPr lvl="2"/>
+            <a:r>
+              <a:rPr lang="en-US" dirty="0" err="1"/>
+              <a:t>GradeScope</a:t>
+            </a:r>
+            <a:r>
+              <a:rPr lang="en-US" dirty="0"/>
+              <a:t> provides an interface that allows us to review all regrade requests in one place. </a:t>
             </a:r>
           </a:p>
           <a:p>
             <a:pPr lvl="1"/>
             <a:r>
               <a:rPr lang="en-US" dirty="0"/>
-              <a:t>meets minimum expectations</a:t>
+              <a:t>All regrade requests must be submitted within 7 days from your receipt of the graded work.</a:t>
             </a:r>
           </a:p>
           <a:p>
             <a:pPr lvl="1"/>
             <a:r>
               <a:rPr lang="en-US" dirty="0"/>
-              <a:t>satisfactory</a:t>
-            </a:r>
-          </a:p>
-        </p:txBody>
-      </p:sp>
-      <p:sp>
-        <p:nvSpPr>
-          <p:cNvPr id="4" name="Slide Number Placeholder 3">
-            <a:extLst>
-              <a:ext uri="{FF2B5EF4-FFF2-40B4-BE49-F238E27FC236}">
-                <a16:creationId xmlns:a16="http://schemas.microsoft.com/office/drawing/2014/main" id="{353F249B-D41E-45C0-AD58-C9BB29EA9353}"/>
-              </a:ext>
-            </a:extLst>
-          </p:cNvPr>
-          <p:cNvSpPr>
+              <a:t>If your regrade request is closed and you feel that the response was not satisfactory, you may appeal to the instructor via email within 48 hours </a:t>
+            </a:r>
+          </a:p>
+        </p:txBody>
+      </p:sp>
+      <p:sp>
+        <p:nvSpPr>
+          <p:cNvPr id="255" name="Slide Number"/>
+          <p:cNvSpPr txBox="1">
             <a:spLocks noGrp="1"/>
           </p:cNvSpPr>
           <p:nvPr>
@@ -5596,76 +5404,16 @@
           <a:bodyPr/>
           <a:lstStyle/>
           <a:p>
-            <a:fld id="{20F37917-FD3A-4669-9018-DA04BCDD3D75}" type="slidenum">
-              <a:rPr lang="en-US" smtClean="0"/>
+            <a:fld id="{86CB4B4D-7CA3-9044-876B-883B54F8677D}" type="slidenum">
+              <a:rPr lang="en-US"/>
+              <a:pPr/>
               <a:t>14</a:t>
             </a:fld>
             <a:endParaRPr lang="en-US"/>
           </a:p>
         </p:txBody>
       </p:sp>
-      <p:sp>
-        <p:nvSpPr>
-          <p:cNvPr id="8" name="Rectangle 7">
-            <a:extLst>
-              <a:ext uri="{FF2B5EF4-FFF2-40B4-BE49-F238E27FC236}">
-                <a16:creationId xmlns:a16="http://schemas.microsoft.com/office/drawing/2014/main" id="{C56843B3-DBE4-490F-BCC9-ABA027F96B6C}"/>
-              </a:ext>
-            </a:extLst>
-          </p:cNvPr>
-          <p:cNvSpPr/>
-          <p:nvPr/>
-        </p:nvSpPr>
-        <p:spPr>
-          <a:xfrm>
-            <a:off x="8834510" y="1718175"/>
-            <a:ext cx="3086019" cy="1325563"/>
-          </a:xfrm>
-          <a:prstGeom prst="rect">
-            <a:avLst/>
-          </a:prstGeom>
-          <a:solidFill>
-            <a:srgbClr val="FFFF00"/>
-          </a:solidFill>
-        </p:spPr>
-        <p:style>
-          <a:lnRef idx="2">
-            <a:schemeClr val="accent1">
-              <a:shade val="50000"/>
-            </a:schemeClr>
-          </a:lnRef>
-          <a:fillRef idx="1">
-            <a:schemeClr val="accent1"/>
-          </a:fillRef>
-          <a:effectRef idx="0">
-            <a:schemeClr val="accent1"/>
-          </a:effectRef>
-          <a:fontRef idx="minor">
-            <a:schemeClr val="lt1"/>
-          </a:fontRef>
-        </p:style>
-        <p:txBody>
-          <a:bodyPr rtlCol="0" anchor="ctr"/>
-          <a:lstStyle/>
-          <a:p>
-            <a:pPr algn="ctr"/>
-            <a:r>
-              <a:rPr lang="en-US" sz="2400" dirty="0">
-                <a:solidFill>
-                  <a:sysClr val="windowText" lastClr="000000"/>
-                </a:solidFill>
-              </a:rPr>
-              <a:t>Maybe just don't say anything about grading here.</a:t>
-            </a:r>
-          </a:p>
-        </p:txBody>
-      </p:sp>
     </p:spTree>
-    <p:extLst>
-      <p:ext uri="{BB962C8B-B14F-4D97-AF65-F5344CB8AC3E}">
-        <p14:creationId xmlns:p14="http://schemas.microsoft.com/office/powerpoint/2010/main" val="799373572"/>
-      </p:ext>
-    </p:extLst>
   </p:cSld>
   <p:clrMapOvr>
     <a:masterClrMapping/>
@@ -5692,14 +5440,8 @@
       </p:grpSpPr>
       <p:sp>
         <p:nvSpPr>
-          <p:cNvPr id="2" name="Title 1">
-            <a:extLst>
-              <a:ext uri="{FF2B5EF4-FFF2-40B4-BE49-F238E27FC236}">
-                <a16:creationId xmlns:a16="http://schemas.microsoft.com/office/drawing/2014/main" id="{0728D6CF-A06D-48FF-90F5-E1F280E783BD}"/>
-              </a:ext>
-            </a:extLst>
-          </p:cNvPr>
-          <p:cNvSpPr>
+          <p:cNvPr id="257" name="Late Policy"/>
+          <p:cNvSpPr txBox="1">
             <a:spLocks noGrp="1"/>
           </p:cNvSpPr>
           <p:nvPr>
@@ -5709,67 +5451,83 @@
         <p:spPr/>
         <p:txBody>
           <a:bodyPr/>
-          <a:lstStyle/>
-          <a:p>
-            <a:r>
-              <a:rPr lang="en-US" dirty="0"/>
-              <a:t>Grading (2)</a:t>
-            </a:r>
-          </a:p>
-        </p:txBody>
-      </p:sp>
-      <p:sp>
-        <p:nvSpPr>
-          <p:cNvPr id="3" name="Content Placeholder 2">
-            <a:extLst>
-              <a:ext uri="{FF2B5EF4-FFF2-40B4-BE49-F238E27FC236}">
-                <a16:creationId xmlns:a16="http://schemas.microsoft.com/office/drawing/2014/main" id="{2F1065B3-FC51-4BA9-9E03-651360B89125}"/>
-              </a:ext>
-            </a:extLst>
-          </p:cNvPr>
-          <p:cNvSpPr>
+          <a:lstStyle>
+            <a:lvl1pPr>
+              <a:defRPr>
+                <a:solidFill>
+                  <a:srgbClr val="005493"/>
+                </a:solidFill>
+              </a:defRPr>
+            </a:lvl1pPr>
+          </a:lstStyle>
+          <a:p>
+            <a:r>
+              <a:rPr lang="en-US" dirty="0">
+                <a:solidFill>
+                  <a:srgbClr val="0070C0"/>
+                </a:solidFill>
+              </a:rPr>
+              <a:t>Late Policy</a:t>
+            </a:r>
+          </a:p>
+        </p:txBody>
+      </p:sp>
+      <p:sp>
+        <p:nvSpPr>
+          <p:cNvPr id="258" name="Your work is late if it is not turned in by the deadline. The official clock is the time on the submission tool (github.ccs.neu.edu).…"/>
+          <p:cNvSpPr txBox="1">
             <a:spLocks noGrp="1"/>
           </p:cNvSpPr>
           <p:nvPr>
             <p:ph idx="1"/>
           </p:nvPr>
         </p:nvSpPr>
-        <p:spPr>
-          <a:xfrm>
-            <a:off x="838200" y="1509253"/>
-            <a:ext cx="7887346" cy="4351338"/>
-          </a:xfrm>
-        </p:spPr>
-        <p:txBody>
-          <a:bodyPr/>
-          <a:lstStyle/>
-          <a:p>
-            <a:r>
-              <a:rPr lang="en-US" sz="2400" dirty="0"/>
-              <a:t>This is called "specification grading" because we will be as precise as we can to specify what is necessary for you to achieve each rating. </a:t>
-            </a:r>
-          </a:p>
-          <a:p>
-            <a:r>
-              <a:rPr lang="en-US" sz="2400" dirty="0"/>
-              <a:t>Here's an example from a hypothetical assignment about code review:</a:t>
-            </a:r>
-          </a:p>
-          <a:p>
-            <a:endParaRPr lang="en-US" dirty="0"/>
-          </a:p>
-        </p:txBody>
-      </p:sp>
-      <p:sp>
-        <p:nvSpPr>
-          <p:cNvPr id="4" name="Slide Number Placeholder 3">
-            <a:extLst>
-              <a:ext uri="{FF2B5EF4-FFF2-40B4-BE49-F238E27FC236}">
-                <a16:creationId xmlns:a16="http://schemas.microsoft.com/office/drawing/2014/main" id="{D662E1BF-2CDB-43E0-AE98-41D5C3B65509}"/>
-              </a:ext>
-            </a:extLst>
-          </p:cNvPr>
-          <p:cNvSpPr>
+        <p:spPr/>
+        <p:txBody>
+          <a:bodyPr>
+            <a:normAutofit/>
+          </a:bodyPr>
+          <a:lstStyle/>
+          <a:p>
+            <a:r>
+              <a:rPr lang="en-US" dirty="0"/>
+              <a:t>Your work is late if it is not turned in by the deadline. </a:t>
+            </a:r>
+          </a:p>
+          <a:p>
+            <a:pPr lvl="1"/>
+            <a:r>
+              <a:rPr lang="en-US" dirty="0"/>
+              <a:t>10% will be deducted for late HW assignments turned in within 24 hours after the due date </a:t>
+            </a:r>
+          </a:p>
+          <a:p>
+            <a:pPr lvl="1"/>
+            <a:r>
+              <a:rPr lang="en-US" dirty="0"/>
+              <a:t>HW assignments submitted more than 24 hours late will receive a zero.</a:t>
+            </a:r>
+          </a:p>
+          <a:p>
+            <a:pPr lvl="1"/>
+            <a:r>
+              <a:rPr lang="en-US" dirty="0"/>
+              <a:t>If you're worried about being busy around the time of a HW submission, please plan ahead and get started early.</a:t>
+            </a:r>
+          </a:p>
+          <a:p>
+            <a:pPr lvl="1"/>
+            <a:r>
+              <a:rPr lang="en-US" dirty="0"/>
+              <a:t>If you have an accommodation from Disability Services, you must request it for each assignment.</a:t>
+            </a:r>
+          </a:p>
+        </p:txBody>
+      </p:sp>
+      <p:sp>
+        <p:nvSpPr>
+          <p:cNvPr id="259" name="Slide Number"/>
+          <p:cNvSpPr txBox="1">
             <a:spLocks noGrp="1"/>
           </p:cNvSpPr>
           <p:nvPr>
@@ -5781,275 +5539,16 @@
           <a:bodyPr/>
           <a:lstStyle/>
           <a:p>
-            <a:fld id="{20F37917-FD3A-4669-9018-DA04BCDD3D75}" type="slidenum">
-              <a:rPr lang="en-US" smtClean="0"/>
+            <a:fld id="{86CB4B4D-7CA3-9044-876B-883B54F8677D}" type="slidenum">
+              <a:rPr lang="en-US"/>
+              <a:pPr/>
               <a:t>15</a:t>
             </a:fld>
             <a:endParaRPr lang="en-US"/>
           </a:p>
         </p:txBody>
       </p:sp>
-      <p:graphicFrame>
-        <p:nvGraphicFramePr>
-          <p:cNvPr id="7" name="Table 7">
-            <a:extLst>
-              <a:ext uri="{FF2B5EF4-FFF2-40B4-BE49-F238E27FC236}">
-                <a16:creationId xmlns:a16="http://schemas.microsoft.com/office/drawing/2014/main" id="{157F6148-4E79-431E-A79C-849BBE974C40}"/>
-              </a:ext>
-            </a:extLst>
-          </p:cNvPr>
-          <p:cNvGraphicFramePr>
-            <a:graphicFrameLocks noGrp="1"/>
-          </p:cNvGraphicFramePr>
-          <p:nvPr>
-            <p:extLst>
-              <p:ext uri="{D42A27DB-BD31-4B8C-83A1-F6EECF244321}">
-                <p14:modId xmlns:p14="http://schemas.microsoft.com/office/powerpoint/2010/main" val="2677435490"/>
-              </p:ext>
-            </p:extLst>
-          </p:nvPr>
-        </p:nvGraphicFramePr>
-        <p:xfrm>
-          <a:off x="1022350" y="3553506"/>
-          <a:ext cx="8128000" cy="3096866"/>
-        </p:xfrm>
-        <a:graphic>
-          <a:graphicData uri="http://schemas.openxmlformats.org/drawingml/2006/table">
-            <a:tbl>
-              <a:tblPr firstRow="1" bandRow="1">
-                <a:tableStyleId>{5940675A-B579-460E-94D1-54222C63F5DA}</a:tableStyleId>
-              </a:tblPr>
-              <a:tblGrid>
-                <a:gridCol w="2032000">
-                  <a:extLst>
-                    <a:ext uri="{9D8B030D-6E8A-4147-A177-3AD203B41FA5}">
-                      <a16:colId xmlns:a16="http://schemas.microsoft.com/office/drawing/2014/main" val="2549152153"/>
-                    </a:ext>
-                  </a:extLst>
-                </a:gridCol>
-                <a:gridCol w="2032000">
-                  <a:extLst>
-                    <a:ext uri="{9D8B030D-6E8A-4147-A177-3AD203B41FA5}">
-                      <a16:colId xmlns:a16="http://schemas.microsoft.com/office/drawing/2014/main" val="4135940857"/>
-                    </a:ext>
-                  </a:extLst>
-                </a:gridCol>
-                <a:gridCol w="2032000">
-                  <a:extLst>
-                    <a:ext uri="{9D8B030D-6E8A-4147-A177-3AD203B41FA5}">
-                      <a16:colId xmlns:a16="http://schemas.microsoft.com/office/drawing/2014/main" val="3175581178"/>
-                    </a:ext>
-                  </a:extLst>
-                </a:gridCol>
-                <a:gridCol w="2032000">
-                  <a:extLst>
-                    <a:ext uri="{9D8B030D-6E8A-4147-A177-3AD203B41FA5}">
-                      <a16:colId xmlns:a16="http://schemas.microsoft.com/office/drawing/2014/main" val="4225573827"/>
-                    </a:ext>
-                  </a:extLst>
-                </a:gridCol>
-              </a:tblGrid>
-              <a:tr h="775306">
-                <a:tc>
-                  <a:txBody>
-                    <a:bodyPr/>
-                    <a:lstStyle/>
-                    <a:p>
-                      <a:r>
-                        <a:rPr lang="en-US" dirty="0"/>
-                        <a:t>Weight in Assignment</a:t>
-                      </a:r>
-                    </a:p>
-                  </a:txBody>
-                  <a:tcPr/>
-                </a:tc>
-                <a:tc>
-                  <a:txBody>
-                    <a:bodyPr/>
-                    <a:lstStyle/>
-                    <a:p>
-                      <a:r>
-                        <a:rPr lang="en-US" dirty="0"/>
-                        <a:t>Criterion</a:t>
-                      </a:r>
-                    </a:p>
-                  </a:txBody>
-                  <a:tcPr/>
-                </a:tc>
-                <a:tc>
-                  <a:txBody>
-                    <a:bodyPr/>
-                    <a:lstStyle/>
-                    <a:p>
-                      <a:r>
-                        <a:rPr lang="en-US" dirty="0"/>
-                        <a:t>Meets Minimum Expectations</a:t>
-                      </a:r>
-                    </a:p>
-                  </a:txBody>
-                  <a:tcPr/>
-                </a:tc>
-                <a:tc>
-                  <a:txBody>
-                    <a:bodyPr/>
-                    <a:lstStyle/>
-                    <a:p>
-                      <a:r>
-                        <a:rPr lang="en-US" dirty="0"/>
-                        <a:t>Satisfactory</a:t>
-                      </a:r>
-                    </a:p>
-                  </a:txBody>
-                  <a:tcPr/>
-                </a:tc>
-                <a:extLst>
-                  <a:ext uri="{0D108BD9-81ED-4DB2-BD59-A6C34878D82A}">
-                    <a16:rowId xmlns:a16="http://schemas.microsoft.com/office/drawing/2014/main" val="2627169433"/>
-                  </a:ext>
-                </a:extLst>
-              </a:tr>
-              <a:tr h="740461">
-                <a:tc>
-                  <a:txBody>
-                    <a:bodyPr/>
-                    <a:lstStyle/>
-                    <a:p>
-                      <a:r>
-                        <a:rPr lang="en-US" dirty="0"/>
-                        <a:t>4%</a:t>
-                      </a:r>
-                    </a:p>
-                  </a:txBody>
-                  <a:tcPr/>
-                </a:tc>
-                <a:tc>
-                  <a:txBody>
-                    <a:bodyPr/>
-                    <a:lstStyle/>
-                    <a:p>
-                      <a:r>
-                        <a:rPr lang="en-US" dirty="0"/>
-                        <a:t>Naming</a:t>
-                      </a:r>
-                    </a:p>
-                  </a:txBody>
-                  <a:tcPr/>
-                </a:tc>
-                <a:tc>
-                  <a:txBody>
-                    <a:bodyPr/>
-                    <a:lstStyle/>
-                    <a:p>
-                      <a:r>
-                        <a:rPr lang="en-US" dirty="0"/>
-                        <a:t>Identify at least 1 good name and 1 bad name in the code base.  Some examples may not be well-grounded in a design rationale</a:t>
-                      </a:r>
-                    </a:p>
-                  </a:txBody>
-                  <a:tcPr/>
-                </a:tc>
-                <a:tc>
-                  <a:txBody>
-                    <a:bodyPr/>
-                    <a:lstStyle/>
-                    <a:p>
-                      <a:pPr rtl="0" fontAlgn="t">
-                        <a:spcBef>
-                          <a:spcPts val="0"/>
-                        </a:spcBef>
-                        <a:spcAft>
-                          <a:spcPts val="0"/>
-                        </a:spcAft>
-                      </a:pPr>
-                      <a:r>
-                        <a:rPr lang="en-US" sz="1800" b="0" i="0" u="none" strike="noStrike" dirty="0">
-                          <a:solidFill>
-                            <a:srgbClr val="000000"/>
-                          </a:solidFill>
-                          <a:effectLst/>
-                          <a:latin typeface="+mn-lt"/>
-                        </a:rPr>
-                        <a:t>Identify at least 3 “good” names and 3 “bad” names. Each example is substantiated with 1 sentence justifying why this is a good or bad name.</a:t>
-                      </a:r>
-                      <a:endParaRPr lang="en-US" sz="1800" dirty="0">
-                        <a:effectLst/>
-                        <a:latin typeface="+mn-lt"/>
-                      </a:endParaRPr>
-                    </a:p>
-                  </a:txBody>
-                  <a:tcPr marL="63500" marR="63500" marT="63500" marB="63500"/>
-                </a:tc>
-                <a:extLst>
-                  <a:ext uri="{0D108BD9-81ED-4DB2-BD59-A6C34878D82A}">
-                    <a16:rowId xmlns:a16="http://schemas.microsoft.com/office/drawing/2014/main" val="998022384"/>
-                  </a:ext>
-                </a:extLst>
-              </a:tr>
-            </a:tbl>
-          </a:graphicData>
-        </a:graphic>
-      </p:graphicFrame>
-      <p:sp>
-        <p:nvSpPr>
-          <p:cNvPr id="5" name="Cross 4">
-            <a:extLst>
-              <a:ext uri="{FF2B5EF4-FFF2-40B4-BE49-F238E27FC236}">
-                <a16:creationId xmlns:a16="http://schemas.microsoft.com/office/drawing/2014/main" id="{3FDDEDE1-C953-4AD0-A7E8-F6ED10740347}"/>
-              </a:ext>
-            </a:extLst>
-          </p:cNvPr>
-          <p:cNvSpPr/>
-          <p:nvPr/>
-        </p:nvSpPr>
-        <p:spPr>
-          <a:xfrm rot="18736354">
-            <a:off x="3376246" y="1071470"/>
-            <a:ext cx="4825218" cy="4516773"/>
-          </a:xfrm>
-          <a:prstGeom prst="plus">
-            <a:avLst>
-              <a:gd name="adj" fmla="val 43532"/>
-            </a:avLst>
-          </a:prstGeom>
-          <a:solidFill>
-            <a:srgbClr val="FFFF00"/>
-          </a:solidFill>
-        </p:spPr>
-        <p:style>
-          <a:lnRef idx="2">
-            <a:schemeClr val="accent1">
-              <a:shade val="50000"/>
-            </a:schemeClr>
-          </a:lnRef>
-          <a:fillRef idx="1">
-            <a:schemeClr val="accent1"/>
-          </a:fillRef>
-          <a:effectRef idx="0">
-            <a:schemeClr val="accent1"/>
-          </a:effectRef>
-          <a:fontRef idx="minor">
-            <a:schemeClr val="lt1"/>
-          </a:fontRef>
-        </p:style>
-        <p:txBody>
-          <a:bodyPr rtlCol="0" anchor="ctr"/>
-          <a:lstStyle/>
-          <a:p>
-            <a:pPr algn="ctr"/>
-            <a:endParaRPr lang="en-US" sz="2400" dirty="0">
-              <a:solidFill>
-                <a:sysClr val="windowText" lastClr="000000"/>
-              </a:solidFill>
-            </a:endParaRPr>
-          </a:p>
-        </p:txBody>
-      </p:sp>
     </p:spTree>
-    <p:extLst>
-      <p:ext uri="{BB962C8B-B14F-4D97-AF65-F5344CB8AC3E}">
-        <p14:creationId xmlns:p14="http://schemas.microsoft.com/office/powerpoint/2010/main" val="1152214186"/>
-      </p:ext>
-    </p:extLst>
   </p:cSld>
   <p:clrMapOvr>
     <a:masterClrMapping/>
@@ -6079,7 +5578,7 @@
           <p:cNvPr id="2" name="Title 1">
             <a:extLst>
               <a:ext uri="{FF2B5EF4-FFF2-40B4-BE49-F238E27FC236}">
-                <a16:creationId xmlns:a16="http://schemas.microsoft.com/office/drawing/2014/main" id="{4B9395A1-896E-4E16-BB73-FE40822425EA}"/>
+                <a16:creationId xmlns:a16="http://schemas.microsoft.com/office/drawing/2014/main" id="{8DAD8E7C-85CF-4AF5-8090-304D54E13733}"/>
               </a:ext>
             </a:extLst>
           </p:cNvPr>
@@ -6097,17 +5596,17 @@
           <a:p>
             <a:r>
               <a:rPr lang="en-US" dirty="0"/>
-              <a:t>Grading (3)</a:t>
-            </a:r>
-          </a:p>
-        </p:txBody>
-      </p:sp>
-      <p:sp>
-        <p:nvSpPr>
-          <p:cNvPr id="3" name="Content Placeholder 2">
-            <a:extLst>
-              <a:ext uri="{FF2B5EF4-FFF2-40B4-BE49-F238E27FC236}">
-                <a16:creationId xmlns:a16="http://schemas.microsoft.com/office/drawing/2014/main" id="{BA925C1C-7B3E-4007-89DB-0606D7D88875}"/>
+              <a:t>Academic Integrity (1)</a:t>
+            </a:r>
+          </a:p>
+        </p:txBody>
+      </p:sp>
+      <p:sp>
+        <p:nvSpPr>
+          <p:cNvPr id="3" name="Text Placeholder 2">
+            <a:extLst>
+              <a:ext uri="{FF2B5EF4-FFF2-40B4-BE49-F238E27FC236}">
+                <a16:creationId xmlns:a16="http://schemas.microsoft.com/office/drawing/2014/main" id="{F3F41972-2455-48E2-B0C8-0C2FD08B1049}"/>
               </a:ext>
             </a:extLst>
           </p:cNvPr>
@@ -6121,84 +5620,32 @@
         <p:spPr/>
         <p:txBody>
           <a:bodyPr>
-            <a:normAutofit fontScale="92500" lnSpcReduction="20000"/>
+            <a:normAutofit fontScale="92500" lnSpcReduction="10000"/>
           </a:bodyPr>
           <a:lstStyle/>
           <a:p>
             <a:r>
               <a:rPr lang="en-US" dirty="0"/>
-              <a:t>Note: there is no partial credit.  For each gradable element you will get </a:t>
-            </a:r>
-            <a:r>
-              <a:rPr lang="en-US" b="1" dirty="0"/>
-              <a:t>exactly</a:t>
-            </a:r>
-            <a:r>
-              <a:rPr lang="en-US" dirty="0"/>
-              <a:t> one of those 3 ratings.</a:t>
-            </a:r>
-          </a:p>
-          <a:p>
-            <a:r>
-              <a:rPr lang="en-US" dirty="0"/>
-              <a:t>The factors that we might have considered for partial credit will be broken out into separate elements.  The elements will be aligned, as best we can, with the stated learning objectives of the assignment.</a:t>
-            </a:r>
-          </a:p>
-          <a:p>
-            <a:r>
-              <a:rPr lang="en-US" dirty="0"/>
-              <a:t>You will know the rating criteria before you do the assignment.</a:t>
-            </a:r>
-          </a:p>
-          <a:p>
-            <a:r>
-              <a:rPr lang="en-US" dirty="0"/>
-              <a:t>At the end of each assignment, you will receive</a:t>
-            </a:r>
-          </a:p>
-          <a:p>
-            <a:pPr lvl="1"/>
-            <a:r>
-              <a:rPr lang="en-US" dirty="0"/>
-              <a:t>your rating on each of the elements in the assignment</a:t>
-            </a:r>
-          </a:p>
-          <a:p>
-            <a:pPr lvl="1"/>
-            <a:r>
-              <a:rPr lang="en-US" dirty="0"/>
-              <a:t>a 3-tuple, with the weighted total of "below minimums", "minimums" and "</a:t>
-            </a:r>
-            <a:r>
-              <a:rPr lang="en-US" dirty="0" err="1"/>
-              <a:t>satisfactories</a:t>
-            </a:r>
-            <a:r>
-              <a:rPr lang="en-US" dirty="0"/>
-              <a:t>" that you got.</a:t>
-            </a:r>
-          </a:p>
-          <a:p>
-            <a:pPr lvl="1"/>
-            <a:r>
-              <a:rPr lang="en-US" dirty="0"/>
-              <a:t>So in the example, if you got a "satisfactory", that would count as 4% towards your </a:t>
-            </a:r>
-            <a:r>
-              <a:rPr lang="en-US" dirty="0" err="1"/>
-              <a:t>satisfactories</a:t>
-            </a:r>
-            <a:r>
-              <a:rPr lang="en-US" dirty="0"/>
-              <a:t>.</a:t>
-            </a:r>
-          </a:p>
-          <a:p>
-            <a:endParaRPr lang="en-US" dirty="0"/>
-          </a:p>
-          <a:p>
-            <a:pPr lvl="1"/>
-            <a:endParaRPr lang="en-US" dirty="0"/>
+              <a:t>Students must work individually on all homework assignments.</a:t>
+            </a:r>
+          </a:p>
+          <a:p>
+            <a:r>
+              <a:rPr lang="en-US" dirty="0"/>
+              <a:t>We encourage you to have high-level discussions with other students in the class about the assignments, however, we require that when you turn in an assignment, it is only your work. That is, copying any part of another student's assignment is strictly prohibited.</a:t>
+            </a:r>
+          </a:p>
+          <a:p>
+            <a:r>
+              <a:rPr lang="en-US" dirty="0"/>
+              <a:t>If you steal someone else's work, you fail the class.</a:t>
+            </a:r>
+          </a:p>
+          <a:p>
+            <a:r>
+              <a:rPr lang="en-US" dirty="0"/>
+              <a:t>You are responsible for protecting your work. If someone uses your work, with or without your permission, you fail the class.</a:t>
+            </a:r>
           </a:p>
         </p:txBody>
       </p:sp>
@@ -6207,7 +5654,7 @@
           <p:cNvPr id="4" name="Slide Number Placeholder 3">
             <a:extLst>
               <a:ext uri="{FF2B5EF4-FFF2-40B4-BE49-F238E27FC236}">
-                <a16:creationId xmlns:a16="http://schemas.microsoft.com/office/drawing/2014/main" id="{DE4B55AF-FE15-4F26-8039-2E6BCBCDE16E}"/>
+                <a16:creationId xmlns:a16="http://schemas.microsoft.com/office/drawing/2014/main" id="{34D72AC8-7059-4398-976F-9B0E0D6DABC0}"/>
               </a:ext>
             </a:extLst>
           </p:cNvPr>
@@ -6223,73 +5670,24 @@
           <a:bodyPr/>
           <a:lstStyle/>
           <a:p>
-            <a:fld id="{20F37917-FD3A-4669-9018-DA04BCDD3D75}" type="slidenum">
+            <a:pPr defTabSz="547695">
+              <a:defRPr/>
+            </a:pPr>
+            <a:fld id="{86CB4B4D-7CA3-9044-876B-883B54F8677D}" type="slidenum">
               <a:rPr lang="en-US" smtClean="0"/>
+              <a:pPr defTabSz="547695">
+                <a:defRPr/>
+              </a:pPr>
               <a:t>16</a:t>
             </a:fld>
             <a:endParaRPr lang="en-US"/>
           </a:p>
         </p:txBody>
       </p:sp>
-      <p:sp>
-        <p:nvSpPr>
-          <p:cNvPr id="5" name="Cross 4">
-            <a:extLst>
-              <a:ext uri="{FF2B5EF4-FFF2-40B4-BE49-F238E27FC236}">
-                <a16:creationId xmlns:a16="http://schemas.microsoft.com/office/drawing/2014/main" id="{292004F6-4D36-4C31-8FF7-1031585AE3DF}"/>
-              </a:ext>
-            </a:extLst>
-          </p:cNvPr>
-          <p:cNvSpPr/>
-          <p:nvPr/>
-        </p:nvSpPr>
-        <p:spPr>
-          <a:xfrm rot="18736354">
-            <a:off x="3376246" y="1071470"/>
-            <a:ext cx="4825218" cy="4516773"/>
-          </a:xfrm>
-          <a:prstGeom prst="plus">
-            <a:avLst>
-              <a:gd name="adj" fmla="val 43532"/>
-            </a:avLst>
-          </a:prstGeom>
-          <a:solidFill>
-            <a:srgbClr val="FFFF00"/>
-          </a:solidFill>
-        </p:spPr>
-        <p:style>
-          <a:lnRef idx="2">
-            <a:schemeClr val="accent1">
-              <a:shade val="50000"/>
-            </a:schemeClr>
-          </a:lnRef>
-          <a:fillRef idx="1">
-            <a:schemeClr val="accent1"/>
-          </a:fillRef>
-          <a:effectRef idx="0">
-            <a:schemeClr val="accent1"/>
-          </a:effectRef>
-          <a:fontRef idx="minor">
-            <a:schemeClr val="lt1"/>
-          </a:fontRef>
-        </p:style>
-        <p:txBody>
-          <a:bodyPr rtlCol="0" anchor="ctr"/>
-          <a:lstStyle/>
-          <a:p>
-            <a:pPr algn="ctr"/>
-            <a:endParaRPr lang="en-US" sz="2400" dirty="0">
-              <a:solidFill>
-                <a:sysClr val="windowText" lastClr="000000"/>
-              </a:solidFill>
-            </a:endParaRPr>
-          </a:p>
-        </p:txBody>
-      </p:sp>
     </p:spTree>
     <p:extLst>
       <p:ext uri="{BB962C8B-B14F-4D97-AF65-F5344CB8AC3E}">
-        <p14:creationId xmlns:p14="http://schemas.microsoft.com/office/powerpoint/2010/main" val="4064371049"/>
+        <p14:creationId xmlns:p14="http://schemas.microsoft.com/office/powerpoint/2010/main" val="4223183005"/>
       </p:ext>
     </p:extLst>
   </p:cSld>
@@ -6321,7 +5719,7 @@
           <p:cNvPr id="2" name="Title 1">
             <a:extLst>
               <a:ext uri="{FF2B5EF4-FFF2-40B4-BE49-F238E27FC236}">
-                <a16:creationId xmlns:a16="http://schemas.microsoft.com/office/drawing/2014/main" id="{01ACEA07-02DE-45AB-87D9-55915BA9AC29}"/>
+                <a16:creationId xmlns:a16="http://schemas.microsoft.com/office/drawing/2014/main" id="{0C6E9E53-F40E-46F3-8B32-BE0138F441B1}"/>
               </a:ext>
             </a:extLst>
           </p:cNvPr>
@@ -6339,8 +5737,61 @@
           <a:p>
             <a:r>
               <a:rPr lang="en-US" dirty="0"/>
-              <a:t>Grading (4)</a:t>
-            </a:r>
+              <a:t>Academic Integrity (2)</a:t>
+            </a:r>
+          </a:p>
+        </p:txBody>
+      </p:sp>
+      <p:sp>
+        <p:nvSpPr>
+          <p:cNvPr id="3" name="Text Placeholder 2">
+            <a:extLst>
+              <a:ext uri="{FF2B5EF4-FFF2-40B4-BE49-F238E27FC236}">
+                <a16:creationId xmlns:a16="http://schemas.microsoft.com/office/drawing/2014/main" id="{9BD682CD-7D52-49E3-A660-C4CB4A35F3AD}"/>
+              </a:ext>
+            </a:extLst>
+          </p:cNvPr>
+          <p:cNvSpPr>
+            <a:spLocks noGrp="1"/>
+          </p:cNvSpPr>
+          <p:nvPr>
+            <p:ph idx="1"/>
+          </p:nvPr>
+        </p:nvSpPr>
+        <p:spPr/>
+        <p:txBody>
+          <a:bodyPr>
+            <a:normAutofit/>
+          </a:bodyPr>
+          <a:lstStyle/>
+          <a:p>
+            <a:r>
+              <a:rPr lang="en-US" dirty="0"/>
+              <a:t>You are free to reuse small snippets of example code found on the Internet (e.g. via </a:t>
+            </a:r>
+            <a:r>
+              <a:rPr lang="en-US" dirty="0" err="1"/>
+              <a:t>StackOverflow</a:t>
+            </a:r>
+            <a:r>
+              <a:rPr lang="en-US" dirty="0"/>
+              <a:t>) provided that it is attributed. </a:t>
+            </a:r>
+          </a:p>
+          <a:p>
+            <a:r>
+              <a:rPr lang="en-US" dirty="0"/>
+              <a:t>If you are concerned that by reusing and attributing that copied code it may appear that you didn't complete the assignment yourself, then please raise a discussion with the instructor.</a:t>
+            </a:r>
+          </a:p>
+          <a:p>
+            <a:r>
+              <a:rPr lang="en-US" dirty="0"/>
+              <a:t> If you are in doubt whether using others' work is allowed, you should assume that it is NOT allowed unless the instructors confirm otherwise.</a:t>
+            </a:r>
+          </a:p>
+          <a:p>
+            <a:endParaRPr lang="en-US" dirty="0"/>
           </a:p>
         </p:txBody>
       </p:sp>
@@ -6349,7 +5800,7 @@
           <p:cNvPr id="4" name="Slide Number Placeholder 3">
             <a:extLst>
               <a:ext uri="{FF2B5EF4-FFF2-40B4-BE49-F238E27FC236}">
-                <a16:creationId xmlns:a16="http://schemas.microsoft.com/office/drawing/2014/main" id="{4C417AD2-F659-4EAB-B50A-8D721AE6BB03}"/>
+                <a16:creationId xmlns:a16="http://schemas.microsoft.com/office/drawing/2014/main" id="{B061B1C6-5E6F-4408-9C79-8B3E2C5DE989}"/>
               </a:ext>
             </a:extLst>
           </p:cNvPr>
@@ -6365,593 +5816,24 @@
           <a:bodyPr/>
           <a:lstStyle/>
           <a:p>
-            <a:fld id="{20F37917-FD3A-4669-9018-DA04BCDD3D75}" type="slidenum">
+            <a:pPr defTabSz="547695">
+              <a:defRPr/>
+            </a:pPr>
+            <a:fld id="{86CB4B4D-7CA3-9044-876B-883B54F8677D}" type="slidenum">
               <a:rPr lang="en-US" smtClean="0"/>
-              <a:pPr/>
+              <a:pPr defTabSz="547695">
+                <a:defRPr/>
+              </a:pPr>
               <a:t>17</a:t>
             </a:fld>
             <a:endParaRPr lang="en-US"/>
           </a:p>
         </p:txBody>
       </p:sp>
-      <p:sp>
-        <p:nvSpPr>
-          <p:cNvPr id="13" name="Content Placeholder 12">
-            <a:extLst>
-              <a:ext uri="{FF2B5EF4-FFF2-40B4-BE49-F238E27FC236}">
-                <a16:creationId xmlns:a16="http://schemas.microsoft.com/office/drawing/2014/main" id="{E5AE9418-65FA-476F-ABE6-28C673D26BBC}"/>
-              </a:ext>
-            </a:extLst>
-          </p:cNvPr>
-          <p:cNvSpPr>
-            <a:spLocks noGrp="1"/>
-          </p:cNvSpPr>
-          <p:nvPr>
-            <p:ph idx="1"/>
-          </p:nvPr>
-        </p:nvSpPr>
-        <p:spPr/>
-        <p:txBody>
-          <a:bodyPr/>
-          <a:lstStyle/>
-          <a:p>
-            <a:r>
-              <a:rPr lang="en-US" dirty="0"/>
-              <a:t> So if you had an assignment with 4 parts, and you got the scores indicated in the matrix below, we will record that you got 70% of the available Satisfactory points and 10% of the available minimum points</a:t>
-            </a:r>
-          </a:p>
-        </p:txBody>
-      </p:sp>
-      <p:graphicFrame>
-        <p:nvGraphicFramePr>
-          <p:cNvPr id="14" name="Table 5">
-            <a:extLst>
-              <a:ext uri="{FF2B5EF4-FFF2-40B4-BE49-F238E27FC236}">
-                <a16:creationId xmlns:a16="http://schemas.microsoft.com/office/drawing/2014/main" id="{FA84D8E3-8A38-4ABD-9BE2-0803EA22AF68}"/>
-              </a:ext>
-            </a:extLst>
-          </p:cNvPr>
-          <p:cNvGraphicFramePr>
-            <a:graphicFrameLocks/>
-          </p:cNvGraphicFramePr>
-          <p:nvPr>
-            <p:extLst>
-              <p:ext uri="{D42A27DB-BD31-4B8C-83A1-F6EECF244321}">
-                <p14:modId xmlns:p14="http://schemas.microsoft.com/office/powerpoint/2010/main" val="4179967879"/>
-              </p:ext>
-            </p:extLst>
-          </p:nvPr>
-        </p:nvGraphicFramePr>
-        <p:xfrm>
-          <a:off x="1362417" y="3675829"/>
-          <a:ext cx="7865989" cy="2494280"/>
-        </p:xfrm>
-        <a:graphic>
-          <a:graphicData uri="http://schemas.openxmlformats.org/drawingml/2006/table">
-            <a:tbl>
-              <a:tblPr firstRow="1" bandRow="1">
-                <a:tableStyleId>{5940675A-B579-460E-94D1-54222C63F5DA}</a:tableStyleId>
-              </a:tblPr>
-              <a:tblGrid>
-                <a:gridCol w="1577340">
-                  <a:extLst>
-                    <a:ext uri="{9D8B030D-6E8A-4147-A177-3AD203B41FA5}">
-                      <a16:colId xmlns:a16="http://schemas.microsoft.com/office/drawing/2014/main" val="1169529622"/>
-                    </a:ext>
-                  </a:extLst>
-                </a:gridCol>
-                <a:gridCol w="1577340">
-                  <a:extLst>
-                    <a:ext uri="{9D8B030D-6E8A-4147-A177-3AD203B41FA5}">
-                      <a16:colId xmlns:a16="http://schemas.microsoft.com/office/drawing/2014/main" val="3234018631"/>
-                    </a:ext>
-                  </a:extLst>
-                </a:gridCol>
-                <a:gridCol w="1577340">
-                  <a:extLst>
-                    <a:ext uri="{9D8B030D-6E8A-4147-A177-3AD203B41FA5}">
-                      <a16:colId xmlns:a16="http://schemas.microsoft.com/office/drawing/2014/main" val="1442142159"/>
-                    </a:ext>
-                  </a:extLst>
-                </a:gridCol>
-                <a:gridCol w="1577340">
-                  <a:extLst>
-                    <a:ext uri="{9D8B030D-6E8A-4147-A177-3AD203B41FA5}">
-                      <a16:colId xmlns:a16="http://schemas.microsoft.com/office/drawing/2014/main" val="299112097"/>
-                    </a:ext>
-                  </a:extLst>
-                </a:gridCol>
-                <a:gridCol w="1556629">
-                  <a:extLst>
-                    <a:ext uri="{9D8B030D-6E8A-4147-A177-3AD203B41FA5}">
-                      <a16:colId xmlns:a16="http://schemas.microsoft.com/office/drawing/2014/main" val="4219548136"/>
-                    </a:ext>
-                  </a:extLst>
-                </a:gridCol>
-              </a:tblGrid>
-              <a:tr h="370840">
-                <a:tc>
-                  <a:txBody>
-                    <a:bodyPr/>
-                    <a:lstStyle/>
-                    <a:p>
-                      <a:r>
-                        <a:rPr lang="en-US" dirty="0"/>
-                        <a:t>Item</a:t>
-                      </a:r>
-                    </a:p>
-                  </a:txBody>
-                  <a:tcPr/>
-                </a:tc>
-                <a:tc>
-                  <a:txBody>
-                    <a:bodyPr/>
-                    <a:lstStyle/>
-                    <a:p>
-                      <a:r>
-                        <a:rPr lang="en-US" dirty="0"/>
-                        <a:t>Weight</a:t>
-                      </a:r>
-                    </a:p>
-                  </a:txBody>
-                  <a:tcPr/>
-                </a:tc>
-                <a:tc>
-                  <a:txBody>
-                    <a:bodyPr/>
-                    <a:lstStyle/>
-                    <a:p>
-                      <a:pPr algn="ctr"/>
-                      <a:r>
-                        <a:rPr lang="en-US" dirty="0"/>
-                        <a:t>Below Minimum</a:t>
-                      </a:r>
-                    </a:p>
-                  </a:txBody>
-                  <a:tcPr/>
-                </a:tc>
-                <a:tc>
-                  <a:txBody>
-                    <a:bodyPr/>
-                    <a:lstStyle/>
-                    <a:p>
-                      <a:pPr algn="ctr"/>
-                      <a:r>
-                        <a:rPr lang="en-US" dirty="0"/>
-                        <a:t>Minimum</a:t>
-                      </a:r>
-                    </a:p>
-                  </a:txBody>
-                  <a:tcPr/>
-                </a:tc>
-                <a:tc>
-                  <a:txBody>
-                    <a:bodyPr/>
-                    <a:lstStyle/>
-                    <a:p>
-                      <a:pPr algn="ctr"/>
-                      <a:r>
-                        <a:rPr lang="en-US" dirty="0"/>
-                        <a:t>Satisfactory</a:t>
-                      </a:r>
-                    </a:p>
-                  </a:txBody>
-                  <a:tcPr/>
-                </a:tc>
-                <a:extLst>
-                  <a:ext uri="{0D108BD9-81ED-4DB2-BD59-A6C34878D82A}">
-                    <a16:rowId xmlns:a16="http://schemas.microsoft.com/office/drawing/2014/main" val="3643962869"/>
-                  </a:ext>
-                </a:extLst>
-              </a:tr>
-              <a:tr h="370840">
-                <a:tc>
-                  <a:txBody>
-                    <a:bodyPr/>
-                    <a:lstStyle/>
-                    <a:p>
-                      <a:r>
-                        <a:rPr lang="en-US" dirty="0"/>
-                        <a:t>1</a:t>
-                      </a:r>
-                    </a:p>
-                  </a:txBody>
-                  <a:tcPr/>
-                </a:tc>
-                <a:tc>
-                  <a:txBody>
-                    <a:bodyPr/>
-                    <a:lstStyle/>
-                    <a:p>
-                      <a:r>
-                        <a:rPr lang="en-US" dirty="0"/>
-                        <a:t>0.2</a:t>
-                      </a:r>
-                    </a:p>
-                  </a:txBody>
-                  <a:tcPr/>
-                </a:tc>
-                <a:tc>
-                  <a:txBody>
-                    <a:bodyPr/>
-                    <a:lstStyle/>
-                    <a:p>
-                      <a:pPr algn="ctr"/>
-                      <a:r>
-                        <a:rPr lang="en-US" dirty="0"/>
-                        <a:t>X</a:t>
-                      </a:r>
-                    </a:p>
-                  </a:txBody>
-                  <a:tcPr/>
-                </a:tc>
-                <a:tc>
-                  <a:txBody>
-                    <a:bodyPr/>
-                    <a:lstStyle/>
-                    <a:p>
-                      <a:pPr algn="ctr"/>
-                      <a:endParaRPr lang="en-US"/>
-                    </a:p>
-                  </a:txBody>
-                  <a:tcPr/>
-                </a:tc>
-                <a:tc>
-                  <a:txBody>
-                    <a:bodyPr/>
-                    <a:lstStyle/>
-                    <a:p>
-                      <a:pPr algn="ctr"/>
-                      <a:endParaRPr lang="en-US"/>
-                    </a:p>
-                  </a:txBody>
-                  <a:tcPr/>
-                </a:tc>
-                <a:extLst>
-                  <a:ext uri="{0D108BD9-81ED-4DB2-BD59-A6C34878D82A}">
-                    <a16:rowId xmlns:a16="http://schemas.microsoft.com/office/drawing/2014/main" val="2043979497"/>
-                  </a:ext>
-                </a:extLst>
-              </a:tr>
-              <a:tr h="370840">
-                <a:tc>
-                  <a:txBody>
-                    <a:bodyPr/>
-                    <a:lstStyle/>
-                    <a:p>
-                      <a:r>
-                        <a:rPr lang="en-US" dirty="0"/>
-                        <a:t>2</a:t>
-                      </a:r>
-                    </a:p>
-                  </a:txBody>
-                  <a:tcPr/>
-                </a:tc>
-                <a:tc>
-                  <a:txBody>
-                    <a:bodyPr/>
-                    <a:lstStyle/>
-                    <a:p>
-                      <a:r>
-                        <a:rPr lang="en-US" dirty="0"/>
-                        <a:t>0.3</a:t>
-                      </a:r>
-                    </a:p>
-                  </a:txBody>
-                  <a:tcPr/>
-                </a:tc>
-                <a:tc>
-                  <a:txBody>
-                    <a:bodyPr/>
-                    <a:lstStyle/>
-                    <a:p>
-                      <a:pPr algn="ctr"/>
-                      <a:endParaRPr lang="en-US" dirty="0"/>
-                    </a:p>
-                  </a:txBody>
-                  <a:tcPr/>
-                </a:tc>
-                <a:tc>
-                  <a:txBody>
-                    <a:bodyPr/>
-                    <a:lstStyle/>
-                    <a:p>
-                      <a:pPr algn="ctr"/>
-                      <a:endParaRPr lang="en-US" dirty="0"/>
-                    </a:p>
-                  </a:txBody>
-                  <a:tcPr/>
-                </a:tc>
-                <a:tc>
-                  <a:txBody>
-                    <a:bodyPr/>
-                    <a:lstStyle/>
-                    <a:p>
-                      <a:pPr algn="ctr"/>
-                      <a:r>
-                        <a:rPr lang="en-US" dirty="0"/>
-                        <a:t>X</a:t>
-                      </a:r>
-                    </a:p>
-                  </a:txBody>
-                  <a:tcPr/>
-                </a:tc>
-                <a:extLst>
-                  <a:ext uri="{0D108BD9-81ED-4DB2-BD59-A6C34878D82A}">
-                    <a16:rowId xmlns:a16="http://schemas.microsoft.com/office/drawing/2014/main" val="421651291"/>
-                  </a:ext>
-                </a:extLst>
-              </a:tr>
-              <a:tr h="370840">
-                <a:tc>
-                  <a:txBody>
-                    <a:bodyPr/>
-                    <a:lstStyle/>
-                    <a:p>
-                      <a:r>
-                        <a:rPr lang="en-US" dirty="0"/>
-                        <a:t>3</a:t>
-                      </a:r>
-                    </a:p>
-                  </a:txBody>
-                  <a:tcPr/>
-                </a:tc>
-                <a:tc>
-                  <a:txBody>
-                    <a:bodyPr/>
-                    <a:lstStyle/>
-                    <a:p>
-                      <a:r>
-                        <a:rPr lang="en-US" dirty="0"/>
-                        <a:t>0.4</a:t>
-                      </a:r>
-                    </a:p>
-                  </a:txBody>
-                  <a:tcPr/>
-                </a:tc>
-                <a:tc>
-                  <a:txBody>
-                    <a:bodyPr/>
-                    <a:lstStyle/>
-                    <a:p>
-                      <a:pPr algn="ctr"/>
-                      <a:endParaRPr lang="en-US"/>
-                    </a:p>
-                  </a:txBody>
-                  <a:tcPr/>
-                </a:tc>
-                <a:tc>
-                  <a:txBody>
-                    <a:bodyPr/>
-                    <a:lstStyle/>
-                    <a:p>
-                      <a:pPr algn="ctr"/>
-                      <a:endParaRPr lang="en-US" dirty="0"/>
-                    </a:p>
-                  </a:txBody>
-                  <a:tcPr/>
-                </a:tc>
-                <a:tc>
-                  <a:txBody>
-                    <a:bodyPr/>
-                    <a:lstStyle/>
-                    <a:p>
-                      <a:pPr algn="ctr"/>
-                      <a:r>
-                        <a:rPr lang="en-US" dirty="0"/>
-                        <a:t>X</a:t>
-                      </a:r>
-                    </a:p>
-                  </a:txBody>
-                  <a:tcPr/>
-                </a:tc>
-                <a:extLst>
-                  <a:ext uri="{0D108BD9-81ED-4DB2-BD59-A6C34878D82A}">
-                    <a16:rowId xmlns:a16="http://schemas.microsoft.com/office/drawing/2014/main" val="2141605749"/>
-                  </a:ext>
-                </a:extLst>
-              </a:tr>
-              <a:tr h="370840">
-                <a:tc>
-                  <a:txBody>
-                    <a:bodyPr/>
-                    <a:lstStyle/>
-                    <a:p>
-                      <a:r>
-                        <a:rPr lang="en-US" dirty="0"/>
-                        <a:t>4</a:t>
-                      </a:r>
-                    </a:p>
-                  </a:txBody>
-                  <a:tcPr/>
-                </a:tc>
-                <a:tc>
-                  <a:txBody>
-                    <a:bodyPr/>
-                    <a:lstStyle/>
-                    <a:p>
-                      <a:r>
-                        <a:rPr lang="en-US" dirty="0"/>
-                        <a:t>0.1</a:t>
-                      </a:r>
-                    </a:p>
-                  </a:txBody>
-                  <a:tcPr/>
-                </a:tc>
-                <a:tc>
-                  <a:txBody>
-                    <a:bodyPr/>
-                    <a:lstStyle/>
-                    <a:p>
-                      <a:pPr algn="ctr"/>
-                      <a:endParaRPr lang="en-US"/>
-                    </a:p>
-                  </a:txBody>
-                  <a:tcPr/>
-                </a:tc>
-                <a:tc>
-                  <a:txBody>
-                    <a:bodyPr/>
-                    <a:lstStyle/>
-                    <a:p>
-                      <a:pPr algn="ctr"/>
-                      <a:r>
-                        <a:rPr lang="en-US" dirty="0"/>
-                        <a:t>X</a:t>
-                      </a:r>
-                    </a:p>
-                  </a:txBody>
-                  <a:tcPr/>
-                </a:tc>
-                <a:tc>
-                  <a:txBody>
-                    <a:bodyPr/>
-                    <a:lstStyle/>
-                    <a:p>
-                      <a:pPr algn="ctr"/>
-                      <a:endParaRPr lang="en-US" dirty="0"/>
-                    </a:p>
-                  </a:txBody>
-                  <a:tcPr/>
-                </a:tc>
-                <a:extLst>
-                  <a:ext uri="{0D108BD9-81ED-4DB2-BD59-A6C34878D82A}">
-                    <a16:rowId xmlns:a16="http://schemas.microsoft.com/office/drawing/2014/main" val="1238794174"/>
-                  </a:ext>
-                </a:extLst>
-              </a:tr>
-              <a:tr h="370840">
-                <a:tc>
-                  <a:txBody>
-                    <a:bodyPr/>
-                    <a:lstStyle/>
-                    <a:p>
-                      <a:r>
-                        <a:rPr lang="en-US" dirty="0"/>
-                        <a:t>TOTAL</a:t>
-                      </a:r>
-                    </a:p>
-                  </a:txBody>
-                  <a:tcPr/>
-                </a:tc>
-                <a:tc>
-                  <a:txBody>
-                    <a:bodyPr/>
-                    <a:lstStyle/>
-                    <a:p>
-                      <a:endParaRPr lang="en-US"/>
-                    </a:p>
-                  </a:txBody>
-                  <a:tcPr/>
-                </a:tc>
-                <a:tc>
-                  <a:txBody>
-                    <a:bodyPr/>
-                    <a:lstStyle/>
-                    <a:p>
-                      <a:r>
-                        <a:rPr lang="en-US" dirty="0"/>
-                        <a:t>0.2</a:t>
-                      </a:r>
-                    </a:p>
-                  </a:txBody>
-                  <a:tcPr/>
-                </a:tc>
-                <a:tc>
-                  <a:txBody>
-                    <a:bodyPr/>
-                    <a:lstStyle/>
-                    <a:p>
-                      <a:r>
-                        <a:rPr lang="en-US" dirty="0"/>
-                        <a:t>0.1</a:t>
-                      </a:r>
-                    </a:p>
-                  </a:txBody>
-                  <a:tcPr/>
-                </a:tc>
-                <a:tc>
-                  <a:txBody>
-                    <a:bodyPr/>
-                    <a:lstStyle/>
-                    <a:p>
-                      <a:r>
-                        <a:rPr lang="en-US" dirty="0"/>
-                        <a:t>0.7</a:t>
-                      </a:r>
-                    </a:p>
-                  </a:txBody>
-                  <a:tcPr/>
-                </a:tc>
-                <a:extLst>
-                  <a:ext uri="{0D108BD9-81ED-4DB2-BD59-A6C34878D82A}">
-                    <a16:rowId xmlns:a16="http://schemas.microsoft.com/office/drawing/2014/main" val="4091054236"/>
-                  </a:ext>
-                </a:extLst>
-              </a:tr>
-            </a:tbl>
-          </a:graphicData>
-        </a:graphic>
-      </p:graphicFrame>
-      <p:sp>
-        <p:nvSpPr>
-          <p:cNvPr id="6" name="Cross 5">
-            <a:extLst>
-              <a:ext uri="{FF2B5EF4-FFF2-40B4-BE49-F238E27FC236}">
-                <a16:creationId xmlns:a16="http://schemas.microsoft.com/office/drawing/2014/main" id="{A987F7E1-F120-47AA-A9E2-C6AC471F2B4D}"/>
-              </a:ext>
-            </a:extLst>
-          </p:cNvPr>
-          <p:cNvSpPr/>
-          <p:nvPr/>
-        </p:nvSpPr>
-        <p:spPr>
-          <a:xfrm rot="18736354">
-            <a:off x="3376246" y="1071470"/>
-            <a:ext cx="4825218" cy="4516773"/>
-          </a:xfrm>
-          <a:prstGeom prst="plus">
-            <a:avLst>
-              <a:gd name="adj" fmla="val 43532"/>
-            </a:avLst>
-          </a:prstGeom>
-          <a:solidFill>
-            <a:srgbClr val="FFFF00"/>
-          </a:solidFill>
-        </p:spPr>
-        <p:style>
-          <a:lnRef idx="2">
-            <a:schemeClr val="accent1">
-              <a:shade val="50000"/>
-            </a:schemeClr>
-          </a:lnRef>
-          <a:fillRef idx="1">
-            <a:schemeClr val="accent1"/>
-          </a:fillRef>
-          <a:effectRef idx="0">
-            <a:schemeClr val="accent1"/>
-          </a:effectRef>
-          <a:fontRef idx="minor">
-            <a:schemeClr val="lt1"/>
-          </a:fontRef>
-        </p:style>
-        <p:txBody>
-          <a:bodyPr rtlCol="0" anchor="ctr"/>
-          <a:lstStyle/>
-          <a:p>
-            <a:pPr algn="ctr"/>
-            <a:endParaRPr lang="en-US" sz="2400" dirty="0">
-              <a:solidFill>
-                <a:sysClr val="windowText" lastClr="000000"/>
-              </a:solidFill>
-            </a:endParaRPr>
-          </a:p>
-        </p:txBody>
-      </p:sp>
     </p:spTree>
     <p:extLst>
       <p:ext uri="{BB962C8B-B14F-4D97-AF65-F5344CB8AC3E}">
-        <p14:creationId xmlns:p14="http://schemas.microsoft.com/office/powerpoint/2010/main" val="866189920"/>
+        <p14:creationId xmlns:p14="http://schemas.microsoft.com/office/powerpoint/2010/main" val="1665633817"/>
       </p:ext>
     </p:extLst>
   </p:cSld>
@@ -6983,7 +5865,7 @@
           <p:cNvPr id="2" name="Title 1">
             <a:extLst>
               <a:ext uri="{FF2B5EF4-FFF2-40B4-BE49-F238E27FC236}">
-                <a16:creationId xmlns:a16="http://schemas.microsoft.com/office/drawing/2014/main" id="{6C4E5019-50C7-4F3B-9465-2BE4E53E2626}"/>
+                <a16:creationId xmlns:a16="http://schemas.microsoft.com/office/drawing/2014/main" id="{1DD99648-CE8F-4E19-953E-8B3920440319}"/>
               </a:ext>
             </a:extLst>
           </p:cNvPr>
@@ -7001,7 +5883,7 @@
           <a:p>
             <a:r>
               <a:rPr lang="en-US" dirty="0"/>
-              <a:t>Grading (5)</a:t>
+              <a:t>Communication</a:t>
             </a:r>
           </a:p>
         </p:txBody>
@@ -7011,7 +5893,7 @@
           <p:cNvPr id="3" name="Content Placeholder 2">
             <a:extLst>
               <a:ext uri="{FF2B5EF4-FFF2-40B4-BE49-F238E27FC236}">
-                <a16:creationId xmlns:a16="http://schemas.microsoft.com/office/drawing/2014/main" id="{C865EF8A-0E56-4A72-812A-A6C40347C9B9}"/>
+                <a16:creationId xmlns:a16="http://schemas.microsoft.com/office/drawing/2014/main" id="{82CC43D4-82B4-449F-8A4A-151724B1D9F3}"/>
               </a:ext>
             </a:extLst>
           </p:cNvPr>
@@ -7024,34 +5906,95 @@
         </p:nvSpPr>
         <p:spPr/>
         <p:txBody>
-          <a:bodyPr/>
-          <a:lstStyle/>
-          <a:p>
-            <a:r>
-              <a:rPr lang="en-US" dirty="0"/>
-              <a:t>Note: Do </a:t>
-            </a:r>
-            <a:r>
-              <a:rPr lang="en-US" b="1" dirty="0"/>
-              <a:t>NOT</a:t>
-            </a:r>
-            <a:r>
-              <a:rPr lang="en-US" dirty="0"/>
-              <a:t> ask us to average your 3-dimensional grade into a single value.  The ratings are </a:t>
+          <a:bodyPr>
+            <a:normAutofit fontScale="92500" lnSpcReduction="20000"/>
+          </a:bodyPr>
+          <a:lstStyle/>
+          <a:p>
+            <a:r>
+              <a:rPr lang="en-US" dirty="0"/>
+              <a:t>Course web page (</a:t>
             </a:r>
             <a:r>
               <a:rPr lang="en-US" dirty="0">
-                <a:solidFill>
-                  <a:srgbClr val="FF0000"/>
-                </a:solidFill>
+                <a:hlinkClick r:id="rId2"/>
               </a:rPr>
-              <a:t>ordinal data</a:t>
-            </a:r>
-            <a:r>
-              <a:rPr lang="en-US" dirty="0"/>
-              <a:t>, not linear data, and in statistics it's a big no-no to take averages over ordinal data.</a:t>
-            </a:r>
-            <a:endParaRPr lang="en-US" b="1" dirty="0"/>
+              <a:t>https://neu-se.github.io/CS4530-CS5500-Spring-2021</a:t>
+            </a:r>
+            <a:r>
+              <a:rPr lang="en-US" dirty="0"/>
+              <a:t>)</a:t>
+            </a:r>
+          </a:p>
+          <a:p>
+            <a:r>
+              <a:rPr lang="en-US" dirty="0"/>
+              <a:t>Canvas</a:t>
+            </a:r>
+          </a:p>
+          <a:p>
+            <a:pPr lvl="1"/>
+            <a:r>
+              <a:rPr lang="en-US" dirty="0"/>
+              <a:t>Canvas will mirror the course web site.</a:t>
+            </a:r>
+          </a:p>
+          <a:p>
+            <a:r>
+              <a:rPr lang="en-US" dirty="0"/>
+              <a:t>Piazza </a:t>
+            </a:r>
+          </a:p>
+          <a:p>
+            <a:pPr lvl="1"/>
+            <a:r>
+              <a:rPr lang="en-US" dirty="0"/>
+              <a:t>for questions about assignments, etc.</a:t>
+            </a:r>
+          </a:p>
+          <a:p>
+            <a:r>
+              <a:rPr lang="en-US" dirty="0"/>
+              <a:t>Slack (</a:t>
+            </a:r>
+            <a:r>
+              <a:rPr lang="en-US" dirty="0">
+                <a:hlinkClick r:id="rId3" action="ppaction://hlinkfile"/>
+              </a:rPr>
+              <a:t>nusespring2021.slack.com</a:t>
+            </a:r>
+            <a:r>
+              <a:rPr lang="en-US" dirty="0"/>
+              <a:t>)</a:t>
+            </a:r>
+          </a:p>
+          <a:p>
+            <a:pPr lvl="1"/>
+            <a:r>
+              <a:rPr lang="en-US" dirty="0"/>
+              <a:t>for more general discussions</a:t>
+            </a:r>
+          </a:p>
+          <a:p>
+            <a:pPr lvl="1"/>
+            <a:r>
+              <a:rPr lang="en-US" dirty="0"/>
+              <a:t># ta-office-hours</a:t>
+            </a:r>
+          </a:p>
+          <a:p>
+            <a:pPr lvl="1"/>
+            <a:r>
+              <a:rPr lang="en-US" dirty="0"/>
+              <a:t>knowledge-sharing (within the limits of the Academic Integrity Policy)</a:t>
+            </a:r>
+          </a:p>
+          <a:p>
+            <a:pPr lvl="1"/>
+            <a:r>
+              <a:rPr lang="en-US" dirty="0"/>
+              <a:t>whatever else you might want (within the limits of the Code of Student Conduct)</a:t>
+            </a:r>
           </a:p>
         </p:txBody>
       </p:sp>
@@ -7060,7 +6003,7 @@
           <p:cNvPr id="4" name="Slide Number Placeholder 3">
             <a:extLst>
               <a:ext uri="{FF2B5EF4-FFF2-40B4-BE49-F238E27FC236}">
-                <a16:creationId xmlns:a16="http://schemas.microsoft.com/office/drawing/2014/main" id="{029F4CD0-81FE-44FE-8578-30C4BC3B01DA}"/>
+                <a16:creationId xmlns:a16="http://schemas.microsoft.com/office/drawing/2014/main" id="{66441BF3-B319-4719-9933-B7B7F3244E64}"/>
               </a:ext>
             </a:extLst>
           </p:cNvPr>
@@ -7089,7 +6032,7 @@
           <p:cNvPr id="5" name="Rectangle 4">
             <a:extLst>
               <a:ext uri="{FF2B5EF4-FFF2-40B4-BE49-F238E27FC236}">
-                <a16:creationId xmlns:a16="http://schemas.microsoft.com/office/drawing/2014/main" id="{45319972-F4F0-4294-BCB6-43ECE67C6E78}"/>
+                <a16:creationId xmlns:a16="http://schemas.microsoft.com/office/drawing/2014/main" id="{47871147-8AA3-43D8-ABC2-359A0A2A51FF}"/>
               </a:ext>
             </a:extLst>
           </p:cNvPr>
@@ -7098,72 +6041,8 @@
         </p:nvSpPr>
         <p:spPr>
           <a:xfrm>
-            <a:off x="9093739" y="1593850"/>
-            <a:ext cx="2177511" cy="1773158"/>
-          </a:xfrm>
-          <a:prstGeom prst="rect">
-            <a:avLst/>
-          </a:prstGeom>
-          <a:solidFill>
-            <a:schemeClr val="accent2">
-              <a:lumMod val="20000"/>
-              <a:lumOff val="80000"/>
-            </a:schemeClr>
-          </a:solidFill>
-          <a:ln>
-            <a:solidFill>
-              <a:srgbClr val="0070C0"/>
-            </a:solidFill>
-          </a:ln>
-        </p:spPr>
-        <p:style>
-          <a:lnRef idx="2">
-            <a:schemeClr val="accent1">
-              <a:shade val="50000"/>
-            </a:schemeClr>
-          </a:lnRef>
-          <a:fillRef idx="1">
-            <a:schemeClr val="accent1"/>
-          </a:fillRef>
-          <a:effectRef idx="0">
-            <a:schemeClr val="accent1"/>
-          </a:effectRef>
-          <a:fontRef idx="minor">
-            <a:schemeClr val="lt1"/>
-          </a:fontRef>
-        </p:style>
-        <p:txBody>
-          <a:bodyPr rtlCol="0" anchor="t"/>
-          <a:lstStyle/>
-          <a:p>
-            <a:r>
-              <a:rPr lang="en-US" b="1" dirty="0">
-                <a:solidFill>
-                  <a:schemeClr val="tx1"/>
-                </a:solidFill>
-                <a:latin typeface="Ink Free" panose="03080402000500000000" pitchFamily="66" charset="0"/>
-              </a:rPr>
-              <a:t>Go look up "ordinal data" on the internet.  It's an important but underappreciated concept.</a:t>
-            </a:r>
-          </a:p>
-        </p:txBody>
-      </p:sp>
-      <p:sp>
-        <p:nvSpPr>
-          <p:cNvPr id="6" name="Rectangle 5">
-            <a:extLst>
-              <a:ext uri="{FF2B5EF4-FFF2-40B4-BE49-F238E27FC236}">
-                <a16:creationId xmlns:a16="http://schemas.microsoft.com/office/drawing/2014/main" id="{2392B067-8E48-4CA3-8427-DC790D014045}"/>
-              </a:ext>
-            </a:extLst>
-          </p:cNvPr>
-          <p:cNvSpPr/>
-          <p:nvPr/>
-        </p:nvSpPr>
-        <p:spPr>
-          <a:xfrm>
-            <a:off x="3485332" y="3185502"/>
-            <a:ext cx="6010361" cy="3170848"/>
+            <a:off x="8725546" y="1848670"/>
+            <a:ext cx="3086019" cy="1325563"/>
           </a:xfrm>
           <a:prstGeom prst="rect">
             <a:avLst/>
@@ -7189,82 +6068,27 @@
           </a:fontRef>
         </p:style>
         <p:txBody>
-          <a:bodyPr rtlCol="0" anchor="t"/>
-          <a:lstStyle/>
-          <a:p>
+          <a:bodyPr rtlCol="0" anchor="ctr"/>
+          <a:lstStyle/>
+          <a:p>
+            <a:pPr algn="ctr"/>
             <a:r>
               <a:rPr lang="en-US" sz="2400" dirty="0">
                 <a:solidFill>
                   <a:sysClr val="windowText" lastClr="000000"/>
                 </a:solidFill>
               </a:rPr>
-              <a:t>Last term, the grading algorithm was: </a:t>
-            </a:r>
-          </a:p>
-          <a:p>
-            <a:pPr marL="342900" indent="-342900">
-              <a:buFont typeface="Arial" panose="020B0604020202020204" pitchFamily="34" charset="0"/>
-              <a:buChar char="•"/>
-            </a:pPr>
-            <a:r>
-              <a:rPr lang="en-US" sz="2400" dirty="0">
-                <a:solidFill>
-                  <a:sysClr val="windowText" lastClr="000000"/>
-                </a:solidFill>
-              </a:rPr>
-              <a:t>must get 90% of the available satisfactory points to get an A</a:t>
-            </a:r>
-          </a:p>
-          <a:p>
-            <a:pPr marL="342900" indent="-342900">
-              <a:buFont typeface="Arial" panose="020B0604020202020204" pitchFamily="34" charset="0"/>
-              <a:buChar char="•"/>
-            </a:pPr>
-            <a:r>
-              <a:rPr lang="en-US" sz="2400" dirty="0">
-                <a:solidFill>
-                  <a:sysClr val="windowText" lastClr="000000"/>
-                </a:solidFill>
-              </a:rPr>
-              <a:t>Otherwise, students were ranked based on (Sat + 0.5*Minimal)</a:t>
-            </a:r>
-          </a:p>
-          <a:p>
-            <a:pPr marL="342900" indent="-342900">
-              <a:buFont typeface="Arial" panose="020B0604020202020204" pitchFamily="34" charset="0"/>
-              <a:buChar char="•"/>
-            </a:pPr>
-            <a:r>
-              <a:rPr lang="en-US" sz="2400" dirty="0">
-                <a:solidFill>
-                  <a:sysClr val="windowText" lastClr="000000"/>
-                </a:solidFill>
-              </a:rPr>
-              <a:t>How much of this should we keep?</a:t>
-            </a:r>
-          </a:p>
-          <a:p>
-            <a:pPr marL="342900" indent="-342900">
-              <a:buFont typeface="Arial" panose="020B0604020202020204" pitchFamily="34" charset="0"/>
-              <a:buChar char="•"/>
-            </a:pPr>
-            <a:r>
-              <a:rPr lang="en-US" sz="2400" dirty="0">
-                <a:solidFill>
-                  <a:sysClr val="windowText" lastClr="000000"/>
-                </a:solidFill>
-              </a:rPr>
-              <a:t>How much of this should we tell the students?</a:t>
-            </a:r>
-          </a:p>
-        </p:txBody>
-      </p:sp>
-      <p:sp>
-        <p:nvSpPr>
-          <p:cNvPr id="7" name="Cross 6">
-            <a:extLst>
-              <a:ext uri="{FF2B5EF4-FFF2-40B4-BE49-F238E27FC236}">
-                <a16:creationId xmlns:a16="http://schemas.microsoft.com/office/drawing/2014/main" id="{1C4AC046-E9BA-4EE7-9078-0773BA16929A}"/>
+              <a:t>Need to set up these pages and update the slide.</a:t>
+            </a:r>
+          </a:p>
+        </p:txBody>
+      </p:sp>
+      <p:sp>
+        <p:nvSpPr>
+          <p:cNvPr id="7" name="Rectangle 6">
+            <a:extLst>
+              <a:ext uri="{FF2B5EF4-FFF2-40B4-BE49-F238E27FC236}">
+                <a16:creationId xmlns:a16="http://schemas.microsoft.com/office/drawing/2014/main" id="{0B9A4528-889E-4992-A90F-18D2FF8F8450}"/>
               </a:ext>
             </a:extLst>
           </p:cNvPr>
@@ -7272,14 +6096,12 @@
           <p:nvPr/>
         </p:nvSpPr>
         <p:spPr>
-          <a:xfrm rot="18736354">
-            <a:off x="3376246" y="1071470"/>
-            <a:ext cx="4825218" cy="4516773"/>
+          <a:xfrm>
+            <a:off x="8725546" y="3522743"/>
+            <a:ext cx="3086019" cy="1325563"/>
           </a:xfrm>
-          <a:prstGeom prst="plus">
-            <a:avLst>
-              <a:gd name="adj" fmla="val 43532"/>
-            </a:avLst>
+          <a:prstGeom prst="rect">
+            <a:avLst/>
           </a:prstGeom>
           <a:solidFill>
             <a:srgbClr val="FFFF00"/>
@@ -7306,18 +6128,21 @@
           <a:lstStyle/>
           <a:p>
             <a:pPr algn="ctr"/>
-            <a:endParaRPr lang="en-US" sz="2400" dirty="0">
-              <a:solidFill>
-                <a:sysClr val="windowText" lastClr="000000"/>
-              </a:solidFill>
-            </a:endParaRPr>
+            <a:r>
+              <a:rPr lang="en-US" sz="2400" dirty="0">
+                <a:solidFill>
+                  <a:sysClr val="windowText" lastClr="000000"/>
+                </a:solidFill>
+              </a:rPr>
+              <a:t>Slack for Wand section only.</a:t>
+            </a:r>
           </a:p>
         </p:txBody>
       </p:sp>
     </p:spTree>
     <p:extLst>
       <p:ext uri="{BB962C8B-B14F-4D97-AF65-F5344CB8AC3E}">
-        <p14:creationId xmlns:p14="http://schemas.microsoft.com/office/powerpoint/2010/main" val="4225377698"/>
+        <p14:creationId xmlns:p14="http://schemas.microsoft.com/office/powerpoint/2010/main" val="2855917600"/>
       </p:ext>
     </p:extLst>
   </p:cSld>
@@ -7346,8 +6171,14 @@
       </p:grpSpPr>
       <p:sp>
         <p:nvSpPr>
-          <p:cNvPr id="253" name="Grade Appeal Policy"/>
-          <p:cNvSpPr txBox="1">
+          <p:cNvPr id="2" name="Title 1">
+            <a:extLst>
+              <a:ext uri="{FF2B5EF4-FFF2-40B4-BE49-F238E27FC236}">
+                <a16:creationId xmlns:a16="http://schemas.microsoft.com/office/drawing/2014/main" id="{ADDDF7AD-1809-4173-85DB-C6679D1D1171}"/>
+              </a:ext>
+            </a:extLst>
+          </p:cNvPr>
+          <p:cNvSpPr>
             <a:spLocks noGrp="1"/>
           </p:cNvSpPr>
           <p:nvPr>
@@ -7357,31 +6188,25 @@
         <p:spPr/>
         <p:txBody>
           <a:bodyPr/>
-          <a:lstStyle>
-            <a:lvl1pPr>
-              <a:defRPr>
-                <a:solidFill>
-                  <a:srgbClr val="005493"/>
-                </a:solidFill>
-              </a:defRPr>
-            </a:lvl1pPr>
-          </a:lstStyle>
-          <a:p>
-            <a:r>
-              <a:rPr lang="en-US" dirty="0">
-                <a:solidFill>
-                  <a:srgbClr val="0070C0"/>
-                </a:solidFill>
-              </a:rPr>
-              <a:t>Grade Appeal Policy</a:t>
-            </a:r>
-          </a:p>
-        </p:txBody>
-      </p:sp>
-      <p:sp>
-        <p:nvSpPr>
-          <p:cNvPr id="254" name="scores for homeworks/projects/midterms will be final two weeks after it has been returned to you"/>
-          <p:cNvSpPr txBox="1">
+          <a:lstStyle/>
+          <a:p>
+            <a:r>
+              <a:rPr lang="en-US" dirty="0"/>
+              <a:t>Review</a:t>
+            </a:r>
+          </a:p>
+        </p:txBody>
+      </p:sp>
+      <p:sp>
+        <p:nvSpPr>
+          <p:cNvPr id="3" name="Text Placeholder 2">
+            <a:extLst>
+              <a:ext uri="{FF2B5EF4-FFF2-40B4-BE49-F238E27FC236}">
+                <a16:creationId xmlns:a16="http://schemas.microsoft.com/office/drawing/2014/main" id="{2DC04701-46F5-4631-A66B-9AC1D5520E14}"/>
+              </a:ext>
+            </a:extLst>
+          </p:cNvPr>
+          <p:cNvSpPr>
             <a:spLocks noGrp="1"/>
           </p:cNvSpPr>
           <p:nvPr>
@@ -7390,867 +6215,44 @@
         </p:nvSpPr>
         <p:spPr/>
         <p:txBody>
-          <a:bodyPr>
-            <a:normAutofit/>
-          </a:bodyPr>
-          <a:lstStyle>
-            <a:lvl1pPr>
-              <a:defRPr>
-                <a:solidFill>
-                  <a:srgbClr val="000000"/>
-                </a:solidFill>
-              </a:defRPr>
-            </a:lvl1pPr>
-          </a:lstStyle>
-          <a:p>
-            <a:r>
-              <a:rPr lang="en-US" dirty="0"/>
-              <a:t>If you have concerns regarding the grading of your work, please let us know right away by opening a regrade request in </a:t>
-            </a:r>
-            <a:r>
-              <a:rPr lang="en-US" dirty="0" err="1"/>
-              <a:t>GradeScope</a:t>
-            </a:r>
-            <a:r>
-              <a:rPr lang="en-US" dirty="0"/>
-              <a:t>. </a:t>
+          <a:bodyPr/>
+          <a:lstStyle/>
+          <a:p>
+            <a:r>
+              <a:rPr lang="en-US" dirty="0"/>
+              <a:t>Now that you've studied this lesson, you should be able to:</a:t>
             </a:r>
           </a:p>
           <a:p>
             <a:pPr lvl="1"/>
             <a:r>
               <a:rPr lang="en-US" dirty="0"/>
-              <a:t>Do </a:t>
-            </a:r>
-            <a:r>
-              <a:rPr lang="en-US" dirty="0">
-                <a:solidFill>
-                  <a:srgbClr val="FF0000"/>
-                </a:solidFill>
-              </a:rPr>
-              <a:t>not</a:t>
-            </a:r>
-            <a:r>
-              <a:rPr lang="en-US" dirty="0"/>
-              <a:t> post on Piazza or email your TA or instructor </a:t>
-            </a:r>
-          </a:p>
-          <a:p>
-            <a:pPr lvl="2"/>
-            <a:r>
-              <a:rPr lang="en-US" dirty="0" err="1"/>
-              <a:t>GradeScope</a:t>
-            </a:r>
-            <a:r>
-              <a:rPr lang="en-US" dirty="0"/>
-              <a:t> provides an interface that allows us to review all regrade requests in one place. </a:t>
+              <a:t>Explain what SE is and why it’s important</a:t>
             </a:r>
           </a:p>
           <a:p>
             <a:pPr lvl="1"/>
             <a:r>
               <a:rPr lang="en-US" dirty="0"/>
-              <a:t>All regrade requests must be submitted within 7 days from your receipt of the graded work.</a:t>
+              <a:t>List your weekly obligations as a student</a:t>
             </a:r>
           </a:p>
           <a:p>
             <a:pPr lvl="1"/>
             <a:r>
               <a:rPr lang="en-US" dirty="0"/>
-              <a:t>If your regrade request is closed and you feel that the response was not satisfactory, you may appeal to the instructor via email within 48 hours </a:t>
-            </a:r>
-          </a:p>
-        </p:txBody>
-      </p:sp>
-      <p:sp>
-        <p:nvSpPr>
-          <p:cNvPr id="255" name="Slide Number"/>
-          <p:cNvSpPr txBox="1">
-            <a:spLocks noGrp="1"/>
-          </p:cNvSpPr>
-          <p:nvPr>
-            <p:ph type="sldNum" sz="quarter" idx="12"/>
-          </p:nvPr>
-        </p:nvSpPr>
-        <p:spPr/>
-        <p:txBody>
-          <a:bodyPr/>
-          <a:lstStyle/>
-          <a:p>
-            <a:fld id="{86CB4B4D-7CA3-9044-876B-883B54F8677D}" type="slidenum">
-              <a:rPr lang="en-US"/>
-              <a:pPr/>
-              <a:t>19</a:t>
-            </a:fld>
-            <a:endParaRPr lang="en-US"/>
-          </a:p>
-        </p:txBody>
-      </p:sp>
-    </p:spTree>
-  </p:cSld>
-  <p:clrMapOvr>
-    <a:masterClrMapping/>
-  </p:clrMapOvr>
-</p:sld>
-</file>
-
-<file path=ppt/slides/slide2.xml><?xml version="1.0" encoding="utf-8"?>
-<p:sld xmlns:a="http://schemas.openxmlformats.org/drawingml/2006/main" xmlns:r="http://schemas.openxmlformats.org/officeDocument/2006/relationships" xmlns:p="http://schemas.openxmlformats.org/presentationml/2006/main">
-  <p:cSld>
-    <p:spTree>
-      <p:nvGrpSpPr>
-        <p:cNvPr id="1" name=""/>
-        <p:cNvGrpSpPr/>
-        <p:nvPr/>
-      </p:nvGrpSpPr>
-      <p:grpSpPr>
-        <a:xfrm>
-          <a:off x="0" y="0"/>
-          <a:ext cx="0" cy="0"/>
-          <a:chOff x="0" y="0"/>
-          <a:chExt cx="0" cy="0"/>
-        </a:xfrm>
-      </p:grpSpPr>
-      <p:sp>
-        <p:nvSpPr>
-          <p:cNvPr id="136" name="Teaching Assistants"/>
-          <p:cNvSpPr txBox="1">
-            <a:spLocks noGrp="1"/>
-          </p:cNvSpPr>
-          <p:nvPr>
-            <p:ph type="title"/>
-          </p:nvPr>
-        </p:nvSpPr>
-        <p:spPr/>
-        <p:txBody>
-          <a:bodyPr/>
-          <a:lstStyle>
-            <a:lvl1pPr>
-              <a:defRPr>
-                <a:solidFill>
-                  <a:srgbClr val="005493"/>
-                </a:solidFill>
-              </a:defRPr>
-            </a:lvl1pPr>
-          </a:lstStyle>
-          <a:p>
-            <a:r>
-              <a:rPr lang="en-US" dirty="0">
-                <a:solidFill>
-                  <a:srgbClr val="0070C0"/>
-                </a:solidFill>
-              </a:rPr>
-              <a:t>Instructors</a:t>
-            </a:r>
-          </a:p>
-        </p:txBody>
-      </p:sp>
-      <p:sp>
-        <p:nvSpPr>
-          <p:cNvPr id="12" name="Content Placeholder 11">
-            <a:extLst>
-              <a:ext uri="{FF2B5EF4-FFF2-40B4-BE49-F238E27FC236}">
-                <a16:creationId xmlns:a16="http://schemas.microsoft.com/office/drawing/2014/main" id="{3DB4E3D8-144E-46A9-87CA-BAA8820EA13A}"/>
-              </a:ext>
-            </a:extLst>
-          </p:cNvPr>
-          <p:cNvSpPr>
-            <a:spLocks noGrp="1"/>
-          </p:cNvSpPr>
-          <p:nvPr>
-            <p:ph idx="1"/>
-          </p:nvPr>
-        </p:nvSpPr>
-        <p:spPr/>
-        <p:txBody>
-          <a:bodyPr/>
-          <a:lstStyle/>
-          <a:p>
-            <a:endParaRPr lang="en-US"/>
-          </a:p>
-        </p:txBody>
-      </p:sp>
-      <p:sp>
-        <p:nvSpPr>
-          <p:cNvPr id="138" name="Slide Number"/>
-          <p:cNvSpPr txBox="1">
-            <a:spLocks noGrp="1"/>
-          </p:cNvSpPr>
-          <p:nvPr>
-            <p:ph type="sldNum" sz="quarter" idx="12"/>
-          </p:nvPr>
-        </p:nvSpPr>
-        <p:spPr/>
-        <p:txBody>
-          <a:bodyPr/>
-          <a:lstStyle/>
-          <a:p>
-            <a:fld id="{86CB4B4D-7CA3-9044-876B-883B54F8677D}" type="slidenum">
-              <a:rPr lang="en-US"/>
-              <a:pPr/>
-              <a:t>2</a:t>
-            </a:fld>
-            <a:endParaRPr lang="en-US"/>
-          </a:p>
-        </p:txBody>
-      </p:sp>
-      <p:pic>
-        <p:nvPicPr>
-          <p:cNvPr id="9" name="IMG_5509.jpeg" descr="IMG_5509.jpeg">
-            <a:extLst>
-              <a:ext uri="{FF2B5EF4-FFF2-40B4-BE49-F238E27FC236}">
-                <a16:creationId xmlns:a16="http://schemas.microsoft.com/office/drawing/2014/main" id="{AD459D4D-1C7C-43C4-9D61-8EB4894662B2}"/>
-              </a:ext>
-            </a:extLst>
-          </p:cNvPr>
-          <p:cNvPicPr>
-            <a:picLocks noChangeAspect="1"/>
-          </p:cNvPicPr>
-          <p:nvPr/>
-        </p:nvPicPr>
-        <p:blipFill rotWithShape="1">
-          <a:blip r:embed="rId2"/>
-          <a:srcRect r="23587"/>
-          <a:stretch/>
-        </p:blipFill>
-        <p:spPr>
-          <a:xfrm>
-            <a:off x="7827065" y="1961620"/>
-            <a:ext cx="2883643" cy="2934762"/>
-          </a:xfrm>
-          <a:prstGeom prst="rect">
-            <a:avLst/>
-          </a:prstGeom>
-          <a:ln w="12700">
-            <a:miter lim="400000"/>
-          </a:ln>
-        </p:spPr>
-      </p:pic>
-      <p:pic>
-        <p:nvPicPr>
-          <p:cNvPr id="10" name="Picture 4" descr="[Mitch 2007-12]">
-            <a:extLst>
-              <a:ext uri="{FF2B5EF4-FFF2-40B4-BE49-F238E27FC236}">
-                <a16:creationId xmlns:a16="http://schemas.microsoft.com/office/drawing/2014/main" id="{1D9765B5-3C73-4797-A776-47F1903B9235}"/>
-              </a:ext>
-            </a:extLst>
-          </p:cNvPr>
-          <p:cNvPicPr>
-            <a:picLocks noChangeAspect="1" noChangeArrowheads="1"/>
-          </p:cNvPicPr>
-          <p:nvPr/>
-        </p:nvPicPr>
-        <p:blipFill>
-          <a:blip r:embed="rId3">
-            <a:extLst>
-              <a:ext uri="{28A0092B-C50C-407E-A947-70E740481C1C}">
-                <a14:useLocalDpi xmlns:a14="http://schemas.microsoft.com/office/drawing/2010/main" val="0"/>
-              </a:ext>
-            </a:extLst>
-          </a:blip>
-          <a:srcRect/>
-          <a:stretch>
-            <a:fillRect/>
-          </a:stretch>
-        </p:blipFill>
-        <p:spPr bwMode="auto">
-          <a:xfrm>
-            <a:off x="1257512" y="1961620"/>
-            <a:ext cx="2529968" cy="2934762"/>
-          </a:xfrm>
-          <a:prstGeom prst="rect">
-            <a:avLst/>
-          </a:prstGeom>
-          <a:noFill/>
-          <a:extLst>
-            <a:ext uri="{909E8E84-426E-40DD-AFC4-6F175D3DCCD1}">
-              <a14:hiddenFill xmlns:a14="http://schemas.microsoft.com/office/drawing/2010/main">
-                <a:solidFill>
-                  <a:srgbClr val="FFFFFF"/>
-                </a:solidFill>
-              </a14:hiddenFill>
-            </a:ext>
-          </a:extLst>
-        </p:spPr>
-      </p:pic>
-      <p:sp>
-        <p:nvSpPr>
-          <p:cNvPr id="3" name="TextBox 2">
-            <a:extLst>
-              <a:ext uri="{FF2B5EF4-FFF2-40B4-BE49-F238E27FC236}">
-                <a16:creationId xmlns:a16="http://schemas.microsoft.com/office/drawing/2014/main" id="{81AF1A5E-CF2C-4F6C-AD06-8F79A5F94003}"/>
-              </a:ext>
-            </a:extLst>
-          </p:cNvPr>
-          <p:cNvSpPr txBox="1"/>
-          <p:nvPr/>
-        </p:nvSpPr>
-        <p:spPr>
-          <a:xfrm>
-            <a:off x="1432297" y="5598674"/>
-            <a:ext cx="2180397" cy="500137"/>
-          </a:xfrm>
-          <a:prstGeom prst="rect">
-            <a:avLst/>
-          </a:prstGeom>
-          <a:noFill/>
-          <a:ln w="12700" cap="flat">
-            <a:noFill/>
-            <a:miter lim="400000"/>
-          </a:ln>
-          <a:effectLst/>
-          <a:sp3d/>
-        </p:spPr>
-        <p:style>
-          <a:lnRef idx="0">
-            <a:scrgbClr r="0" g="0" b="0"/>
-          </a:lnRef>
-          <a:fillRef idx="0">
-            <a:scrgbClr r="0" g="0" b="0"/>
-          </a:fillRef>
-          <a:effectRef idx="0">
-            <a:scrgbClr r="0" g="0" b="0"/>
-          </a:effectRef>
-          <a:fontRef idx="none"/>
-        </p:style>
-        <p:txBody>
-          <a:bodyPr rot="0" spcFirstLastPara="1" vertOverflow="overflow" horzOverflow="overflow" vert="horz" wrap="square" lIns="47625" tIns="47625" rIns="47625" bIns="47625" numCol="1" spcCol="38100" rtlCol="0" anchor="ctr">
-            <a:spAutoFit/>
-          </a:bodyPr>
-          <a:lstStyle/>
-          <a:p>
-            <a:r>
-              <a:rPr lang="en-US" sz="2625" dirty="0">
-                <a:latin typeface="Calibri" panose="020F0502020204030204" pitchFamily="34" charset="0"/>
-                <a:cs typeface="Calibri" panose="020F0502020204030204" pitchFamily="34" charset="0"/>
-              </a:rPr>
-              <a:t>Mitch Wand     </a:t>
-            </a:r>
-          </a:p>
-        </p:txBody>
-      </p:sp>
-      <p:sp>
-        <p:nvSpPr>
-          <p:cNvPr id="14" name="TextBox 13">
-            <a:extLst>
-              <a:ext uri="{FF2B5EF4-FFF2-40B4-BE49-F238E27FC236}">
-                <a16:creationId xmlns:a16="http://schemas.microsoft.com/office/drawing/2014/main" id="{1A2C6B78-75B5-4B9F-94DD-D71A7F3DFA6F}"/>
-              </a:ext>
-            </a:extLst>
-          </p:cNvPr>
-          <p:cNvSpPr txBox="1"/>
-          <p:nvPr/>
-        </p:nvSpPr>
-        <p:spPr>
-          <a:xfrm>
-            <a:off x="8178689" y="5598674"/>
-            <a:ext cx="2180397" cy="500137"/>
-          </a:xfrm>
-          <a:prstGeom prst="rect">
-            <a:avLst/>
-          </a:prstGeom>
-          <a:noFill/>
-          <a:ln w="12700" cap="flat">
-            <a:noFill/>
-            <a:miter lim="400000"/>
-          </a:ln>
-          <a:effectLst/>
-          <a:sp3d/>
-        </p:spPr>
-        <p:style>
-          <a:lnRef idx="0">
-            <a:scrgbClr r="0" g="0" b="0"/>
-          </a:lnRef>
-          <a:fillRef idx="0">
-            <a:scrgbClr r="0" g="0" b="0"/>
-          </a:fillRef>
-          <a:effectRef idx="0">
-            <a:scrgbClr r="0" g="0" b="0"/>
-          </a:effectRef>
-          <a:fontRef idx="none"/>
-        </p:style>
-        <p:txBody>
-          <a:bodyPr rot="0" spcFirstLastPara="1" vertOverflow="overflow" horzOverflow="overflow" vert="horz" wrap="square" lIns="47625" tIns="47625" rIns="47625" bIns="47625" numCol="1" spcCol="38100" rtlCol="0" anchor="ctr">
-            <a:spAutoFit/>
-          </a:bodyPr>
-          <a:lstStyle/>
-          <a:p>
-            <a:r>
-              <a:rPr lang="en-US" sz="2625" dirty="0">
-                <a:latin typeface="Calibri" panose="020F0502020204030204" pitchFamily="34" charset="0"/>
-                <a:cs typeface="Calibri" panose="020F0502020204030204" pitchFamily="34" charset="0"/>
-              </a:rPr>
-              <a:t>Jonathan Bell</a:t>
-            </a:r>
-          </a:p>
-        </p:txBody>
-      </p:sp>
-      <p:sp>
-        <p:nvSpPr>
-          <p:cNvPr id="15" name="TextBox 14">
-            <a:extLst>
-              <a:ext uri="{FF2B5EF4-FFF2-40B4-BE49-F238E27FC236}">
-                <a16:creationId xmlns:a16="http://schemas.microsoft.com/office/drawing/2014/main" id="{418EBC79-D586-4EF1-9F65-B76A9E709F75}"/>
-              </a:ext>
-            </a:extLst>
-          </p:cNvPr>
-          <p:cNvSpPr txBox="1"/>
-          <p:nvPr/>
-        </p:nvSpPr>
-        <p:spPr>
-          <a:xfrm>
-            <a:off x="4808186" y="5598674"/>
-            <a:ext cx="2180397" cy="500137"/>
-          </a:xfrm>
-          <a:prstGeom prst="rect">
-            <a:avLst/>
-          </a:prstGeom>
-          <a:noFill/>
-          <a:ln w="12700" cap="flat">
-            <a:noFill/>
-            <a:miter lim="400000"/>
-          </a:ln>
-          <a:effectLst/>
-          <a:sp3d/>
-        </p:spPr>
-        <p:style>
-          <a:lnRef idx="0">
-            <a:scrgbClr r="0" g="0" b="0"/>
-          </a:lnRef>
-          <a:fillRef idx="0">
-            <a:scrgbClr r="0" g="0" b="0"/>
-          </a:fillRef>
-          <a:effectRef idx="0">
-            <a:scrgbClr r="0" g="0" b="0"/>
-          </a:effectRef>
-          <a:fontRef idx="none"/>
-        </p:style>
-        <p:txBody>
-          <a:bodyPr rot="0" spcFirstLastPara="1" vertOverflow="overflow" horzOverflow="overflow" vert="horz" wrap="square" lIns="47625" tIns="47625" rIns="47625" bIns="47625" numCol="1" spcCol="38100" rtlCol="0" anchor="ctr">
-            <a:spAutoFit/>
-          </a:bodyPr>
-          <a:lstStyle/>
-          <a:p>
-            <a:r>
-              <a:rPr lang="en-US" sz="2625" dirty="0">
-                <a:latin typeface="Calibri" panose="020F0502020204030204" pitchFamily="34" charset="0"/>
-                <a:cs typeface="Calibri" panose="020F0502020204030204" pitchFamily="34" charset="0"/>
-              </a:rPr>
-              <a:t>John </a:t>
-            </a:r>
-            <a:r>
-              <a:rPr lang="en-US" sz="2625" dirty="0" err="1">
-                <a:latin typeface="Calibri" panose="020F0502020204030204" pitchFamily="34" charset="0"/>
-                <a:cs typeface="Calibri" panose="020F0502020204030204" pitchFamily="34" charset="0"/>
-              </a:rPr>
-              <a:t>Boyland</a:t>
-            </a:r>
-            <a:endParaRPr lang="en-US" sz="2625" dirty="0">
-              <a:latin typeface="Calibri" panose="020F0502020204030204" pitchFamily="34" charset="0"/>
-              <a:cs typeface="Calibri" panose="020F0502020204030204" pitchFamily="34" charset="0"/>
-            </a:endParaRPr>
-          </a:p>
-        </p:txBody>
-      </p:sp>
-      <p:pic>
-        <p:nvPicPr>
-          <p:cNvPr id="13" name="Picture 2">
-            <a:extLst>
-              <a:ext uri="{FF2B5EF4-FFF2-40B4-BE49-F238E27FC236}">
-                <a16:creationId xmlns:a16="http://schemas.microsoft.com/office/drawing/2014/main" id="{7AE6A8A0-9809-498E-A012-940833AD0FFE}"/>
-              </a:ext>
-            </a:extLst>
-          </p:cNvPr>
-          <p:cNvPicPr>
-            <a:picLocks noChangeAspect="1" noChangeArrowheads="1"/>
-          </p:cNvPicPr>
-          <p:nvPr/>
-        </p:nvPicPr>
-        <p:blipFill rotWithShape="1">
-          <a:blip r:embed="rId4">
-            <a:extLst>
-              <a:ext uri="{28A0092B-C50C-407E-A947-70E740481C1C}">
-                <a14:useLocalDpi xmlns:a14="http://schemas.microsoft.com/office/drawing/2010/main" val="0"/>
-              </a:ext>
-            </a:extLst>
-          </a:blip>
-          <a:srcRect l="18273" r="15060"/>
-          <a:stretch/>
-        </p:blipFill>
-        <p:spPr bwMode="auto">
-          <a:xfrm>
-            <a:off x="4322998" y="1961620"/>
-            <a:ext cx="2968549" cy="2968550"/>
-          </a:xfrm>
-          <a:prstGeom prst="rect">
-            <a:avLst/>
-          </a:prstGeom>
-          <a:noFill/>
-          <a:extLst>
-            <a:ext uri="{909E8E84-426E-40DD-AFC4-6F175D3DCCD1}">
-              <a14:hiddenFill xmlns:a14="http://schemas.microsoft.com/office/drawing/2010/main">
-                <a:solidFill>
-                  <a:srgbClr val="FFFFFF"/>
-                </a:solidFill>
-              </a14:hiddenFill>
-            </a:ext>
-          </a:extLst>
-        </p:spPr>
-      </p:pic>
-      <p:sp>
-        <p:nvSpPr>
-          <p:cNvPr id="2" name="Rectangle 1">
-            <a:extLst>
-              <a:ext uri="{FF2B5EF4-FFF2-40B4-BE49-F238E27FC236}">
-                <a16:creationId xmlns:a16="http://schemas.microsoft.com/office/drawing/2014/main" id="{36F06EAC-AD07-4E62-A4C9-0BCB2A62EF72}"/>
-              </a:ext>
-            </a:extLst>
-          </p:cNvPr>
-          <p:cNvSpPr/>
-          <p:nvPr/>
-        </p:nvSpPr>
-        <p:spPr>
-          <a:xfrm>
-            <a:off x="7624689" y="647114"/>
-            <a:ext cx="3086019" cy="1325563"/>
-          </a:xfrm>
-          <a:prstGeom prst="rect">
-            <a:avLst/>
-          </a:prstGeom>
-          <a:solidFill>
-            <a:srgbClr val="FFFF00"/>
-          </a:solidFill>
-        </p:spPr>
-        <p:style>
-          <a:lnRef idx="2">
-            <a:schemeClr val="accent1">
-              <a:shade val="50000"/>
-            </a:schemeClr>
-          </a:lnRef>
-          <a:fillRef idx="1">
-            <a:schemeClr val="accent1"/>
-          </a:fillRef>
-          <a:effectRef idx="0">
-            <a:schemeClr val="accent1"/>
-          </a:effectRef>
-          <a:fontRef idx="minor">
-            <a:schemeClr val="lt1"/>
-          </a:fontRef>
-        </p:style>
-        <p:txBody>
-          <a:bodyPr rtlCol="0" anchor="ctr"/>
-          <a:lstStyle/>
-          <a:p>
-            <a:pPr algn="ctr"/>
-            <a:r>
-              <a:rPr lang="en-US" sz="2400" dirty="0">
-                <a:solidFill>
-                  <a:sysClr val="windowText" lastClr="000000"/>
-                </a:solidFill>
-              </a:rPr>
-              <a:t>Need New Pix</a:t>
-            </a:r>
-          </a:p>
-        </p:txBody>
-      </p:sp>
-    </p:spTree>
-    <p:extLst>
-      <p:ext uri="{BB962C8B-B14F-4D97-AF65-F5344CB8AC3E}">
-        <p14:creationId xmlns:p14="http://schemas.microsoft.com/office/powerpoint/2010/main" val="3774186933"/>
-      </p:ext>
-    </p:extLst>
-  </p:cSld>
-  <p:clrMapOvr>
-    <a:masterClrMapping/>
-  </p:clrMapOvr>
-</p:sld>
-</file>
-
-<file path=ppt/slides/slide20.xml><?xml version="1.0" encoding="utf-8"?>
-<p:sld xmlns:a="http://schemas.openxmlformats.org/drawingml/2006/main" xmlns:r="http://schemas.openxmlformats.org/officeDocument/2006/relationships" xmlns:p="http://schemas.openxmlformats.org/presentationml/2006/main">
-  <p:cSld>
-    <p:spTree>
-      <p:nvGrpSpPr>
-        <p:cNvPr id="1" name=""/>
-        <p:cNvGrpSpPr/>
-        <p:nvPr/>
-      </p:nvGrpSpPr>
-      <p:grpSpPr>
-        <a:xfrm>
-          <a:off x="0" y="0"/>
-          <a:ext cx="0" cy="0"/>
-          <a:chOff x="0" y="0"/>
-          <a:chExt cx="0" cy="0"/>
-        </a:xfrm>
-      </p:grpSpPr>
-      <p:sp>
-        <p:nvSpPr>
-          <p:cNvPr id="257" name="Late Policy"/>
-          <p:cNvSpPr txBox="1">
-            <a:spLocks noGrp="1"/>
-          </p:cNvSpPr>
-          <p:nvPr>
-            <p:ph type="title"/>
-          </p:nvPr>
-        </p:nvSpPr>
-        <p:spPr/>
-        <p:txBody>
-          <a:bodyPr/>
-          <a:lstStyle>
-            <a:lvl1pPr>
-              <a:defRPr>
-                <a:solidFill>
-                  <a:srgbClr val="005493"/>
-                </a:solidFill>
-              </a:defRPr>
-            </a:lvl1pPr>
-          </a:lstStyle>
-          <a:p>
-            <a:r>
-              <a:rPr lang="en-US" dirty="0">
-                <a:solidFill>
-                  <a:srgbClr val="0070C0"/>
-                </a:solidFill>
-              </a:rPr>
-              <a:t>Late Policy</a:t>
-            </a:r>
-          </a:p>
-        </p:txBody>
-      </p:sp>
-      <p:sp>
-        <p:nvSpPr>
-          <p:cNvPr id="258" name="Your work is late if it is not turned in by the deadline. The official clock is the time on the submission tool (github.ccs.neu.edu).…"/>
-          <p:cNvSpPr txBox="1">
-            <a:spLocks noGrp="1"/>
-          </p:cNvSpPr>
-          <p:nvPr>
-            <p:ph idx="1"/>
-          </p:nvPr>
-        </p:nvSpPr>
-        <p:spPr/>
-        <p:txBody>
-          <a:bodyPr>
-            <a:normAutofit/>
-          </a:bodyPr>
-          <a:lstStyle/>
-          <a:p>
-            <a:r>
-              <a:rPr lang="en-US" dirty="0"/>
-              <a:t>Your work is late if it is not turned in by the deadline. </a:t>
+              <a:t>List the requirements for completing the course</a:t>
             </a:r>
           </a:p>
           <a:p>
             <a:pPr lvl="1"/>
             <a:r>
               <a:rPr lang="en-US" dirty="0"/>
-              <a:t>10% will be deducted for late HW assignments turned in within 24 hours after the due date </a:t>
-            </a:r>
-          </a:p>
-          <a:p>
-            <a:pPr lvl="1"/>
-            <a:r>
-              <a:rPr lang="en-US" dirty="0"/>
-              <a:t>HW assignments submitted more than 24 hours late will receive a zero.</a:t>
-            </a:r>
-          </a:p>
-          <a:p>
-            <a:pPr lvl="1"/>
-            <a:r>
-              <a:rPr lang="en-US" dirty="0"/>
-              <a:t>If you're worried about being busy around the time of a HW submission, please plan ahead and get started early.</a:t>
-            </a:r>
-          </a:p>
-        </p:txBody>
-      </p:sp>
-      <p:sp>
-        <p:nvSpPr>
-          <p:cNvPr id="259" name="Slide Number"/>
-          <p:cNvSpPr txBox="1">
-            <a:spLocks noGrp="1"/>
-          </p:cNvSpPr>
-          <p:nvPr>
-            <p:ph type="sldNum" sz="quarter" idx="12"/>
-          </p:nvPr>
-        </p:nvSpPr>
-        <p:spPr/>
-        <p:txBody>
-          <a:bodyPr/>
-          <a:lstStyle/>
-          <a:p>
-            <a:fld id="{86CB4B4D-7CA3-9044-876B-883B54F8677D}" type="slidenum">
-              <a:rPr lang="en-US"/>
-              <a:pPr/>
-              <a:t>20</a:t>
-            </a:fld>
-            <a:endParaRPr lang="en-US"/>
-          </a:p>
-        </p:txBody>
-      </p:sp>
-      <p:sp>
-        <p:nvSpPr>
-          <p:cNvPr id="5" name="Rectangle 4">
-            <a:extLst>
-              <a:ext uri="{FF2B5EF4-FFF2-40B4-BE49-F238E27FC236}">
-                <a16:creationId xmlns:a16="http://schemas.microsoft.com/office/drawing/2014/main" id="{7EFC1FC7-C104-4FAE-A681-AECE548B60DA}"/>
-              </a:ext>
-            </a:extLst>
-          </p:cNvPr>
-          <p:cNvSpPr/>
-          <p:nvPr/>
-        </p:nvSpPr>
-        <p:spPr>
-          <a:xfrm>
-            <a:off x="8725546" y="1667983"/>
-            <a:ext cx="3323432" cy="1813771"/>
-          </a:xfrm>
-          <a:prstGeom prst="rect">
-            <a:avLst/>
-          </a:prstGeom>
-          <a:solidFill>
-            <a:srgbClr val="FFFF00"/>
-          </a:solidFill>
-        </p:spPr>
-        <p:style>
-          <a:lnRef idx="2">
-            <a:schemeClr val="accent1">
-              <a:shade val="50000"/>
-            </a:schemeClr>
-          </a:lnRef>
-          <a:fillRef idx="1">
-            <a:schemeClr val="accent1"/>
-          </a:fillRef>
-          <a:effectRef idx="0">
-            <a:schemeClr val="accent1"/>
-          </a:effectRef>
-          <a:fontRef idx="minor">
-            <a:schemeClr val="lt1"/>
-          </a:fontRef>
-        </p:style>
-        <p:txBody>
-          <a:bodyPr rtlCol="0" anchor="ctr"/>
-          <a:lstStyle/>
-          <a:p>
-            <a:pPr algn="ctr"/>
-            <a:r>
-              <a:rPr lang="en-US" sz="2400" dirty="0">
-                <a:solidFill>
-                  <a:sysClr val="windowText" lastClr="000000"/>
-                </a:solidFill>
-              </a:rPr>
-              <a:t>Are we OK with this plan?</a:t>
-            </a:r>
-          </a:p>
-          <a:p>
-            <a:pPr algn="ctr"/>
-            <a:r>
-              <a:rPr lang="en-US" sz="2400" dirty="0">
-                <a:solidFill>
-                  <a:sysClr val="windowText" lastClr="000000"/>
-                </a:solidFill>
-              </a:rPr>
-              <a:t>We had 25% penalty in the Fall.</a:t>
-            </a:r>
-          </a:p>
-        </p:txBody>
-      </p:sp>
-    </p:spTree>
-  </p:cSld>
-  <p:clrMapOvr>
-    <a:masterClrMapping/>
-  </p:clrMapOvr>
-</p:sld>
-</file>
-
-<file path=ppt/slides/slide21.xml><?xml version="1.0" encoding="utf-8"?>
-<p:sld xmlns:a="http://schemas.openxmlformats.org/drawingml/2006/main" xmlns:r="http://schemas.openxmlformats.org/officeDocument/2006/relationships" xmlns:p="http://schemas.openxmlformats.org/presentationml/2006/main">
-  <p:cSld>
-    <p:spTree>
-      <p:nvGrpSpPr>
-        <p:cNvPr id="1" name=""/>
-        <p:cNvGrpSpPr/>
-        <p:nvPr/>
-      </p:nvGrpSpPr>
-      <p:grpSpPr>
-        <a:xfrm>
-          <a:off x="0" y="0"/>
-          <a:ext cx="0" cy="0"/>
-          <a:chOff x="0" y="0"/>
-          <a:chExt cx="0" cy="0"/>
-        </a:xfrm>
-      </p:grpSpPr>
-      <p:sp>
-        <p:nvSpPr>
-          <p:cNvPr id="2" name="Title 1">
-            <a:extLst>
-              <a:ext uri="{FF2B5EF4-FFF2-40B4-BE49-F238E27FC236}">
-                <a16:creationId xmlns:a16="http://schemas.microsoft.com/office/drawing/2014/main" id="{8DAD8E7C-85CF-4AF5-8090-304D54E13733}"/>
-              </a:ext>
-            </a:extLst>
-          </p:cNvPr>
-          <p:cNvSpPr>
-            <a:spLocks noGrp="1"/>
-          </p:cNvSpPr>
-          <p:nvPr>
-            <p:ph type="title"/>
-          </p:nvPr>
-        </p:nvSpPr>
-        <p:spPr/>
-        <p:txBody>
-          <a:bodyPr/>
-          <a:lstStyle/>
-          <a:p>
-            <a:r>
-              <a:rPr lang="en-US" dirty="0"/>
-              <a:t>Academic Integrity (1)</a:t>
-            </a:r>
-          </a:p>
-        </p:txBody>
-      </p:sp>
-      <p:sp>
-        <p:nvSpPr>
-          <p:cNvPr id="3" name="Text Placeholder 2">
-            <a:extLst>
-              <a:ext uri="{FF2B5EF4-FFF2-40B4-BE49-F238E27FC236}">
-                <a16:creationId xmlns:a16="http://schemas.microsoft.com/office/drawing/2014/main" id="{F3F41972-2455-48E2-B0C8-0C2FD08B1049}"/>
-              </a:ext>
-            </a:extLst>
-          </p:cNvPr>
-          <p:cNvSpPr>
-            <a:spLocks noGrp="1"/>
-          </p:cNvSpPr>
-          <p:nvPr>
-            <p:ph idx="1"/>
-          </p:nvPr>
-        </p:nvSpPr>
-        <p:spPr/>
-        <p:txBody>
-          <a:bodyPr>
-            <a:normAutofit fontScale="92500" lnSpcReduction="10000"/>
-          </a:bodyPr>
-          <a:lstStyle/>
-          <a:p>
-            <a:r>
-              <a:rPr lang="en-US" dirty="0"/>
-              <a:t>Students must work individually on all homework assignments.</a:t>
-            </a:r>
-          </a:p>
-          <a:p>
-            <a:r>
-              <a:rPr lang="en-US" dirty="0"/>
-              <a:t>We encourage you to have high-level discussions with other students in the class about the assignments, however, we require that when you turn in an assignment, it is only your work. That is, copying any part of another student's assignment is strictly prohibited.</a:t>
-            </a:r>
-          </a:p>
-          <a:p>
-            <a:r>
-              <a:rPr lang="en-US" dirty="0"/>
-              <a:t>If you steal someone else's work, you fail the class.</a:t>
-            </a:r>
-          </a:p>
-          <a:p>
-            <a:r>
-              <a:rPr lang="en-US" dirty="0"/>
-              <a:t>You are responsible for protecting your work. If someone uses your work, with or without your permission, you fail the class.</a:t>
-            </a:r>
+              <a:t>Explain how assignments will be graded</a:t>
+            </a:r>
+          </a:p>
+          <a:p>
+            <a:endParaRPr lang="en-US" dirty="0"/>
           </a:p>
         </p:txBody>
       </p:sp>
@@ -8259,7 +6261,7 @@
           <p:cNvPr id="4" name="Slide Number Placeholder 3">
             <a:extLst>
               <a:ext uri="{FF2B5EF4-FFF2-40B4-BE49-F238E27FC236}">
-                <a16:creationId xmlns:a16="http://schemas.microsoft.com/office/drawing/2014/main" id="{34D72AC8-7059-4398-976F-9B0E0D6DABC0}"/>
+                <a16:creationId xmlns:a16="http://schemas.microsoft.com/office/drawing/2014/main" id="{9A834773-9D4D-43DB-BE71-9B7317CC3980}"/>
               </a:ext>
             </a:extLst>
           </p:cNvPr>
@@ -8283,614 +6285,7 @@
               <a:pPr defTabSz="547695">
                 <a:defRPr/>
               </a:pPr>
-              <a:t>21</a:t>
-            </a:fld>
-            <a:endParaRPr lang="en-US"/>
-          </a:p>
-        </p:txBody>
-      </p:sp>
-    </p:spTree>
-    <p:extLst>
-      <p:ext uri="{BB962C8B-B14F-4D97-AF65-F5344CB8AC3E}">
-        <p14:creationId xmlns:p14="http://schemas.microsoft.com/office/powerpoint/2010/main" val="4223183005"/>
-      </p:ext>
-    </p:extLst>
-  </p:cSld>
-  <p:clrMapOvr>
-    <a:masterClrMapping/>
-  </p:clrMapOvr>
-</p:sld>
-</file>
-
-<file path=ppt/slides/slide22.xml><?xml version="1.0" encoding="utf-8"?>
-<p:sld xmlns:a="http://schemas.openxmlformats.org/drawingml/2006/main" xmlns:r="http://schemas.openxmlformats.org/officeDocument/2006/relationships" xmlns:p="http://schemas.openxmlformats.org/presentationml/2006/main">
-  <p:cSld>
-    <p:spTree>
-      <p:nvGrpSpPr>
-        <p:cNvPr id="1" name=""/>
-        <p:cNvGrpSpPr/>
-        <p:nvPr/>
-      </p:nvGrpSpPr>
-      <p:grpSpPr>
-        <a:xfrm>
-          <a:off x="0" y="0"/>
-          <a:ext cx="0" cy="0"/>
-          <a:chOff x="0" y="0"/>
-          <a:chExt cx="0" cy="0"/>
-        </a:xfrm>
-      </p:grpSpPr>
-      <p:sp>
-        <p:nvSpPr>
-          <p:cNvPr id="2" name="Title 1">
-            <a:extLst>
-              <a:ext uri="{FF2B5EF4-FFF2-40B4-BE49-F238E27FC236}">
-                <a16:creationId xmlns:a16="http://schemas.microsoft.com/office/drawing/2014/main" id="{0C6E9E53-F40E-46F3-8B32-BE0138F441B1}"/>
-              </a:ext>
-            </a:extLst>
-          </p:cNvPr>
-          <p:cNvSpPr>
-            <a:spLocks noGrp="1"/>
-          </p:cNvSpPr>
-          <p:nvPr>
-            <p:ph type="title"/>
-          </p:nvPr>
-        </p:nvSpPr>
-        <p:spPr/>
-        <p:txBody>
-          <a:bodyPr/>
-          <a:lstStyle/>
-          <a:p>
-            <a:r>
-              <a:rPr lang="en-US" dirty="0"/>
-              <a:t>Academic Integrity (2)</a:t>
-            </a:r>
-          </a:p>
-        </p:txBody>
-      </p:sp>
-      <p:sp>
-        <p:nvSpPr>
-          <p:cNvPr id="3" name="Text Placeholder 2">
-            <a:extLst>
-              <a:ext uri="{FF2B5EF4-FFF2-40B4-BE49-F238E27FC236}">
-                <a16:creationId xmlns:a16="http://schemas.microsoft.com/office/drawing/2014/main" id="{9BD682CD-7D52-49E3-A660-C4CB4A35F3AD}"/>
-              </a:ext>
-            </a:extLst>
-          </p:cNvPr>
-          <p:cNvSpPr>
-            <a:spLocks noGrp="1"/>
-          </p:cNvSpPr>
-          <p:nvPr>
-            <p:ph idx="1"/>
-          </p:nvPr>
-        </p:nvSpPr>
-        <p:spPr/>
-        <p:txBody>
-          <a:bodyPr>
-            <a:normAutofit/>
-          </a:bodyPr>
-          <a:lstStyle/>
-          <a:p>
-            <a:r>
-              <a:rPr lang="en-US" dirty="0"/>
-              <a:t>You are free to reuse small snippets of example code found on the Internet (e.g. via </a:t>
-            </a:r>
-            <a:r>
-              <a:rPr lang="en-US" dirty="0" err="1"/>
-              <a:t>StackOverflow</a:t>
-            </a:r>
-            <a:r>
-              <a:rPr lang="en-US" dirty="0"/>
-              <a:t>) provided that it is attributed. </a:t>
-            </a:r>
-          </a:p>
-          <a:p>
-            <a:r>
-              <a:rPr lang="en-US" dirty="0"/>
-              <a:t>If you are concerned that by reusing and attributing that copied code it may appear that you didn't complete the assignment yourself, then please raise a discussion with the instructor.</a:t>
-            </a:r>
-          </a:p>
-          <a:p>
-            <a:r>
-              <a:rPr lang="en-US" dirty="0"/>
-              <a:t> If you are in doubt whether using others' work is allowed, you should assume that it is NOT allowed unless the instructors confirm otherwise.</a:t>
-            </a:r>
-          </a:p>
-          <a:p>
-            <a:endParaRPr lang="en-US" dirty="0"/>
-          </a:p>
-        </p:txBody>
-      </p:sp>
-      <p:sp>
-        <p:nvSpPr>
-          <p:cNvPr id="4" name="Slide Number Placeholder 3">
-            <a:extLst>
-              <a:ext uri="{FF2B5EF4-FFF2-40B4-BE49-F238E27FC236}">
-                <a16:creationId xmlns:a16="http://schemas.microsoft.com/office/drawing/2014/main" id="{B061B1C6-5E6F-4408-9C79-8B3E2C5DE989}"/>
-              </a:ext>
-            </a:extLst>
-          </p:cNvPr>
-          <p:cNvSpPr>
-            <a:spLocks noGrp="1"/>
-          </p:cNvSpPr>
-          <p:nvPr>
-            <p:ph type="sldNum" sz="quarter" idx="12"/>
-          </p:nvPr>
-        </p:nvSpPr>
-        <p:spPr/>
-        <p:txBody>
-          <a:bodyPr/>
-          <a:lstStyle/>
-          <a:p>
-            <a:pPr defTabSz="547695">
-              <a:defRPr/>
-            </a:pPr>
-            <a:fld id="{86CB4B4D-7CA3-9044-876B-883B54F8677D}" type="slidenum">
-              <a:rPr lang="en-US" smtClean="0"/>
-              <a:pPr defTabSz="547695">
-                <a:defRPr/>
-              </a:pPr>
-              <a:t>22</a:t>
-            </a:fld>
-            <a:endParaRPr lang="en-US"/>
-          </a:p>
-        </p:txBody>
-      </p:sp>
-    </p:spTree>
-    <p:extLst>
-      <p:ext uri="{BB962C8B-B14F-4D97-AF65-F5344CB8AC3E}">
-        <p14:creationId xmlns:p14="http://schemas.microsoft.com/office/powerpoint/2010/main" val="1665633817"/>
-      </p:ext>
-    </p:extLst>
-  </p:cSld>
-  <p:clrMapOvr>
-    <a:masterClrMapping/>
-  </p:clrMapOvr>
-</p:sld>
-</file>
-
-<file path=ppt/slides/slide23.xml><?xml version="1.0" encoding="utf-8"?>
-<p:sld xmlns:a="http://schemas.openxmlformats.org/drawingml/2006/main" xmlns:r="http://schemas.openxmlformats.org/officeDocument/2006/relationships" xmlns:p="http://schemas.openxmlformats.org/presentationml/2006/main">
-  <p:cSld>
-    <p:spTree>
-      <p:nvGrpSpPr>
-        <p:cNvPr id="1" name=""/>
-        <p:cNvGrpSpPr/>
-        <p:nvPr/>
-      </p:nvGrpSpPr>
-      <p:grpSpPr>
-        <a:xfrm>
-          <a:off x="0" y="0"/>
-          <a:ext cx="0" cy="0"/>
-          <a:chOff x="0" y="0"/>
-          <a:chExt cx="0" cy="0"/>
-        </a:xfrm>
-      </p:grpSpPr>
-      <p:sp>
-        <p:nvSpPr>
-          <p:cNvPr id="2" name="Title 1">
-            <a:extLst>
-              <a:ext uri="{FF2B5EF4-FFF2-40B4-BE49-F238E27FC236}">
-                <a16:creationId xmlns:a16="http://schemas.microsoft.com/office/drawing/2014/main" id="{1DD99648-CE8F-4E19-953E-8B3920440319}"/>
-              </a:ext>
-            </a:extLst>
-          </p:cNvPr>
-          <p:cNvSpPr>
-            <a:spLocks noGrp="1"/>
-          </p:cNvSpPr>
-          <p:nvPr>
-            <p:ph type="title"/>
-          </p:nvPr>
-        </p:nvSpPr>
-        <p:spPr/>
-        <p:txBody>
-          <a:bodyPr/>
-          <a:lstStyle/>
-          <a:p>
-            <a:r>
-              <a:rPr lang="en-US" dirty="0"/>
-              <a:t>Communication</a:t>
-            </a:r>
-          </a:p>
-        </p:txBody>
-      </p:sp>
-      <p:sp>
-        <p:nvSpPr>
-          <p:cNvPr id="3" name="Content Placeholder 2">
-            <a:extLst>
-              <a:ext uri="{FF2B5EF4-FFF2-40B4-BE49-F238E27FC236}">
-                <a16:creationId xmlns:a16="http://schemas.microsoft.com/office/drawing/2014/main" id="{82CC43D4-82B4-449F-8A4A-151724B1D9F3}"/>
-              </a:ext>
-            </a:extLst>
-          </p:cNvPr>
-          <p:cNvSpPr>
-            <a:spLocks noGrp="1"/>
-          </p:cNvSpPr>
-          <p:nvPr>
-            <p:ph idx="1"/>
-          </p:nvPr>
-        </p:nvSpPr>
-        <p:spPr/>
-        <p:txBody>
-          <a:bodyPr>
-            <a:normAutofit fontScale="92500" lnSpcReduction="20000"/>
-          </a:bodyPr>
-          <a:lstStyle/>
-          <a:p>
-            <a:r>
-              <a:rPr lang="en-US" dirty="0"/>
-              <a:t>Course web page (</a:t>
-            </a:r>
-            <a:r>
-              <a:rPr lang="en-US" dirty="0">
-                <a:hlinkClick r:id="rId2"/>
-              </a:rPr>
-              <a:t>https://neu-se.github.io/CS4530-CS5500-Spring-2021</a:t>
-            </a:r>
-            <a:r>
-              <a:rPr lang="en-US" dirty="0"/>
-              <a:t>)</a:t>
-            </a:r>
-          </a:p>
-          <a:p>
-            <a:r>
-              <a:rPr lang="en-US" dirty="0"/>
-              <a:t>Canvas</a:t>
-            </a:r>
-          </a:p>
-          <a:p>
-            <a:pPr lvl="1"/>
-            <a:r>
-              <a:rPr lang="en-US" dirty="0"/>
-              <a:t>Canvas will mirror the course web site.</a:t>
-            </a:r>
-          </a:p>
-          <a:p>
-            <a:r>
-              <a:rPr lang="en-US" dirty="0"/>
-              <a:t>Piazza </a:t>
-            </a:r>
-          </a:p>
-          <a:p>
-            <a:pPr lvl="1"/>
-            <a:r>
-              <a:rPr lang="en-US" dirty="0"/>
-              <a:t>for questions about assignments, etc.</a:t>
-            </a:r>
-          </a:p>
-          <a:p>
-            <a:r>
-              <a:rPr lang="en-US" dirty="0"/>
-              <a:t>Slack (</a:t>
-            </a:r>
-            <a:r>
-              <a:rPr lang="en-US" dirty="0">
-                <a:hlinkClick r:id="rId3" action="ppaction://hlinkfile"/>
-              </a:rPr>
-              <a:t>nusespring2021.slack.com</a:t>
-            </a:r>
-            <a:r>
-              <a:rPr lang="en-US" dirty="0"/>
-              <a:t>)</a:t>
-            </a:r>
-          </a:p>
-          <a:p>
-            <a:pPr lvl="1"/>
-            <a:r>
-              <a:rPr lang="en-US" dirty="0"/>
-              <a:t>for more general discussions</a:t>
-            </a:r>
-          </a:p>
-          <a:p>
-            <a:pPr lvl="1"/>
-            <a:r>
-              <a:rPr lang="en-US" dirty="0"/>
-              <a:t># ta-office-hours</a:t>
-            </a:r>
-          </a:p>
-          <a:p>
-            <a:pPr lvl="1"/>
-            <a:r>
-              <a:rPr lang="en-US" dirty="0"/>
-              <a:t>knowledge-sharing (within the limits of the Academic Integrity Policy)</a:t>
-            </a:r>
-          </a:p>
-          <a:p>
-            <a:pPr lvl="1"/>
-            <a:r>
-              <a:rPr lang="en-US" dirty="0"/>
-              <a:t>whatever else you might want (within the limits of the Code of Student Conduct)</a:t>
-            </a:r>
-          </a:p>
-        </p:txBody>
-      </p:sp>
-      <p:sp>
-        <p:nvSpPr>
-          <p:cNvPr id="4" name="Slide Number Placeholder 3">
-            <a:extLst>
-              <a:ext uri="{FF2B5EF4-FFF2-40B4-BE49-F238E27FC236}">
-                <a16:creationId xmlns:a16="http://schemas.microsoft.com/office/drawing/2014/main" id="{66441BF3-B319-4719-9933-B7B7F3244E64}"/>
-              </a:ext>
-            </a:extLst>
-          </p:cNvPr>
-          <p:cNvSpPr>
-            <a:spLocks noGrp="1"/>
-          </p:cNvSpPr>
-          <p:nvPr>
-            <p:ph type="sldNum" sz="quarter" idx="12"/>
-          </p:nvPr>
-        </p:nvSpPr>
-        <p:spPr/>
-        <p:txBody>
-          <a:bodyPr/>
-          <a:lstStyle/>
-          <a:p>
-            <a:fld id="{20F37917-FD3A-4669-9018-DA04BCDD3D75}" type="slidenum">
-              <a:rPr lang="en-US" smtClean="0"/>
-              <a:t>23</a:t>
-            </a:fld>
-            <a:endParaRPr lang="en-US"/>
-          </a:p>
-        </p:txBody>
-      </p:sp>
-      <p:sp>
-        <p:nvSpPr>
-          <p:cNvPr id="5" name="Rectangle 4">
-            <a:extLst>
-              <a:ext uri="{FF2B5EF4-FFF2-40B4-BE49-F238E27FC236}">
-                <a16:creationId xmlns:a16="http://schemas.microsoft.com/office/drawing/2014/main" id="{47871147-8AA3-43D8-ABC2-359A0A2A51FF}"/>
-              </a:ext>
-            </a:extLst>
-          </p:cNvPr>
-          <p:cNvSpPr/>
-          <p:nvPr/>
-        </p:nvSpPr>
-        <p:spPr>
-          <a:xfrm>
-            <a:off x="8802918" y="2223657"/>
-            <a:ext cx="3086019" cy="1325563"/>
-          </a:xfrm>
-          <a:prstGeom prst="rect">
-            <a:avLst/>
-          </a:prstGeom>
-          <a:solidFill>
-            <a:srgbClr val="FFFF00"/>
-          </a:solidFill>
-        </p:spPr>
-        <p:style>
-          <a:lnRef idx="2">
-            <a:schemeClr val="accent1">
-              <a:shade val="50000"/>
-            </a:schemeClr>
-          </a:lnRef>
-          <a:fillRef idx="1">
-            <a:schemeClr val="accent1"/>
-          </a:fillRef>
-          <a:effectRef idx="0">
-            <a:schemeClr val="accent1"/>
-          </a:effectRef>
-          <a:fontRef idx="minor">
-            <a:schemeClr val="lt1"/>
-          </a:fontRef>
-        </p:style>
-        <p:txBody>
-          <a:bodyPr rtlCol="0" anchor="ctr"/>
-          <a:lstStyle/>
-          <a:p>
-            <a:pPr algn="ctr"/>
-            <a:r>
-              <a:rPr lang="en-US" sz="2400" dirty="0">
-                <a:solidFill>
-                  <a:sysClr val="windowText" lastClr="000000"/>
-                </a:solidFill>
-              </a:rPr>
-              <a:t>Need to set up these pages and update the slide.</a:t>
-            </a:r>
-          </a:p>
-        </p:txBody>
-      </p:sp>
-      <p:sp>
-        <p:nvSpPr>
-          <p:cNvPr id="6" name="Rectangle 5">
-            <a:extLst>
-              <a:ext uri="{FF2B5EF4-FFF2-40B4-BE49-F238E27FC236}">
-                <a16:creationId xmlns:a16="http://schemas.microsoft.com/office/drawing/2014/main" id="{C4684B82-EE58-479E-8FAE-C2D8932CA8E5}"/>
-              </a:ext>
-            </a:extLst>
-          </p:cNvPr>
-          <p:cNvSpPr/>
-          <p:nvPr/>
-        </p:nvSpPr>
-        <p:spPr>
-          <a:xfrm>
-            <a:off x="8856844" y="3766277"/>
-            <a:ext cx="3086019" cy="1811563"/>
-          </a:xfrm>
-          <a:prstGeom prst="rect">
-            <a:avLst/>
-          </a:prstGeom>
-          <a:solidFill>
-            <a:srgbClr val="FFFF00"/>
-          </a:solidFill>
-        </p:spPr>
-        <p:style>
-          <a:lnRef idx="2">
-            <a:schemeClr val="accent1">
-              <a:shade val="50000"/>
-            </a:schemeClr>
-          </a:lnRef>
-          <a:fillRef idx="1">
-            <a:schemeClr val="accent1"/>
-          </a:fillRef>
-          <a:effectRef idx="0">
-            <a:schemeClr val="accent1"/>
-          </a:effectRef>
-          <a:fontRef idx="minor">
-            <a:schemeClr val="lt1"/>
-          </a:fontRef>
-        </p:style>
-        <p:txBody>
-          <a:bodyPr rtlCol="0" anchor="ctr"/>
-          <a:lstStyle/>
-          <a:p>
-            <a:pPr algn="ctr"/>
-            <a:r>
-              <a:rPr lang="en-US" sz="2400" dirty="0">
-                <a:solidFill>
-                  <a:sysClr val="windowText" lastClr="000000"/>
-                </a:solidFill>
-              </a:rPr>
-              <a:t>Need to make clear which of these channels we expect the students to read.</a:t>
-            </a:r>
-          </a:p>
-        </p:txBody>
-      </p:sp>
-    </p:spTree>
-    <p:extLst>
-      <p:ext uri="{BB962C8B-B14F-4D97-AF65-F5344CB8AC3E}">
-        <p14:creationId xmlns:p14="http://schemas.microsoft.com/office/powerpoint/2010/main" val="2855917600"/>
-      </p:ext>
-    </p:extLst>
-  </p:cSld>
-  <p:clrMapOvr>
-    <a:masterClrMapping/>
-  </p:clrMapOvr>
-</p:sld>
-</file>
-
-<file path=ppt/slides/slide24.xml><?xml version="1.0" encoding="utf-8"?>
-<p:sld xmlns:a="http://schemas.openxmlformats.org/drawingml/2006/main" xmlns:r="http://schemas.openxmlformats.org/officeDocument/2006/relationships" xmlns:p="http://schemas.openxmlformats.org/presentationml/2006/main">
-  <p:cSld>
-    <p:spTree>
-      <p:nvGrpSpPr>
-        <p:cNvPr id="1" name=""/>
-        <p:cNvGrpSpPr/>
-        <p:nvPr/>
-      </p:nvGrpSpPr>
-      <p:grpSpPr>
-        <a:xfrm>
-          <a:off x="0" y="0"/>
-          <a:ext cx="0" cy="0"/>
-          <a:chOff x="0" y="0"/>
-          <a:chExt cx="0" cy="0"/>
-        </a:xfrm>
-      </p:grpSpPr>
-      <p:sp>
-        <p:nvSpPr>
-          <p:cNvPr id="2" name="Title 1">
-            <a:extLst>
-              <a:ext uri="{FF2B5EF4-FFF2-40B4-BE49-F238E27FC236}">
-                <a16:creationId xmlns:a16="http://schemas.microsoft.com/office/drawing/2014/main" id="{ADDDF7AD-1809-4173-85DB-C6679D1D1171}"/>
-              </a:ext>
-            </a:extLst>
-          </p:cNvPr>
-          <p:cNvSpPr>
-            <a:spLocks noGrp="1"/>
-          </p:cNvSpPr>
-          <p:nvPr>
-            <p:ph type="title"/>
-          </p:nvPr>
-        </p:nvSpPr>
-        <p:spPr/>
-        <p:txBody>
-          <a:bodyPr/>
-          <a:lstStyle/>
-          <a:p>
-            <a:r>
-              <a:rPr lang="en-US" dirty="0"/>
-              <a:t>Review</a:t>
-            </a:r>
-          </a:p>
-        </p:txBody>
-      </p:sp>
-      <p:sp>
-        <p:nvSpPr>
-          <p:cNvPr id="3" name="Text Placeholder 2">
-            <a:extLst>
-              <a:ext uri="{FF2B5EF4-FFF2-40B4-BE49-F238E27FC236}">
-                <a16:creationId xmlns:a16="http://schemas.microsoft.com/office/drawing/2014/main" id="{2DC04701-46F5-4631-A66B-9AC1D5520E14}"/>
-              </a:ext>
-            </a:extLst>
-          </p:cNvPr>
-          <p:cNvSpPr>
-            <a:spLocks noGrp="1"/>
-          </p:cNvSpPr>
-          <p:nvPr>
-            <p:ph idx="1"/>
-          </p:nvPr>
-        </p:nvSpPr>
-        <p:spPr/>
-        <p:txBody>
-          <a:bodyPr/>
-          <a:lstStyle/>
-          <a:p>
-            <a:r>
-              <a:rPr lang="en-US" dirty="0"/>
-              <a:t>Now that you've studied this lesson, you should be able to:</a:t>
-            </a:r>
-          </a:p>
-          <a:p>
-            <a:pPr lvl="1"/>
-            <a:r>
-              <a:rPr lang="en-US" dirty="0"/>
-              <a:t>Explain what SE is and why it’s important</a:t>
-            </a:r>
-          </a:p>
-          <a:p>
-            <a:pPr lvl="1"/>
-            <a:r>
-              <a:rPr lang="en-US" dirty="0"/>
-              <a:t>List your weekly obligations as a student</a:t>
-            </a:r>
-          </a:p>
-          <a:p>
-            <a:pPr lvl="1"/>
-            <a:r>
-              <a:rPr lang="en-US" dirty="0"/>
-              <a:t>List the requirements for completing the course</a:t>
-            </a:r>
-          </a:p>
-          <a:p>
-            <a:pPr lvl="1"/>
-            <a:r>
-              <a:rPr lang="en-US" dirty="0"/>
-              <a:t>Explain how assignments will be graded</a:t>
-            </a:r>
-          </a:p>
-          <a:p>
-            <a:endParaRPr lang="en-US" dirty="0"/>
-          </a:p>
-        </p:txBody>
-      </p:sp>
-      <p:sp>
-        <p:nvSpPr>
-          <p:cNvPr id="4" name="Slide Number Placeholder 3">
-            <a:extLst>
-              <a:ext uri="{FF2B5EF4-FFF2-40B4-BE49-F238E27FC236}">
-                <a16:creationId xmlns:a16="http://schemas.microsoft.com/office/drawing/2014/main" id="{9A834773-9D4D-43DB-BE71-9B7317CC3980}"/>
-              </a:ext>
-            </a:extLst>
-          </p:cNvPr>
-          <p:cNvSpPr>
-            <a:spLocks noGrp="1"/>
-          </p:cNvSpPr>
-          <p:nvPr>
-            <p:ph type="sldNum" sz="quarter" idx="12"/>
-          </p:nvPr>
-        </p:nvSpPr>
-        <p:spPr/>
-        <p:txBody>
-          <a:bodyPr/>
-          <a:lstStyle/>
-          <a:p>
-            <a:pPr defTabSz="547695">
-              <a:defRPr/>
-            </a:pPr>
-            <a:fld id="{86CB4B4D-7CA3-9044-876B-883B54F8677D}" type="slidenum">
-              <a:rPr lang="en-US" smtClean="0"/>
-              <a:pPr defTabSz="547695">
-                <a:defRPr/>
-              </a:pPr>
-              <a:t>24</a:t>
+              <a:t>19</a:t>
             </a:fld>
             <a:endParaRPr lang="en-US"/>
           </a:p>
@@ -8973,7 +6368,7 @@
 </p:sld>
 </file>
 
-<file path=ppt/slides/slide25.xml><?xml version="1.0" encoding="utf-8"?>
+<file path=ppt/slides/slide2.xml><?xml version="1.0" encoding="utf-8"?>
 <p:sld xmlns:a="http://schemas.openxmlformats.org/drawingml/2006/main" xmlns:r="http://schemas.openxmlformats.org/officeDocument/2006/relationships" xmlns:p="http://schemas.openxmlformats.org/presentationml/2006/main">
   <p:cSld>
     <p:spTree>
@@ -8992,6 +6387,478 @@
       </p:grpSpPr>
       <p:sp>
         <p:nvSpPr>
+          <p:cNvPr id="136" name="Teaching Assistants"/>
+          <p:cNvSpPr txBox="1">
+            <a:spLocks noGrp="1"/>
+          </p:cNvSpPr>
+          <p:nvPr>
+            <p:ph type="title"/>
+          </p:nvPr>
+        </p:nvSpPr>
+        <p:spPr/>
+        <p:txBody>
+          <a:bodyPr/>
+          <a:lstStyle>
+            <a:lvl1pPr>
+              <a:defRPr>
+                <a:solidFill>
+                  <a:srgbClr val="005493"/>
+                </a:solidFill>
+              </a:defRPr>
+            </a:lvl1pPr>
+          </a:lstStyle>
+          <a:p>
+            <a:r>
+              <a:rPr lang="en-US" dirty="0">
+                <a:solidFill>
+                  <a:srgbClr val="0070C0"/>
+                </a:solidFill>
+              </a:rPr>
+              <a:t>Instructors</a:t>
+            </a:r>
+          </a:p>
+        </p:txBody>
+      </p:sp>
+      <p:sp>
+        <p:nvSpPr>
+          <p:cNvPr id="12" name="Content Placeholder 11">
+            <a:extLst>
+              <a:ext uri="{FF2B5EF4-FFF2-40B4-BE49-F238E27FC236}">
+                <a16:creationId xmlns:a16="http://schemas.microsoft.com/office/drawing/2014/main" id="{3DB4E3D8-144E-46A9-87CA-BAA8820EA13A}"/>
+              </a:ext>
+            </a:extLst>
+          </p:cNvPr>
+          <p:cNvSpPr>
+            <a:spLocks noGrp="1"/>
+          </p:cNvSpPr>
+          <p:nvPr>
+            <p:ph idx="1"/>
+          </p:nvPr>
+        </p:nvSpPr>
+        <p:spPr/>
+        <p:txBody>
+          <a:bodyPr/>
+          <a:lstStyle/>
+          <a:p>
+            <a:endParaRPr lang="en-US"/>
+          </a:p>
+        </p:txBody>
+      </p:sp>
+      <p:sp>
+        <p:nvSpPr>
+          <p:cNvPr id="138" name="Slide Number"/>
+          <p:cNvSpPr txBox="1">
+            <a:spLocks noGrp="1"/>
+          </p:cNvSpPr>
+          <p:nvPr>
+            <p:ph type="sldNum" sz="quarter" idx="12"/>
+          </p:nvPr>
+        </p:nvSpPr>
+        <p:spPr/>
+        <p:txBody>
+          <a:bodyPr/>
+          <a:lstStyle/>
+          <a:p>
+            <a:fld id="{86CB4B4D-7CA3-9044-876B-883B54F8677D}" type="slidenum">
+              <a:rPr lang="en-US"/>
+              <a:pPr/>
+              <a:t>2</a:t>
+            </a:fld>
+            <a:endParaRPr lang="en-US"/>
+          </a:p>
+        </p:txBody>
+      </p:sp>
+      <p:pic>
+        <p:nvPicPr>
+          <p:cNvPr id="9" name="IMG_5509.jpeg" descr="IMG_5509.jpeg">
+            <a:extLst>
+              <a:ext uri="{FF2B5EF4-FFF2-40B4-BE49-F238E27FC236}">
+                <a16:creationId xmlns:a16="http://schemas.microsoft.com/office/drawing/2014/main" id="{AD459D4D-1C7C-43C4-9D61-8EB4894662B2}"/>
+              </a:ext>
+            </a:extLst>
+          </p:cNvPr>
+          <p:cNvPicPr>
+            <a:picLocks noChangeAspect="1"/>
+          </p:cNvPicPr>
+          <p:nvPr/>
+        </p:nvPicPr>
+        <p:blipFill rotWithShape="1">
+          <a:blip r:embed="rId2"/>
+          <a:srcRect r="23587"/>
+          <a:stretch/>
+        </p:blipFill>
+        <p:spPr>
+          <a:xfrm>
+            <a:off x="7827065" y="1961620"/>
+            <a:ext cx="2883643" cy="2934762"/>
+          </a:xfrm>
+          <a:prstGeom prst="rect">
+            <a:avLst/>
+          </a:prstGeom>
+          <a:ln w="12700">
+            <a:miter lim="400000"/>
+          </a:ln>
+        </p:spPr>
+      </p:pic>
+      <p:pic>
+        <p:nvPicPr>
+          <p:cNvPr id="10" name="Picture 4" descr="[Mitch 2007-12]">
+            <a:extLst>
+              <a:ext uri="{FF2B5EF4-FFF2-40B4-BE49-F238E27FC236}">
+                <a16:creationId xmlns:a16="http://schemas.microsoft.com/office/drawing/2014/main" id="{1D9765B5-3C73-4797-A776-47F1903B9235}"/>
+              </a:ext>
+            </a:extLst>
+          </p:cNvPr>
+          <p:cNvPicPr>
+            <a:picLocks noChangeAspect="1" noChangeArrowheads="1"/>
+          </p:cNvPicPr>
+          <p:nvPr/>
+        </p:nvPicPr>
+        <p:blipFill>
+          <a:blip r:embed="rId3">
+            <a:extLst>
+              <a:ext uri="{28A0092B-C50C-407E-A947-70E740481C1C}">
+                <a14:useLocalDpi xmlns:a14="http://schemas.microsoft.com/office/drawing/2010/main" val="0"/>
+              </a:ext>
+            </a:extLst>
+          </a:blip>
+          <a:srcRect/>
+          <a:stretch>
+            <a:fillRect/>
+          </a:stretch>
+        </p:blipFill>
+        <p:spPr bwMode="auto">
+          <a:xfrm>
+            <a:off x="1257512" y="1961620"/>
+            <a:ext cx="2529968" cy="2934762"/>
+          </a:xfrm>
+          <a:prstGeom prst="rect">
+            <a:avLst/>
+          </a:prstGeom>
+          <a:noFill/>
+          <a:extLst>
+            <a:ext uri="{909E8E84-426E-40DD-AFC4-6F175D3DCCD1}">
+              <a14:hiddenFill xmlns:a14="http://schemas.microsoft.com/office/drawing/2010/main">
+                <a:solidFill>
+                  <a:srgbClr val="FFFFFF"/>
+                </a:solidFill>
+              </a14:hiddenFill>
+            </a:ext>
+          </a:extLst>
+        </p:spPr>
+      </p:pic>
+      <p:sp>
+        <p:nvSpPr>
+          <p:cNvPr id="3" name="TextBox 2">
+            <a:extLst>
+              <a:ext uri="{FF2B5EF4-FFF2-40B4-BE49-F238E27FC236}">
+                <a16:creationId xmlns:a16="http://schemas.microsoft.com/office/drawing/2014/main" id="{81AF1A5E-CF2C-4F6C-AD06-8F79A5F94003}"/>
+              </a:ext>
+            </a:extLst>
+          </p:cNvPr>
+          <p:cNvSpPr txBox="1"/>
+          <p:nvPr/>
+        </p:nvSpPr>
+        <p:spPr>
+          <a:xfrm>
+            <a:off x="1432297" y="5598674"/>
+            <a:ext cx="2180397" cy="500137"/>
+          </a:xfrm>
+          <a:prstGeom prst="rect">
+            <a:avLst/>
+          </a:prstGeom>
+          <a:noFill/>
+          <a:ln w="12700" cap="flat">
+            <a:noFill/>
+            <a:miter lim="400000"/>
+          </a:ln>
+          <a:effectLst/>
+          <a:sp3d/>
+        </p:spPr>
+        <p:style>
+          <a:lnRef idx="0">
+            <a:scrgbClr r="0" g="0" b="0"/>
+          </a:lnRef>
+          <a:fillRef idx="0">
+            <a:scrgbClr r="0" g="0" b="0"/>
+          </a:fillRef>
+          <a:effectRef idx="0">
+            <a:scrgbClr r="0" g="0" b="0"/>
+          </a:effectRef>
+          <a:fontRef idx="none"/>
+        </p:style>
+        <p:txBody>
+          <a:bodyPr rot="0" spcFirstLastPara="1" vertOverflow="overflow" horzOverflow="overflow" vert="horz" wrap="square" lIns="47625" tIns="47625" rIns="47625" bIns="47625" numCol="1" spcCol="38100" rtlCol="0" anchor="ctr">
+            <a:spAutoFit/>
+          </a:bodyPr>
+          <a:lstStyle/>
+          <a:p>
+            <a:r>
+              <a:rPr lang="en-US" sz="2625" dirty="0">
+                <a:latin typeface="Calibri" panose="020F0502020204030204" pitchFamily="34" charset="0"/>
+                <a:cs typeface="Calibri" panose="020F0502020204030204" pitchFamily="34" charset="0"/>
+              </a:rPr>
+              <a:t>Mitch Wand     </a:t>
+            </a:r>
+          </a:p>
+        </p:txBody>
+      </p:sp>
+      <p:sp>
+        <p:nvSpPr>
+          <p:cNvPr id="14" name="TextBox 13">
+            <a:extLst>
+              <a:ext uri="{FF2B5EF4-FFF2-40B4-BE49-F238E27FC236}">
+                <a16:creationId xmlns:a16="http://schemas.microsoft.com/office/drawing/2014/main" id="{1A2C6B78-75B5-4B9F-94DD-D71A7F3DFA6F}"/>
+              </a:ext>
+            </a:extLst>
+          </p:cNvPr>
+          <p:cNvSpPr txBox="1"/>
+          <p:nvPr/>
+        </p:nvSpPr>
+        <p:spPr>
+          <a:xfrm>
+            <a:off x="8178689" y="5598674"/>
+            <a:ext cx="2180397" cy="500137"/>
+          </a:xfrm>
+          <a:prstGeom prst="rect">
+            <a:avLst/>
+          </a:prstGeom>
+          <a:noFill/>
+          <a:ln w="12700" cap="flat">
+            <a:noFill/>
+            <a:miter lim="400000"/>
+          </a:ln>
+          <a:effectLst/>
+          <a:sp3d/>
+        </p:spPr>
+        <p:style>
+          <a:lnRef idx="0">
+            <a:scrgbClr r="0" g="0" b="0"/>
+          </a:lnRef>
+          <a:fillRef idx="0">
+            <a:scrgbClr r="0" g="0" b="0"/>
+          </a:fillRef>
+          <a:effectRef idx="0">
+            <a:scrgbClr r="0" g="0" b="0"/>
+          </a:effectRef>
+          <a:fontRef idx="none"/>
+        </p:style>
+        <p:txBody>
+          <a:bodyPr rot="0" spcFirstLastPara="1" vertOverflow="overflow" horzOverflow="overflow" vert="horz" wrap="square" lIns="47625" tIns="47625" rIns="47625" bIns="47625" numCol="1" spcCol="38100" rtlCol="0" anchor="ctr">
+            <a:spAutoFit/>
+          </a:bodyPr>
+          <a:lstStyle/>
+          <a:p>
+            <a:r>
+              <a:rPr lang="en-US" sz="2625" dirty="0">
+                <a:latin typeface="Calibri" panose="020F0502020204030204" pitchFamily="34" charset="0"/>
+                <a:cs typeface="Calibri" panose="020F0502020204030204" pitchFamily="34" charset="0"/>
+              </a:rPr>
+              <a:t>Jonathan Bell</a:t>
+            </a:r>
+          </a:p>
+        </p:txBody>
+      </p:sp>
+      <p:sp>
+        <p:nvSpPr>
+          <p:cNvPr id="15" name="TextBox 14">
+            <a:extLst>
+              <a:ext uri="{FF2B5EF4-FFF2-40B4-BE49-F238E27FC236}">
+                <a16:creationId xmlns:a16="http://schemas.microsoft.com/office/drawing/2014/main" id="{418EBC79-D586-4EF1-9F65-B76A9E709F75}"/>
+              </a:ext>
+            </a:extLst>
+          </p:cNvPr>
+          <p:cNvSpPr txBox="1"/>
+          <p:nvPr/>
+        </p:nvSpPr>
+        <p:spPr>
+          <a:xfrm>
+            <a:off x="4808186" y="5598674"/>
+            <a:ext cx="2180397" cy="500137"/>
+          </a:xfrm>
+          <a:prstGeom prst="rect">
+            <a:avLst/>
+          </a:prstGeom>
+          <a:noFill/>
+          <a:ln w="12700" cap="flat">
+            <a:noFill/>
+            <a:miter lim="400000"/>
+          </a:ln>
+          <a:effectLst/>
+          <a:sp3d/>
+        </p:spPr>
+        <p:style>
+          <a:lnRef idx="0">
+            <a:scrgbClr r="0" g="0" b="0"/>
+          </a:lnRef>
+          <a:fillRef idx="0">
+            <a:scrgbClr r="0" g="0" b="0"/>
+          </a:fillRef>
+          <a:effectRef idx="0">
+            <a:scrgbClr r="0" g="0" b="0"/>
+          </a:effectRef>
+          <a:fontRef idx="none"/>
+        </p:style>
+        <p:txBody>
+          <a:bodyPr rot="0" spcFirstLastPara="1" vertOverflow="overflow" horzOverflow="overflow" vert="horz" wrap="square" lIns="47625" tIns="47625" rIns="47625" bIns="47625" numCol="1" spcCol="38100" rtlCol="0" anchor="ctr">
+            <a:spAutoFit/>
+          </a:bodyPr>
+          <a:lstStyle/>
+          <a:p>
+            <a:r>
+              <a:rPr lang="en-US" sz="2625" dirty="0">
+                <a:latin typeface="Calibri" panose="020F0502020204030204" pitchFamily="34" charset="0"/>
+                <a:cs typeface="Calibri" panose="020F0502020204030204" pitchFamily="34" charset="0"/>
+              </a:rPr>
+              <a:t>John </a:t>
+            </a:r>
+            <a:r>
+              <a:rPr lang="en-US" sz="2625" dirty="0" err="1">
+                <a:latin typeface="Calibri" panose="020F0502020204030204" pitchFamily="34" charset="0"/>
+                <a:cs typeface="Calibri" panose="020F0502020204030204" pitchFamily="34" charset="0"/>
+              </a:rPr>
+              <a:t>Boyland</a:t>
+            </a:r>
+            <a:endParaRPr lang="en-US" sz="2625" dirty="0">
+              <a:latin typeface="Calibri" panose="020F0502020204030204" pitchFamily="34" charset="0"/>
+              <a:cs typeface="Calibri" panose="020F0502020204030204" pitchFamily="34" charset="0"/>
+            </a:endParaRPr>
+          </a:p>
+        </p:txBody>
+      </p:sp>
+      <p:pic>
+        <p:nvPicPr>
+          <p:cNvPr id="13" name="Picture 2">
+            <a:extLst>
+              <a:ext uri="{FF2B5EF4-FFF2-40B4-BE49-F238E27FC236}">
+                <a16:creationId xmlns:a16="http://schemas.microsoft.com/office/drawing/2014/main" id="{7AE6A8A0-9809-498E-A012-940833AD0FFE}"/>
+              </a:ext>
+            </a:extLst>
+          </p:cNvPr>
+          <p:cNvPicPr>
+            <a:picLocks noChangeAspect="1" noChangeArrowheads="1"/>
+          </p:cNvPicPr>
+          <p:nvPr/>
+        </p:nvPicPr>
+        <p:blipFill rotWithShape="1">
+          <a:blip r:embed="rId4">
+            <a:extLst>
+              <a:ext uri="{28A0092B-C50C-407E-A947-70E740481C1C}">
+                <a14:useLocalDpi xmlns:a14="http://schemas.microsoft.com/office/drawing/2010/main" val="0"/>
+              </a:ext>
+            </a:extLst>
+          </a:blip>
+          <a:srcRect l="18273" r="15060"/>
+          <a:stretch/>
+        </p:blipFill>
+        <p:spPr bwMode="auto">
+          <a:xfrm>
+            <a:off x="4322998" y="1961620"/>
+            <a:ext cx="2968549" cy="2968550"/>
+          </a:xfrm>
+          <a:prstGeom prst="rect">
+            <a:avLst/>
+          </a:prstGeom>
+          <a:noFill/>
+          <a:extLst>
+            <a:ext uri="{909E8E84-426E-40DD-AFC4-6F175D3DCCD1}">
+              <a14:hiddenFill xmlns:a14="http://schemas.microsoft.com/office/drawing/2010/main">
+                <a:solidFill>
+                  <a:srgbClr val="FFFFFF"/>
+                </a:solidFill>
+              </a14:hiddenFill>
+            </a:ext>
+          </a:extLst>
+        </p:spPr>
+      </p:pic>
+      <p:sp>
+        <p:nvSpPr>
+          <p:cNvPr id="2" name="Rectangle 1">
+            <a:extLst>
+              <a:ext uri="{FF2B5EF4-FFF2-40B4-BE49-F238E27FC236}">
+                <a16:creationId xmlns:a16="http://schemas.microsoft.com/office/drawing/2014/main" id="{36F06EAC-AD07-4E62-A4C9-0BCB2A62EF72}"/>
+              </a:ext>
+            </a:extLst>
+          </p:cNvPr>
+          <p:cNvSpPr/>
+          <p:nvPr/>
+        </p:nvSpPr>
+        <p:spPr>
+          <a:xfrm>
+            <a:off x="7624689" y="647114"/>
+            <a:ext cx="3086019" cy="1325563"/>
+          </a:xfrm>
+          <a:prstGeom prst="rect">
+            <a:avLst/>
+          </a:prstGeom>
+          <a:solidFill>
+            <a:srgbClr val="FFFF00"/>
+          </a:solidFill>
+        </p:spPr>
+        <p:style>
+          <a:lnRef idx="2">
+            <a:schemeClr val="accent1">
+              <a:shade val="50000"/>
+            </a:schemeClr>
+          </a:lnRef>
+          <a:fillRef idx="1">
+            <a:schemeClr val="accent1"/>
+          </a:fillRef>
+          <a:effectRef idx="0">
+            <a:schemeClr val="accent1"/>
+          </a:effectRef>
+          <a:fontRef idx="minor">
+            <a:schemeClr val="lt1"/>
+          </a:fontRef>
+        </p:style>
+        <p:txBody>
+          <a:bodyPr rtlCol="0" anchor="ctr"/>
+          <a:lstStyle/>
+          <a:p>
+            <a:pPr algn="ctr"/>
+            <a:r>
+              <a:rPr lang="en-US" sz="2400" dirty="0">
+                <a:solidFill>
+                  <a:sysClr val="windowText" lastClr="000000"/>
+                </a:solidFill>
+              </a:rPr>
+              <a:t>Need New Pix</a:t>
+            </a:r>
+          </a:p>
+        </p:txBody>
+      </p:sp>
+    </p:spTree>
+    <p:extLst>
+      <p:ext uri="{BB962C8B-B14F-4D97-AF65-F5344CB8AC3E}">
+        <p14:creationId xmlns:p14="http://schemas.microsoft.com/office/powerpoint/2010/main" val="3774186933"/>
+      </p:ext>
+    </p:extLst>
+  </p:cSld>
+  <p:clrMapOvr>
+    <a:masterClrMapping/>
+  </p:clrMapOvr>
+</p:sld>
+</file>
+
+<file path=ppt/slides/slide20.xml><?xml version="1.0" encoding="utf-8"?>
+<p:sld xmlns:a="http://schemas.openxmlformats.org/drawingml/2006/main" xmlns:r="http://schemas.openxmlformats.org/officeDocument/2006/relationships" xmlns:p="http://schemas.openxmlformats.org/presentationml/2006/main">
+  <p:cSld>
+    <p:spTree>
+      <p:nvGrpSpPr>
+        <p:cNvPr id="1" name=""/>
+        <p:cNvGrpSpPr/>
+        <p:nvPr/>
+      </p:nvGrpSpPr>
+      <p:grpSpPr>
+        <a:xfrm>
+          <a:off x="0" y="0"/>
+          <a:ext cx="0" cy="0"/>
+          <a:chOff x="0" y="0"/>
+          <a:chExt cx="0" cy="0"/>
+        </a:xfrm>
+      </p:grpSpPr>
+      <p:sp>
+        <p:nvSpPr>
           <p:cNvPr id="2" name="Title 1">
             <a:extLst>
               <a:ext uri="{FF2B5EF4-FFF2-40B4-BE49-F238E27FC236}">
@@ -9079,7 +6946,7 @@
               <a:pPr defTabSz="547695">
                 <a:defRPr/>
               </a:pPr>
-              <a:t>25</a:t>
+              <a:t>20</a:t>
             </a:fld>
             <a:endParaRPr lang="en-US"/>
           </a:p>
@@ -9266,7 +7133,7 @@
           </a:ln>
           <a:extLst>
             <a:ext uri="{C572A759-6A51-4108-AA02-DFA0A04FC94B}">
-              <ma14:wrappingTextBoxFlag xmlns="" xmlns:m="http://schemas.openxmlformats.org/officeDocument/2006/math" xmlns:a14="http://schemas.microsoft.com/office/drawing/2010/main" xmlns:ma14="http://schemas.microsoft.com/office/mac/drawingml/2011/main" val="1"/>
+              <ma14:wrappingTextBoxFlag xmlns:ma14="http://schemas.microsoft.com/office/mac/drawingml/2011/main" xmlns:a14="http://schemas.microsoft.com/office/drawing/2010/main" xmlns:m="http://schemas.openxmlformats.org/officeDocument/2006/math" xmlns="" val="1"/>
             </a:ext>
           </a:extLst>
         </p:spPr>
@@ -9303,7 +7170,7 @@
           </a:ln>
           <a:extLst>
             <a:ext uri="{C572A759-6A51-4108-AA02-DFA0A04FC94B}">
-              <ma14:wrappingTextBoxFlag xmlns="" xmlns:m="http://schemas.openxmlformats.org/officeDocument/2006/math" xmlns:a14="http://schemas.microsoft.com/office/drawing/2010/main" xmlns:ma14="http://schemas.microsoft.com/office/mac/drawingml/2011/main" val="1"/>
+              <ma14:wrappingTextBoxFlag xmlns:ma14="http://schemas.microsoft.com/office/mac/drawingml/2011/main" xmlns:a14="http://schemas.microsoft.com/office/drawing/2010/main" xmlns:m="http://schemas.openxmlformats.org/officeDocument/2006/math" xmlns="" val="1"/>
             </a:ext>
           </a:extLst>
         </p:spPr>
@@ -9344,7 +7211,7 @@
           </a:ln>
           <a:extLst>
             <a:ext uri="{C572A759-6A51-4108-AA02-DFA0A04FC94B}">
-              <ma14:wrappingTextBoxFlag xmlns="" xmlns:m="http://schemas.openxmlformats.org/officeDocument/2006/math" xmlns:a14="http://schemas.microsoft.com/office/drawing/2010/main" xmlns:ma14="http://schemas.microsoft.com/office/mac/drawingml/2011/main" val="1"/>
+              <ma14:wrappingTextBoxFlag xmlns:ma14="http://schemas.microsoft.com/office/mac/drawingml/2011/main" xmlns:a14="http://schemas.microsoft.com/office/drawing/2010/main" xmlns:m="http://schemas.openxmlformats.org/officeDocument/2006/math" xmlns="" val="1"/>
             </a:ext>
           </a:extLst>
         </p:spPr>
@@ -9385,7 +7252,7 @@
           </a:ln>
           <a:extLst>
             <a:ext uri="{C572A759-6A51-4108-AA02-DFA0A04FC94B}">
-              <ma14:wrappingTextBoxFlag xmlns="" xmlns:m="http://schemas.openxmlformats.org/officeDocument/2006/math" xmlns:a14="http://schemas.microsoft.com/office/drawing/2010/main" xmlns:ma14="http://schemas.microsoft.com/office/mac/drawingml/2011/main" val="1"/>
+              <ma14:wrappingTextBoxFlag xmlns:ma14="http://schemas.microsoft.com/office/mac/drawingml/2011/main" xmlns:a14="http://schemas.microsoft.com/office/drawing/2010/main" xmlns:m="http://schemas.openxmlformats.org/officeDocument/2006/math" xmlns="" val="1"/>
             </a:ext>
           </a:extLst>
         </p:spPr>
@@ -9421,7 +7288,7 @@
           </a:ln>
           <a:extLst>
             <a:ext uri="{C572A759-6A51-4108-AA02-DFA0A04FC94B}">
-              <ma14:wrappingTextBoxFlag xmlns="" xmlns:m="http://schemas.openxmlformats.org/officeDocument/2006/math" xmlns:a14="http://schemas.microsoft.com/office/drawing/2010/main" xmlns:ma14="http://schemas.microsoft.com/office/mac/drawingml/2011/main" val="1"/>
+              <ma14:wrappingTextBoxFlag xmlns:ma14="http://schemas.microsoft.com/office/mac/drawingml/2011/main" xmlns:a14="http://schemas.microsoft.com/office/drawing/2010/main" xmlns:m="http://schemas.openxmlformats.org/officeDocument/2006/math" xmlns="" val="1"/>
             </a:ext>
           </a:extLst>
         </p:spPr>
@@ -9656,7 +7523,7 @@
           </a:ln>
           <a:extLst>
             <a:ext uri="{C572A759-6A51-4108-AA02-DFA0A04FC94B}">
-              <ma14:wrappingTextBoxFlag xmlns="" xmlns:m="http://schemas.openxmlformats.org/officeDocument/2006/math" xmlns:a14="http://schemas.microsoft.com/office/drawing/2010/main" xmlns:ma14="http://schemas.microsoft.com/office/mac/drawingml/2011/main" val="1"/>
+              <ma14:wrappingTextBoxFlag xmlns:ma14="http://schemas.microsoft.com/office/mac/drawingml/2011/main" xmlns:a14="http://schemas.microsoft.com/office/drawing/2010/main" xmlns:m="http://schemas.openxmlformats.org/officeDocument/2006/math" xmlns="" val="1"/>
             </a:ext>
           </a:extLst>
         </p:spPr>
@@ -9703,7 +7570,7 @@
           </a:ln>
           <a:extLst>
             <a:ext uri="{C572A759-6A51-4108-AA02-DFA0A04FC94B}">
-              <ma14:wrappingTextBoxFlag xmlns="" xmlns:m="http://schemas.openxmlformats.org/officeDocument/2006/math" xmlns:a14="http://schemas.microsoft.com/office/drawing/2010/main" xmlns:ma14="http://schemas.microsoft.com/office/mac/drawingml/2011/main" val="1"/>
+              <ma14:wrappingTextBoxFlag xmlns:ma14="http://schemas.microsoft.com/office/mac/drawingml/2011/main" xmlns:a14="http://schemas.microsoft.com/office/drawing/2010/main" xmlns:m="http://schemas.openxmlformats.org/officeDocument/2006/math" xmlns="" val="1"/>
             </a:ext>
           </a:extLst>
         </p:spPr>
@@ -9817,7 +7684,7 @@
           </a:ln>
           <a:extLst>
             <a:ext uri="{C572A759-6A51-4108-AA02-DFA0A04FC94B}">
-              <ma14:wrappingTextBoxFlag xmlns="" xmlns:m="http://schemas.openxmlformats.org/officeDocument/2006/math" xmlns:a14="http://schemas.microsoft.com/office/drawing/2010/main" xmlns:ma14="http://schemas.microsoft.com/office/mac/drawingml/2011/main" val="1"/>
+              <ma14:wrappingTextBoxFlag xmlns:ma14="http://schemas.microsoft.com/office/mac/drawingml/2011/main" xmlns:a14="http://schemas.microsoft.com/office/drawing/2010/main" xmlns:m="http://schemas.openxmlformats.org/officeDocument/2006/math" xmlns="" val="1"/>
             </a:ext>
           </a:extLst>
         </p:spPr>
@@ -10472,11 +8339,7 @@
           <a:p>
             <a:pPr lvl="1"/>
             <a:r>
-              <a:rPr lang="en-US" dirty="0">
-                <a:highlight>
-                  <a:srgbClr val="FFFF00"/>
-                </a:highlight>
-              </a:rPr>
+              <a:rPr lang="en-US" dirty="0"/>
               <a:t>Be able to define and describe the phases of the software engineering lifecycle.</a:t>
             </a:r>
           </a:p>
@@ -10581,108 +8444,11 @@
                   <a:sysClr val="windowText" lastClr="000000"/>
                 </a:solidFill>
               </a:rPr>
-              <a:t>Update?</a:t>
-            </a:r>
-          </a:p>
-        </p:txBody>
-      </p:sp>
-      <p:sp>
-        <p:nvSpPr>
-          <p:cNvPr id="6" name="Rectangle 5">
-            <a:extLst>
-              <a:ext uri="{FF2B5EF4-FFF2-40B4-BE49-F238E27FC236}">
-                <a16:creationId xmlns:a16="http://schemas.microsoft.com/office/drawing/2014/main" id="{CB57E153-16D3-4F45-B9D0-3BCAE8AE2950}"/>
-              </a:ext>
-            </a:extLst>
-          </p:cNvPr>
-          <p:cNvSpPr/>
-          <p:nvPr/>
-        </p:nvSpPr>
-        <p:spPr>
-          <a:xfrm>
-            <a:off x="8862647" y="1638887"/>
-            <a:ext cx="2085787" cy="685964"/>
-          </a:xfrm>
-          <a:prstGeom prst="rect">
-            <a:avLst/>
-          </a:prstGeom>
-          <a:solidFill>
-            <a:srgbClr val="FFFF00"/>
-          </a:solidFill>
-        </p:spPr>
-        <p:style>
-          <a:lnRef idx="2">
-            <a:schemeClr val="accent1">
-              <a:shade val="50000"/>
-            </a:schemeClr>
-          </a:lnRef>
-          <a:fillRef idx="1">
-            <a:schemeClr val="accent1"/>
-          </a:fillRef>
-          <a:effectRef idx="0">
-            <a:schemeClr val="accent1"/>
-          </a:effectRef>
-          <a:fontRef idx="minor">
-            <a:schemeClr val="lt1"/>
-          </a:fontRef>
-        </p:style>
-        <p:txBody>
-          <a:bodyPr rtlCol="0" anchor="ctr"/>
-          <a:lstStyle/>
-          <a:p>
-            <a:pPr algn="ctr"/>
-            <a:r>
-              <a:rPr lang="en-US" sz="2400" dirty="0">
-                <a:solidFill>
-                  <a:sysClr val="windowText" lastClr="000000"/>
-                </a:solidFill>
-              </a:rPr>
-              <a:t>Delete?</a:t>
-            </a:r>
-          </a:p>
-        </p:txBody>
-      </p:sp>
-      <p:cxnSp>
-        <p:nvCxnSpPr>
-          <p:cNvPr id="3" name="Straight Arrow Connector 2">
-            <a:extLst>
-              <a:ext uri="{FF2B5EF4-FFF2-40B4-BE49-F238E27FC236}">
-                <a16:creationId xmlns:a16="http://schemas.microsoft.com/office/drawing/2014/main" id="{E38C93D8-A20B-4EF4-897E-28867B35CAA0}"/>
-              </a:ext>
-            </a:extLst>
-          </p:cNvPr>
-          <p:cNvCxnSpPr>
-            <a:stCxn id="6" idx="1"/>
-          </p:cNvCxnSpPr>
-          <p:nvPr/>
-        </p:nvCxnSpPr>
-        <p:spPr>
-          <a:xfrm flipH="1">
-            <a:off x="7730197" y="1981869"/>
-            <a:ext cx="1132450" cy="151251"/>
-          </a:xfrm>
-          <a:prstGeom prst="straightConnector1">
-            <a:avLst/>
-          </a:prstGeom>
-          <a:ln>
-            <a:tailEnd type="triangle"/>
-          </a:ln>
-        </p:spPr>
-        <p:style>
-          <a:lnRef idx="1">
-            <a:schemeClr val="accent1"/>
-          </a:lnRef>
-          <a:fillRef idx="0">
-            <a:schemeClr val="accent1"/>
-          </a:fillRef>
-          <a:effectRef idx="0">
-            <a:schemeClr val="accent1"/>
-          </a:effectRef>
-          <a:fontRef idx="minor">
-            <a:schemeClr val="tx1"/>
-          </a:fontRef>
-        </p:style>
-      </p:cxnSp>
+              <a:t>Update? Copy from web site.</a:t>
+            </a:r>
+          </a:p>
+        </p:txBody>
+      </p:sp>
     </p:spTree>
   </p:cSld>
   <p:clrMapOvr>
@@ -10975,62 +8741,6 @@
               <a:t>9</a:t>
             </a:fld>
             <a:endParaRPr lang="en-US"/>
-          </a:p>
-        </p:txBody>
-      </p:sp>
-      <p:sp>
-        <p:nvSpPr>
-          <p:cNvPr id="5" name="Rectangle 4">
-            <a:extLst>
-              <a:ext uri="{FF2B5EF4-FFF2-40B4-BE49-F238E27FC236}">
-                <a16:creationId xmlns:a16="http://schemas.microsoft.com/office/drawing/2014/main" id="{C7EBEDAE-33BF-4876-970D-C9615BAB7184}"/>
-              </a:ext>
-            </a:extLst>
-          </p:cNvPr>
-          <p:cNvSpPr/>
-          <p:nvPr/>
-        </p:nvSpPr>
-        <p:spPr>
-          <a:xfrm>
-            <a:off x="8841544" y="2103437"/>
-            <a:ext cx="3086019" cy="1325563"/>
-          </a:xfrm>
-          <a:prstGeom prst="rect">
-            <a:avLst/>
-          </a:prstGeom>
-          <a:solidFill>
-            <a:srgbClr val="FFFF00"/>
-          </a:solidFill>
-        </p:spPr>
-        <p:style>
-          <a:lnRef idx="2">
-            <a:schemeClr val="accent1">
-              <a:shade val="50000"/>
-            </a:schemeClr>
-          </a:lnRef>
-          <a:fillRef idx="1">
-            <a:schemeClr val="accent1"/>
-          </a:fillRef>
-          <a:effectRef idx="0">
-            <a:schemeClr val="accent1"/>
-          </a:effectRef>
-          <a:fontRef idx="minor">
-            <a:schemeClr val="lt1"/>
-          </a:fontRef>
-        </p:style>
-        <p:txBody>
-          <a:bodyPr rtlCol="0" anchor="ctr"/>
-          <a:lstStyle/>
-          <a:p>
-            <a:pPr algn="ctr"/>
-            <a:r>
-              <a:rPr lang="en-US" sz="2400" dirty="0">
-                <a:solidFill>
-                  <a:sysClr val="windowText" lastClr="000000"/>
-                </a:solidFill>
-              </a:rPr>
-              <a:t>Update?</a:t>
-            </a:r>
           </a:p>
         </p:txBody>
       </p:sp>

</xml_diff>

<commit_message>
hopefully final version of slides
</commit_message>
<xml_diff>
--- a/Slides/Lesson 1.1 Course Introduction.pptx
+++ b/Slides/Lesson 1.1 Course Introduction.pptx
@@ -3396,7 +3396,7 @@
           <a:p>
             <a:fld id="{7C7E5181-6CF5-45F7-A87A-E0E0B1FD7549}" type="datetimeFigureOut">
               <a:rPr lang="en-US" smtClean="0"/>
-              <a:t>1/8/2022</a:t>
+              <a:t>1/13/2022</a:t>
             </a:fld>
             <a:endParaRPr lang="en-US"/>
           </a:p>
@@ -3958,7 +3958,7 @@
           <a:p>
             <a:fld id="{5D2A64DE-480B-420F-9649-4F8E696E08E0}" type="datetime1">
               <a:rPr lang="en-US" smtClean="0"/>
-              <a:t>1/8/2022</a:t>
+              <a:t>1/13/2022</a:t>
             </a:fld>
             <a:endParaRPr lang="en-US"/>
           </a:p>
@@ -4192,7 +4192,7 @@
           <a:p>
             <a:fld id="{0D3616D0-8311-4107-9726-6B805E7D05BA}" type="datetime1">
               <a:rPr lang="en-US" smtClean="0"/>
-              <a:t>1/8/2022</a:t>
+              <a:t>1/13/2022</a:t>
             </a:fld>
             <a:endParaRPr lang="en-US"/>
           </a:p>
@@ -4400,7 +4400,7 @@
           <a:p>
             <a:fld id="{3BC2557A-5C88-417A-A763-5AC779462A5F}" type="datetime1">
               <a:rPr lang="en-US" smtClean="0"/>
-              <a:t>1/8/2022</a:t>
+              <a:t>1/13/2022</a:t>
             </a:fld>
             <a:endParaRPr lang="en-US"/>
           </a:p>
@@ -4924,7 +4924,7 @@
           <a:p>
             <a:fld id="{07C7BFD4-467E-4EDE-93EA-052F5B39A4E5}" type="datetime1">
               <a:rPr lang="en-US" smtClean="0"/>
-              <a:t>1/8/2022</a:t>
+              <a:t>1/13/2022</a:t>
             </a:fld>
             <a:endParaRPr lang="en-US"/>
           </a:p>
@@ -5237,7 +5237,7 @@
           <a:p>
             <a:fld id="{A533CBE2-D5BE-47AC-ADC2-9CDFC1D0CF90}" type="datetime1">
               <a:rPr lang="en-US" smtClean="0"/>
-              <a:t>1/8/2022</a:t>
+              <a:t>1/13/2022</a:t>
             </a:fld>
             <a:endParaRPr lang="en-US"/>
           </a:p>
@@ -5538,7 +5538,7 @@
           <a:p>
             <a:fld id="{39B7EDB1-CE74-4951-85A2-0B01C2128E28}" type="datetime1">
               <a:rPr lang="en-US" smtClean="0"/>
-              <a:t>1/8/2022</a:t>
+              <a:t>1/13/2022</a:t>
             </a:fld>
             <a:endParaRPr lang="en-US"/>
           </a:p>
@@ -5986,7 +5986,7 @@
           <a:p>
             <a:fld id="{2BC7EB92-A5C2-4807-A9DC-9EDE6CBFB241}" type="datetime1">
               <a:rPr lang="en-US" smtClean="0"/>
-              <a:t>1/8/2022</a:t>
+              <a:t>1/13/2022</a:t>
             </a:fld>
             <a:endParaRPr lang="en-US"/>
           </a:p>
@@ -6132,7 +6132,7 @@
           <a:p>
             <a:fld id="{109E55A0-C911-4F03-82FC-7E5926047D46}" type="datetime1">
               <a:rPr lang="en-US" smtClean="0"/>
-              <a:t>1/8/2022</a:t>
+              <a:t>1/13/2022</a:t>
             </a:fld>
             <a:endParaRPr lang="en-US"/>
           </a:p>
@@ -6281,7 +6281,7 @@
           <a:p>
             <a:fld id="{2B7B7EE0-7771-4CD5-9B2B-3550753A54A1}" type="datetime1">
               <a:rPr lang="en-US" smtClean="0"/>
-              <a:t>1/8/2022</a:t>
+              <a:t>1/13/2022</a:t>
             </a:fld>
             <a:endParaRPr lang="en-US"/>
           </a:p>
@@ -6592,7 +6592,7 @@
           <a:p>
             <a:fld id="{F8B318B3-0E87-4416-A9B8-D891968C2727}" type="datetime1">
               <a:rPr lang="en-US" smtClean="0"/>
-              <a:t>1/8/2022</a:t>
+              <a:t>1/13/2022</a:t>
             </a:fld>
             <a:endParaRPr lang="en-US"/>
           </a:p>
@@ -6880,7 +6880,7 @@
           <a:p>
             <a:fld id="{EA476A42-A091-4468-A075-64A31BE59948}" type="datetime1">
               <a:rPr lang="en-US" smtClean="0"/>
-              <a:t>1/8/2022</a:t>
+              <a:t>1/13/2022</a:t>
             </a:fld>
             <a:endParaRPr lang="en-US"/>
           </a:p>
@@ -7121,7 +7121,7 @@
           <a:p>
             <a:fld id="{54D997E8-DDEE-43F1-8D9B-F8A1E11DE488}" type="datetime1">
               <a:rPr lang="en-US" smtClean="0"/>
-              <a:t>1/8/2022</a:t>
+              <a:t>1/13/2022</a:t>
             </a:fld>
             <a:endParaRPr lang="en-US"/>
           </a:p>
@@ -9249,31 +9249,41 @@
           </a:p>
         </p:txBody>
       </p:sp>
-      <p:sp>
-        <p:nvSpPr>
-          <p:cNvPr id="12" name="Content Placeholder 11">
-            <a:extLst>
-              <a:ext uri="{FF2B5EF4-FFF2-40B4-BE49-F238E27FC236}">
-                <a16:creationId xmlns:a16="http://schemas.microsoft.com/office/drawing/2014/main" id="{3DB4E3D8-144E-46A9-87CA-BAA8820EA13A}"/>
-              </a:ext>
-            </a:extLst>
-          </p:cNvPr>
-          <p:cNvSpPr>
-            <a:spLocks noGrp="1"/>
-          </p:cNvSpPr>
+      <p:pic>
+        <p:nvPicPr>
+          <p:cNvPr id="5" name="Content Placeholder 4" descr="A person smiling for the camera&#10;&#10;Description automatically generated with medium confidence">
+            <a:extLst>
+              <a:ext uri="{FF2B5EF4-FFF2-40B4-BE49-F238E27FC236}">
+                <a16:creationId xmlns:a16="http://schemas.microsoft.com/office/drawing/2014/main" id="{6A155A6F-7642-4401-9E02-DEBB5958D390}"/>
+              </a:ext>
+            </a:extLst>
+          </p:cNvPr>
+          <p:cNvPicPr>
+            <a:picLocks noGrp="1" noChangeAspect="1"/>
+          </p:cNvPicPr>
           <p:nvPr>
             <p:ph idx="1"/>
           </p:nvPr>
-        </p:nvSpPr>
-        <p:spPr/>
-        <p:txBody>
-          <a:bodyPr/>
-          <a:lstStyle/>
-          <a:p>
-            <a:endParaRPr lang="en-US"/>
-          </a:p>
-        </p:txBody>
-      </p:sp>
+        </p:nvPicPr>
+        <p:blipFill>
+          <a:blip r:embed="rId2">
+            <a:extLst>
+              <a:ext uri="{28A0092B-C50C-407E-A947-70E740481C1C}">
+                <a14:useLocalDpi xmlns:a14="http://schemas.microsoft.com/office/drawing/2010/main" val="0"/>
+              </a:ext>
+            </a:extLst>
+          </a:blip>
+          <a:stretch>
+            <a:fillRect/>
+          </a:stretch>
+        </p:blipFill>
+        <p:spPr>
+          <a:xfrm>
+            <a:off x="235539" y="1694887"/>
+            <a:ext cx="2708548" cy="2708548"/>
+          </a:xfrm>
+        </p:spPr>
+      </p:pic>
       <p:sp>
         <p:nvSpPr>
           <p:cNvPr id="138" name="Slide Number"/>
@@ -9298,100 +9308,21 @@
           </a:p>
         </p:txBody>
       </p:sp>
-      <p:pic>
-        <p:nvPicPr>
-          <p:cNvPr id="9" name="IMG_5509.jpeg" descr="IMG_5509.jpeg">
-            <a:extLst>
-              <a:ext uri="{FF2B5EF4-FFF2-40B4-BE49-F238E27FC236}">
-                <a16:creationId xmlns:a16="http://schemas.microsoft.com/office/drawing/2014/main" id="{AD459D4D-1C7C-43C4-9D61-8EB4894662B2}"/>
-              </a:ext>
-            </a:extLst>
-          </p:cNvPr>
-          <p:cNvPicPr>
-            <a:picLocks noChangeAspect="1"/>
-          </p:cNvPicPr>
+      <p:sp>
+        <p:nvSpPr>
+          <p:cNvPr id="3" name="TextBox 2">
+            <a:extLst>
+              <a:ext uri="{FF2B5EF4-FFF2-40B4-BE49-F238E27FC236}">
+                <a16:creationId xmlns:a16="http://schemas.microsoft.com/office/drawing/2014/main" id="{81AF1A5E-CF2C-4F6C-AD06-8F79A5F94003}"/>
+              </a:ext>
+            </a:extLst>
+          </p:cNvPr>
+          <p:cNvSpPr txBox="1"/>
           <p:nvPr/>
-        </p:nvPicPr>
-        <p:blipFill rotWithShape="1">
-          <a:blip r:embed="rId2"/>
-          <a:srcRect r="23587"/>
-          <a:stretch/>
-        </p:blipFill>
+        </p:nvSpPr>
         <p:spPr>
           <a:xfrm>
-            <a:off x="7827065" y="1961620"/>
-            <a:ext cx="2883643" cy="2934762"/>
-          </a:xfrm>
-          <a:prstGeom prst="rect">
-            <a:avLst/>
-          </a:prstGeom>
-          <a:ln w="12700">
-            <a:miter lim="400000"/>
-          </a:ln>
-        </p:spPr>
-      </p:pic>
-      <p:pic>
-        <p:nvPicPr>
-          <p:cNvPr id="10" name="Picture 4" descr="[Mitch 2007-12]">
-            <a:extLst>
-              <a:ext uri="{FF2B5EF4-FFF2-40B4-BE49-F238E27FC236}">
-                <a16:creationId xmlns:a16="http://schemas.microsoft.com/office/drawing/2014/main" id="{1D9765B5-3C73-4797-A776-47F1903B9235}"/>
-              </a:ext>
-            </a:extLst>
-          </p:cNvPr>
-          <p:cNvPicPr>
-            <a:picLocks noChangeAspect="1" noChangeArrowheads="1"/>
-          </p:cNvPicPr>
-          <p:nvPr/>
-        </p:nvPicPr>
-        <p:blipFill>
-          <a:blip r:embed="rId3">
-            <a:extLst>
-              <a:ext uri="{28A0092B-C50C-407E-A947-70E740481C1C}">
-                <a14:useLocalDpi xmlns:a14="http://schemas.microsoft.com/office/drawing/2010/main" val="0"/>
-              </a:ext>
-            </a:extLst>
-          </a:blip>
-          <a:srcRect/>
-          <a:stretch>
-            <a:fillRect/>
-          </a:stretch>
-        </p:blipFill>
-        <p:spPr bwMode="auto">
-          <a:xfrm>
-            <a:off x="1257512" y="1961620"/>
-            <a:ext cx="2529968" cy="2934762"/>
-          </a:xfrm>
-          <a:prstGeom prst="rect">
-            <a:avLst/>
-          </a:prstGeom>
-          <a:noFill/>
-          <a:extLst>
-            <a:ext uri="{909E8E84-426E-40DD-AFC4-6F175D3DCCD1}">
-              <a14:hiddenFill xmlns:a14="http://schemas.microsoft.com/office/drawing/2010/main">
-                <a:solidFill>
-                  <a:srgbClr val="FFFFFF"/>
-                </a:solidFill>
-              </a14:hiddenFill>
-            </a:ext>
-          </a:extLst>
-        </p:spPr>
-      </p:pic>
-      <p:sp>
-        <p:nvSpPr>
-          <p:cNvPr id="3" name="TextBox 2">
-            <a:extLst>
-              <a:ext uri="{FF2B5EF4-FFF2-40B4-BE49-F238E27FC236}">
-                <a16:creationId xmlns:a16="http://schemas.microsoft.com/office/drawing/2014/main" id="{81AF1A5E-CF2C-4F6C-AD06-8F79A5F94003}"/>
-              </a:ext>
-            </a:extLst>
-          </p:cNvPr>
-          <p:cNvSpPr txBox="1"/>
-          <p:nvPr/>
-        </p:nvSpPr>
-        <p:spPr>
-          <a:xfrm>
-            <a:off x="1432297" y="5598674"/>
+            <a:off x="9247913" y="4848468"/>
             <a:ext cx="2180397" cy="500137"/>
           </a:xfrm>
           <a:prstGeom prst="rect">
@@ -9418,11 +9349,12 @@
           <a:fontRef idx="none"/>
         </p:style>
         <p:txBody>
-          <a:bodyPr rot="0" spcFirstLastPara="1" vertOverflow="overflow" horzOverflow="overflow" vert="horz" wrap="square" lIns="47625" tIns="47625" rIns="47625" bIns="47625" numCol="1" spcCol="38100" rtlCol="0" anchor="ctr">
+          <a:bodyPr rot="0" spcFirstLastPara="1" vertOverflow="overflow" horzOverflow="overflow" vert="horz" wrap="square" lIns="47625" tIns="47625" rIns="47625" bIns="47625" numCol="1" spcCol="38100" rtlCol="0" anchor="t">
             <a:spAutoFit/>
           </a:bodyPr>
           <a:lstStyle/>
           <a:p>
+            <a:pPr algn="ctr"/>
             <a:r>
               <a:rPr lang="en-US" sz="2625" dirty="0">
                 <a:latin typeface="Calibri" panose="020F0502020204030204" pitchFamily="34" charset="0"/>
@@ -9447,7 +9379,7 @@
         </p:nvSpPr>
         <p:spPr>
           <a:xfrm>
-            <a:off x="8178689" y="5598674"/>
+            <a:off x="499614" y="4848468"/>
             <a:ext cx="2180397" cy="500137"/>
           </a:xfrm>
           <a:prstGeom prst="rect">
@@ -9474,11 +9406,12 @@
           <a:fontRef idx="none"/>
         </p:style>
         <p:txBody>
-          <a:bodyPr rot="0" spcFirstLastPara="1" vertOverflow="overflow" horzOverflow="overflow" vert="horz" wrap="square" lIns="47625" tIns="47625" rIns="47625" bIns="47625" numCol="1" spcCol="38100" rtlCol="0" anchor="ctr">
+          <a:bodyPr rot="0" spcFirstLastPara="1" vertOverflow="overflow" horzOverflow="overflow" vert="horz" wrap="square" lIns="47625" tIns="47625" rIns="47625" bIns="47625" numCol="1" spcCol="38100" rtlCol="0" anchor="t">
             <a:spAutoFit/>
           </a:bodyPr>
           <a:lstStyle/>
           <a:p>
+            <a:pPr algn="ctr"/>
             <a:r>
               <a:rPr lang="en-US" sz="2625" dirty="0">
                 <a:latin typeface="Calibri" panose="020F0502020204030204" pitchFamily="34" charset="0"/>
@@ -9503,7 +9436,7 @@
         </p:nvSpPr>
         <p:spPr>
           <a:xfrm>
-            <a:off x="4808186" y="5598674"/>
+            <a:off x="3412239" y="4896558"/>
             <a:ext cx="2180397" cy="500137"/>
           </a:xfrm>
           <a:prstGeom prst="rect">
@@ -9530,24 +9463,25 @@
           <a:fontRef idx="none"/>
         </p:style>
         <p:txBody>
-          <a:bodyPr rot="0" spcFirstLastPara="1" vertOverflow="overflow" horzOverflow="overflow" vert="horz" wrap="square" lIns="47625" tIns="47625" rIns="47625" bIns="47625" numCol="1" spcCol="38100" rtlCol="0" anchor="ctr">
+          <a:bodyPr rot="0" spcFirstLastPara="1" vertOverflow="overflow" horzOverflow="overflow" vert="horz" wrap="square" lIns="47625" tIns="47625" rIns="47625" bIns="47625" numCol="1" spcCol="38100" rtlCol="0" anchor="t">
             <a:spAutoFit/>
           </a:bodyPr>
           <a:lstStyle/>
           <a:p>
+            <a:pPr algn="ctr"/>
             <a:r>
               <a:rPr lang="en-US" sz="2625" dirty="0">
                 <a:latin typeface="Calibri" panose="020F0502020204030204" pitchFamily="34" charset="0"/>
                 <a:cs typeface="Calibri" panose="020F0502020204030204" pitchFamily="34" charset="0"/>
               </a:rPr>
-              <a:t>John </a:t>
+              <a:t>Adeel </a:t>
             </a:r>
             <a:r>
               <a:rPr lang="en-US" sz="2625" dirty="0" err="1">
                 <a:latin typeface="Calibri" panose="020F0502020204030204" pitchFamily="34" charset="0"/>
                 <a:cs typeface="Calibri" panose="020F0502020204030204" pitchFamily="34" charset="0"/>
               </a:rPr>
-              <a:t>Boyland</a:t>
+              <a:t>Bhutta</a:t>
             </a:r>
             <a:endParaRPr lang="en-US" sz="2625" dirty="0">
               <a:latin typeface="Calibri" panose="020F0502020204030204" pitchFamily="34" charset="0"/>
@@ -9558,101 +9492,165 @@
       </p:sp>
       <p:pic>
         <p:nvPicPr>
-          <p:cNvPr id="13" name="Picture 2">
-            <a:extLst>
-              <a:ext uri="{FF2B5EF4-FFF2-40B4-BE49-F238E27FC236}">
-                <a16:creationId xmlns:a16="http://schemas.microsoft.com/office/drawing/2014/main" id="{7AE6A8A0-9809-498E-A012-940833AD0FFE}"/>
+          <p:cNvPr id="7" name="Picture 6" descr="A person wearing glasses&#10;&#10;Description automatically generated with medium confidence">
+            <a:extLst>
+              <a:ext uri="{FF2B5EF4-FFF2-40B4-BE49-F238E27FC236}">
+                <a16:creationId xmlns:a16="http://schemas.microsoft.com/office/drawing/2014/main" id="{DD1A8293-F77C-4F00-85AE-1615F25D0B7A}"/>
               </a:ext>
             </a:extLst>
           </p:cNvPr>
           <p:cNvPicPr>
-            <a:picLocks noChangeAspect="1" noChangeArrowheads="1"/>
+            <a:picLocks noChangeAspect="1"/>
           </p:cNvPicPr>
           <p:nvPr/>
         </p:nvPicPr>
-        <p:blipFill rotWithShape="1">
-          <a:blip r:embed="rId4">
+        <p:blipFill>
+          <a:blip r:embed="rId3">
             <a:extLst>
               <a:ext uri="{28A0092B-C50C-407E-A947-70E740481C1C}">
                 <a14:useLocalDpi xmlns:a14="http://schemas.microsoft.com/office/drawing/2010/main" val="0"/>
               </a:ext>
             </a:extLst>
           </a:blip>
-          <a:srcRect l="18273" r="15060"/>
-          <a:stretch/>
+          <a:stretch>
+            <a:fillRect/>
+          </a:stretch>
         </p:blipFill>
-        <p:spPr bwMode="auto">
+        <p:spPr>
           <a:xfrm>
-            <a:off x="4322998" y="1961620"/>
-            <a:ext cx="2968549" cy="2968550"/>
+            <a:off x="3148164" y="1694887"/>
+            <a:ext cx="2708548" cy="2708548"/>
+          </a:xfrm>
+          <a:prstGeom prst="rect">
+            <a:avLst/>
+          </a:prstGeom>
+        </p:spPr>
+      </p:pic>
+      <p:pic>
+        <p:nvPicPr>
+          <p:cNvPr id="11" name="Picture 10" descr="A person with a beard and glasses&#10;&#10;Description automatically generated with medium confidence">
+            <a:extLst>
+              <a:ext uri="{FF2B5EF4-FFF2-40B4-BE49-F238E27FC236}">
+                <a16:creationId xmlns:a16="http://schemas.microsoft.com/office/drawing/2014/main" id="{C9462614-82D8-4958-A5B4-5F16E0AB0163}"/>
+              </a:ext>
+            </a:extLst>
+          </p:cNvPr>
+          <p:cNvPicPr>
+            <a:picLocks noChangeAspect="1"/>
+          </p:cNvPicPr>
+          <p:nvPr/>
+        </p:nvPicPr>
+        <p:blipFill>
+          <a:blip r:embed="rId4">
+            <a:extLst>
+              <a:ext uri="{28A0092B-C50C-407E-A947-70E740481C1C}">
+                <a14:useLocalDpi xmlns:a14="http://schemas.microsoft.com/office/drawing/2010/main" val="0"/>
+              </a:ext>
+            </a:extLst>
+          </a:blip>
+          <a:stretch>
+            <a:fillRect/>
+          </a:stretch>
+        </p:blipFill>
+        <p:spPr>
+          <a:xfrm>
+            <a:off x="6060789" y="1694886"/>
+            <a:ext cx="2708547" cy="2708547"/>
+          </a:xfrm>
+          <a:prstGeom prst="rect">
+            <a:avLst/>
+          </a:prstGeom>
+        </p:spPr>
+      </p:pic>
+      <p:pic>
+        <p:nvPicPr>
+          <p:cNvPr id="17" name="Picture 16" descr="A picture containing person, sky, person, outdoor&#10;&#10;Description automatically generated">
+            <a:extLst>
+              <a:ext uri="{FF2B5EF4-FFF2-40B4-BE49-F238E27FC236}">
+                <a16:creationId xmlns:a16="http://schemas.microsoft.com/office/drawing/2014/main" id="{70D8630F-1DE6-435F-80AB-48F303CB91E8}"/>
+              </a:ext>
+            </a:extLst>
+          </p:cNvPr>
+          <p:cNvPicPr>
+            <a:picLocks noChangeAspect="1"/>
+          </p:cNvPicPr>
+          <p:nvPr/>
+        </p:nvPicPr>
+        <p:blipFill>
+          <a:blip r:embed="rId5">
+            <a:extLst>
+              <a:ext uri="{28A0092B-C50C-407E-A947-70E740481C1C}">
+                <a14:useLocalDpi xmlns:a14="http://schemas.microsoft.com/office/drawing/2010/main" val="0"/>
+              </a:ext>
+            </a:extLst>
+          </a:blip>
+          <a:stretch>
+            <a:fillRect/>
+          </a:stretch>
+        </p:blipFill>
+        <p:spPr>
+          <a:xfrm>
+            <a:off x="8973413" y="1694886"/>
+            <a:ext cx="2708548" cy="2708548"/>
+          </a:xfrm>
+          <a:prstGeom prst="rect">
+            <a:avLst/>
+          </a:prstGeom>
+        </p:spPr>
+      </p:pic>
+      <p:sp>
+        <p:nvSpPr>
+          <p:cNvPr id="20" name="TextBox 19">
+            <a:extLst>
+              <a:ext uri="{FF2B5EF4-FFF2-40B4-BE49-F238E27FC236}">
+                <a16:creationId xmlns:a16="http://schemas.microsoft.com/office/drawing/2014/main" id="{D16E5566-85D7-406C-B09F-8BA05E7E35AC}"/>
+              </a:ext>
+            </a:extLst>
+          </p:cNvPr>
+          <p:cNvSpPr txBox="1"/>
+          <p:nvPr/>
+        </p:nvSpPr>
+        <p:spPr>
+          <a:xfrm>
+            <a:off x="6330076" y="4896558"/>
+            <a:ext cx="2180397" cy="904094"/>
           </a:xfrm>
           <a:prstGeom prst="rect">
             <a:avLst/>
           </a:prstGeom>
           <a:noFill/>
-          <a:extLst>
-            <a:ext uri="{909E8E84-426E-40DD-AFC4-6F175D3DCCD1}">
-              <a14:hiddenFill xmlns:a14="http://schemas.microsoft.com/office/drawing/2010/main">
-                <a:solidFill>
-                  <a:srgbClr val="FFFFFF"/>
-                </a:solidFill>
-              </a14:hiddenFill>
-            </a:ext>
-          </a:extLst>
-        </p:spPr>
-      </p:pic>
-      <p:sp>
-        <p:nvSpPr>
-          <p:cNvPr id="2" name="Rectangle 1">
-            <a:extLst>
-              <a:ext uri="{FF2B5EF4-FFF2-40B4-BE49-F238E27FC236}">
-                <a16:creationId xmlns:a16="http://schemas.microsoft.com/office/drawing/2014/main" id="{36F06EAC-AD07-4E62-A4C9-0BCB2A62EF72}"/>
-              </a:ext>
-            </a:extLst>
-          </p:cNvPr>
-          <p:cNvSpPr/>
-          <p:nvPr/>
-        </p:nvSpPr>
-        <p:spPr>
-          <a:xfrm>
-            <a:off x="7624689" y="647114"/>
-            <a:ext cx="3086019" cy="1325563"/>
-          </a:xfrm>
-          <a:prstGeom prst="rect">
-            <a:avLst/>
-          </a:prstGeom>
-          <a:solidFill>
-            <a:srgbClr val="FFFF00"/>
-          </a:solidFill>
+          <a:ln w="12700" cap="flat">
+            <a:noFill/>
+            <a:miter lim="400000"/>
+          </a:ln>
+          <a:effectLst/>
+          <a:sp3d/>
         </p:spPr>
         <p:style>
-          <a:lnRef idx="2">
-            <a:schemeClr val="accent1">
-              <a:shade val="50000"/>
-            </a:schemeClr>
+          <a:lnRef idx="0">
+            <a:scrgbClr r="0" g="0" b="0"/>
           </a:lnRef>
-          <a:fillRef idx="1">
-            <a:schemeClr val="accent1"/>
+          <a:fillRef idx="0">
+            <a:scrgbClr r="0" g="0" b="0"/>
           </a:fillRef>
           <a:effectRef idx="0">
-            <a:schemeClr val="accent1"/>
+            <a:scrgbClr r="0" g="0" b="0"/>
           </a:effectRef>
-          <a:fontRef idx="minor">
-            <a:schemeClr val="lt1"/>
-          </a:fontRef>
+          <a:fontRef idx="none"/>
         </p:style>
         <p:txBody>
-          <a:bodyPr rtlCol="0" anchor="ctr"/>
+          <a:bodyPr rot="0" spcFirstLastPara="1" vertOverflow="overflow" horzOverflow="overflow" vert="horz" wrap="square" lIns="47625" tIns="47625" rIns="47625" bIns="47625" numCol="1" spcCol="38100" rtlCol="0" anchor="t">
+            <a:spAutoFit/>
+          </a:bodyPr>
           <a:lstStyle/>
           <a:p>
             <a:pPr algn="ctr"/>
             <a:r>
-              <a:rPr lang="en-US" sz="2400" dirty="0">
-                <a:solidFill>
-                  <a:sysClr val="windowText" lastClr="000000"/>
-                </a:solidFill>
+              <a:rPr lang="en-US" sz="2625" dirty="0">
+                <a:latin typeface="Calibri" panose="020F0502020204030204" pitchFamily="34" charset="0"/>
+                <a:cs typeface="Calibri" panose="020F0502020204030204" pitchFamily="34" charset="0"/>
               </a:rPr>
-              <a:t>Need New Pix</a:t>
+              <a:t>Ferdinand Vesely</a:t>
             </a:r>
           </a:p>
         </p:txBody>
@@ -10146,53 +10144,6 @@
           <a:chExt cx="0" cy="0"/>
         </a:xfrm>
       </p:grpSpPr>
-      <p:pic>
-        <p:nvPicPr>
-          <p:cNvPr id="1040" name="Picture 16">
-            <a:extLst>
-              <a:ext uri="{FF2B5EF4-FFF2-40B4-BE49-F238E27FC236}">
-                <a16:creationId xmlns:a16="http://schemas.microsoft.com/office/drawing/2014/main" id="{B0250046-FB39-44C1-9C66-9EA577E06061}"/>
-              </a:ext>
-            </a:extLst>
-          </p:cNvPr>
-          <p:cNvPicPr>
-            <a:picLocks noChangeAspect="1" noChangeArrowheads="1"/>
-          </p:cNvPicPr>
-          <p:nvPr/>
-        </p:nvPicPr>
-        <p:blipFill>
-          <a:blip r:embed="rId2">
-            <a:extLst>
-              <a:ext uri="{28A0092B-C50C-407E-A947-70E740481C1C}">
-                <a14:useLocalDpi xmlns:a14="http://schemas.microsoft.com/office/drawing/2010/main" val="0"/>
-              </a:ext>
-            </a:extLst>
-          </a:blip>
-          <a:srcRect/>
-          <a:stretch>
-            <a:fillRect/>
-          </a:stretch>
-        </p:blipFill>
-        <p:spPr bwMode="auto">
-          <a:xfrm>
-            <a:off x="3032997" y="1689116"/>
-            <a:ext cx="2009775" cy="2009775"/>
-          </a:xfrm>
-          <a:prstGeom prst="rect">
-            <a:avLst/>
-          </a:prstGeom>
-          <a:noFill/>
-          <a:extLst>
-            <a:ext uri="{909E8E84-426E-40DD-AFC4-6F175D3DCCD1}">
-              <a14:hiddenFill xmlns:a14="http://schemas.microsoft.com/office/drawing/2010/main">
-                <a:solidFill>
-                  <a:srgbClr val="FFFFFF"/>
-                </a:solidFill>
-              </a14:hiddenFill>
-            </a:ext>
-          </a:extLst>
-        </p:spPr>
-      </p:pic>
       <p:sp>
         <p:nvSpPr>
           <p:cNvPr id="164" name="Teaching Assistants"/>
@@ -10217,6 +10168,40 @@
       </p:sp>
       <p:sp>
         <p:nvSpPr>
+          <p:cNvPr id="3" name="Content Placeholder 2">
+            <a:extLst>
+              <a:ext uri="{FF2B5EF4-FFF2-40B4-BE49-F238E27FC236}">
+                <a16:creationId xmlns:a16="http://schemas.microsoft.com/office/drawing/2014/main" id="{68D2A7B5-1CE9-49AA-B560-1BB30E444EFA}"/>
+              </a:ext>
+            </a:extLst>
+          </p:cNvPr>
+          <p:cNvSpPr>
+            <a:spLocks noGrp="1"/>
+          </p:cNvSpPr>
+          <p:nvPr>
+            <p:ph idx="1"/>
+          </p:nvPr>
+        </p:nvSpPr>
+        <p:spPr/>
+        <p:txBody>
+          <a:bodyPr/>
+          <a:lstStyle/>
+          <a:p>
+            <a:r>
+              <a:rPr lang="en-US" dirty="0"/>
+              <a:t>We have around 370 students and 18 teaching assistants.</a:t>
+            </a:r>
+          </a:p>
+          <a:p>
+            <a:r>
+              <a:rPr lang="en-US" dirty="0"/>
+              <a:t>Their pictures will be on the website as soon as we collect them </a:t>
+            </a:r>
+          </a:p>
+        </p:txBody>
+      </p:sp>
+      <p:sp>
+        <p:nvSpPr>
           <p:cNvPr id="2" name="Slide Number Placeholder 1">
             <a:extLst>
               <a:ext uri="{FF2B5EF4-FFF2-40B4-BE49-F238E27FC236}">
@@ -10231,12 +10216,7 @@
             <p:ph type="sldNum" sz="quarter" idx="12"/>
           </p:nvPr>
         </p:nvSpPr>
-        <p:spPr>
-          <a:xfrm>
-            <a:off x="8385517" y="6356350"/>
-            <a:ext cx="2743200" cy="365125"/>
-          </a:xfrm>
-        </p:spPr>
+        <p:spPr/>
         <p:txBody>
           <a:bodyPr/>
           <a:lstStyle/>
@@ -10247,682 +10227,6 @@
               <a:t>3</a:t>
             </a:fld>
             <a:endParaRPr lang="en-US"/>
-          </a:p>
-        </p:txBody>
-      </p:sp>
-      <p:pic>
-        <p:nvPicPr>
-          <p:cNvPr id="171" name="Satyajit Gokhale.jpg" descr="Satyajit Gokhale.jpg"/>
-          <p:cNvPicPr>
-            <a:picLocks noChangeAspect="1"/>
-          </p:cNvPicPr>
-          <p:nvPr/>
-        </p:nvPicPr>
-        <p:blipFill>
-          <a:blip r:embed="rId3"/>
-          <a:srcRect/>
-          <a:stretch>
-            <a:fillRect/>
-          </a:stretch>
-        </p:blipFill>
-        <p:spPr>
-          <a:xfrm>
-            <a:off x="547104" y="4426827"/>
-            <a:ext cx="2036615" cy="2011183"/>
-          </a:xfrm>
-          <a:prstGeom prst="rect">
-            <a:avLst/>
-          </a:prstGeom>
-          <a:ln w="12700">
-            <a:miter lim="400000"/>
-          </a:ln>
-        </p:spPr>
-      </p:pic>
-      <p:sp>
-        <p:nvSpPr>
-          <p:cNvPr id="174" name="Alexi Turcotte"/>
-          <p:cNvSpPr txBox="1"/>
-          <p:nvPr/>
-        </p:nvSpPr>
-        <p:spPr>
-          <a:xfrm>
-            <a:off x="840277" y="3898296"/>
-            <a:ext cx="1287212" cy="328295"/>
-          </a:xfrm>
-          <a:prstGeom prst="rect">
-            <a:avLst/>
-          </a:prstGeom>
-          <a:ln w="12700">
-            <a:miter lim="400000"/>
-          </a:ln>
-          <a:extLst>
-            <a:ext uri="{C572A759-6A51-4108-AA02-DFA0A04FC94B}">
-              <ma14:wrappingTextBoxFlag xmlns="" xmlns:m="http://schemas.openxmlformats.org/officeDocument/2006/math" xmlns:a14="http://schemas.microsoft.com/office/drawing/2010/main" xmlns:ma14="http://schemas.microsoft.com/office/mac/drawingml/2011/main" val="1"/>
-            </a:ext>
-          </a:extLst>
-        </p:spPr>
-        <p:txBody>
-          <a:bodyPr wrap="none" lIns="25400" tIns="25400" rIns="25400" bIns="25400" anchor="ctr">
-            <a:spAutoFit/>
-          </a:bodyPr>
-          <a:lstStyle/>
-          <a:p>
-            <a:r>
-              <a:rPr lang="en-US" dirty="0"/>
-              <a:t>Joseph Burns</a:t>
-            </a:r>
-            <a:endParaRPr dirty="0"/>
-          </a:p>
-        </p:txBody>
-      </p:sp>
-      <p:sp>
-        <p:nvSpPr>
-          <p:cNvPr id="176" name="Magnus Frennberg"/>
-          <p:cNvSpPr txBox="1"/>
-          <p:nvPr/>
-        </p:nvSpPr>
-        <p:spPr>
-          <a:xfrm>
-            <a:off x="2891468" y="6500713"/>
-            <a:ext cx="1229247" cy="328295"/>
-          </a:xfrm>
-          <a:prstGeom prst="rect">
-            <a:avLst/>
-          </a:prstGeom>
-          <a:ln w="12700">
-            <a:miter lim="400000"/>
-          </a:ln>
-          <a:extLst>
-            <a:ext uri="{C572A759-6A51-4108-AA02-DFA0A04FC94B}">
-              <ma14:wrappingTextBoxFlag xmlns="" xmlns:m="http://schemas.openxmlformats.org/officeDocument/2006/math" xmlns:a14="http://schemas.microsoft.com/office/drawing/2010/main" xmlns:ma14="http://schemas.microsoft.com/office/mac/drawingml/2011/main" val="1"/>
-            </a:ext>
-          </a:extLst>
-        </p:spPr>
-        <p:txBody>
-          <a:bodyPr wrap="none" lIns="25400" tIns="25400" rIns="25400" bIns="25400" anchor="ctr">
-            <a:spAutoFit/>
-          </a:bodyPr>
-          <a:lstStyle/>
-          <a:p>
-            <a:r>
-              <a:rPr lang="en-US" dirty="0" err="1"/>
-              <a:t>Guneet</a:t>
-            </a:r>
-            <a:r>
-              <a:rPr lang="en-US" dirty="0"/>
-              <a:t> Kaur</a:t>
-            </a:r>
-            <a:endParaRPr dirty="0"/>
-          </a:p>
-        </p:txBody>
-      </p:sp>
-      <p:sp>
-        <p:nvSpPr>
-          <p:cNvPr id="177" name="Jake Feinbaum"/>
-          <p:cNvSpPr txBox="1"/>
-          <p:nvPr/>
-        </p:nvSpPr>
-        <p:spPr>
-          <a:xfrm>
-            <a:off x="8139375" y="3898295"/>
-            <a:ext cx="775212" cy="328295"/>
-          </a:xfrm>
-          <a:prstGeom prst="rect">
-            <a:avLst/>
-          </a:prstGeom>
-          <a:ln w="12700">
-            <a:miter lim="400000"/>
-          </a:ln>
-          <a:extLst>
-            <a:ext uri="{C572A759-6A51-4108-AA02-DFA0A04FC94B}">
-              <ma14:wrappingTextBoxFlag xmlns="" xmlns:m="http://schemas.openxmlformats.org/officeDocument/2006/math" xmlns:a14="http://schemas.microsoft.com/office/drawing/2010/main" xmlns:ma14="http://schemas.microsoft.com/office/mac/drawingml/2011/main" val="1"/>
-            </a:ext>
-          </a:extLst>
-        </p:spPr>
-        <p:txBody>
-          <a:bodyPr wrap="none" lIns="25400" tIns="25400" rIns="25400" bIns="25400" anchor="ctr">
-            <a:spAutoFit/>
-          </a:bodyPr>
-          <a:lstStyle/>
-          <a:p>
-            <a:r>
-              <a:rPr lang="en-US" dirty="0" err="1"/>
-              <a:t>Eiki</a:t>
-            </a:r>
-            <a:r>
-              <a:rPr lang="en-US" dirty="0"/>
-              <a:t> Kan</a:t>
-            </a:r>
-            <a:endParaRPr dirty="0"/>
-          </a:p>
-        </p:txBody>
-      </p:sp>
-      <p:sp>
-        <p:nvSpPr>
-          <p:cNvPr id="178" name="Satyajit Gokhale"/>
-          <p:cNvSpPr txBox="1"/>
-          <p:nvPr/>
-        </p:nvSpPr>
-        <p:spPr>
-          <a:xfrm>
-            <a:off x="719117" y="6500713"/>
-            <a:ext cx="1563761" cy="328295"/>
-          </a:xfrm>
-          <a:prstGeom prst="rect">
-            <a:avLst/>
-          </a:prstGeom>
-          <a:ln w="12700">
-            <a:miter lim="400000"/>
-          </a:ln>
-          <a:extLst>
-            <a:ext uri="{C572A759-6A51-4108-AA02-DFA0A04FC94B}">
-              <ma14:wrappingTextBoxFlag xmlns="" xmlns:m="http://schemas.openxmlformats.org/officeDocument/2006/math" xmlns:a14="http://schemas.microsoft.com/office/drawing/2010/main" xmlns:ma14="http://schemas.microsoft.com/office/mac/drawingml/2011/main" val="1"/>
-            </a:ext>
-          </a:extLst>
-        </p:spPr>
-        <p:txBody>
-          <a:bodyPr wrap="none" lIns="25400" tIns="25400" rIns="25400" bIns="25400" anchor="ctr">
-            <a:spAutoFit/>
-          </a:bodyPr>
-          <a:lstStyle/>
-          <a:p>
-            <a:r>
-              <a:rPr dirty="0"/>
-              <a:t>Satyajit Gokhale</a:t>
-            </a:r>
-          </a:p>
-        </p:txBody>
-      </p:sp>
-      <p:sp>
-        <p:nvSpPr>
-          <p:cNvPr id="179" name="Rajath Kashyap"/>
-          <p:cNvSpPr txBox="1"/>
-          <p:nvPr/>
-        </p:nvSpPr>
-        <p:spPr>
-          <a:xfrm>
-            <a:off x="3161619" y="3898296"/>
-            <a:ext cx="1794722" cy="328295"/>
-          </a:xfrm>
-          <a:prstGeom prst="rect">
-            <a:avLst/>
-          </a:prstGeom>
-          <a:ln w="12700">
-            <a:miter lim="400000"/>
-          </a:ln>
-          <a:extLst>
-            <a:ext uri="{C572A759-6A51-4108-AA02-DFA0A04FC94B}">
-              <ma14:wrappingTextBoxFlag xmlns="" xmlns:m="http://schemas.openxmlformats.org/officeDocument/2006/math" xmlns:a14="http://schemas.microsoft.com/office/drawing/2010/main" xmlns:ma14="http://schemas.microsoft.com/office/mac/drawingml/2011/main" val="1"/>
-            </a:ext>
-          </a:extLst>
-        </p:spPr>
-        <p:txBody>
-          <a:bodyPr wrap="square" lIns="25400" tIns="25400" rIns="25400" bIns="25400" anchor="ctr">
-            <a:spAutoFit/>
-          </a:bodyPr>
-          <a:lstStyle/>
-          <a:p>
-            <a:r>
-              <a:rPr lang="en-US" dirty="0"/>
-              <a:t>Michael </a:t>
-            </a:r>
-            <a:r>
-              <a:rPr lang="en-US" dirty="0" err="1"/>
-              <a:t>Davinroy</a:t>
-            </a:r>
-            <a:endParaRPr dirty="0"/>
-          </a:p>
-        </p:txBody>
-      </p:sp>
-      <p:pic>
-        <p:nvPicPr>
-          <p:cNvPr id="1030" name="Picture 6">
-            <a:extLst>
-              <a:ext uri="{FF2B5EF4-FFF2-40B4-BE49-F238E27FC236}">
-                <a16:creationId xmlns:a16="http://schemas.microsoft.com/office/drawing/2014/main" id="{F8425C0B-2B85-474F-ABCD-952B493ED49E}"/>
-              </a:ext>
-            </a:extLst>
-          </p:cNvPr>
-          <p:cNvPicPr>
-            <a:picLocks noChangeAspect="1" noChangeArrowheads="1"/>
-          </p:cNvPicPr>
-          <p:nvPr/>
-        </p:nvPicPr>
-        <p:blipFill>
-          <a:blip r:embed="rId4">
-            <a:extLst>
-              <a:ext uri="{28A0092B-C50C-407E-A947-70E740481C1C}">
-                <a14:useLocalDpi xmlns:a14="http://schemas.microsoft.com/office/drawing/2010/main" val="0"/>
-              </a:ext>
-            </a:extLst>
-          </a:blip>
-          <a:srcRect/>
-          <a:stretch>
-            <a:fillRect/>
-          </a:stretch>
-        </p:blipFill>
-        <p:spPr bwMode="auto">
-          <a:xfrm>
-            <a:off x="555854" y="1760242"/>
-            <a:ext cx="2000250" cy="2009775"/>
-          </a:xfrm>
-          <a:prstGeom prst="rect">
-            <a:avLst/>
-          </a:prstGeom>
-          <a:noFill/>
-          <a:extLst>
-            <a:ext uri="{909E8E84-426E-40DD-AFC4-6F175D3DCCD1}">
-              <a14:hiddenFill xmlns:a14="http://schemas.microsoft.com/office/drawing/2010/main">
-                <a:solidFill>
-                  <a:srgbClr val="FFFFFF"/>
-                </a:solidFill>
-              </a14:hiddenFill>
-            </a:ext>
-          </a:extLst>
-        </p:spPr>
-      </p:pic>
-      <p:pic>
-        <p:nvPicPr>
-          <p:cNvPr id="1042" name="Picture 18">
-            <a:extLst>
-              <a:ext uri="{FF2B5EF4-FFF2-40B4-BE49-F238E27FC236}">
-                <a16:creationId xmlns:a16="http://schemas.microsoft.com/office/drawing/2014/main" id="{3F50BF2F-9C2D-4AEA-97F0-CD7EFFC85879}"/>
-              </a:ext>
-            </a:extLst>
-          </p:cNvPr>
-          <p:cNvPicPr>
-            <a:picLocks noChangeAspect="1" noChangeArrowheads="1"/>
-          </p:cNvPicPr>
-          <p:nvPr/>
-        </p:nvPicPr>
-        <p:blipFill>
-          <a:blip r:embed="rId5">
-            <a:extLst>
-              <a:ext uri="{28A0092B-C50C-407E-A947-70E740481C1C}">
-                <a14:useLocalDpi xmlns:a14="http://schemas.microsoft.com/office/drawing/2010/main" val="0"/>
-              </a:ext>
-            </a:extLst>
-          </a:blip>
-          <a:srcRect/>
-          <a:stretch>
-            <a:fillRect/>
-          </a:stretch>
-        </p:blipFill>
-        <p:spPr bwMode="auto">
-          <a:xfrm>
-            <a:off x="5217759" y="1706648"/>
-            <a:ext cx="2063369" cy="2063369"/>
-          </a:xfrm>
-          <a:prstGeom prst="rect">
-            <a:avLst/>
-          </a:prstGeom>
-          <a:noFill/>
-          <a:extLst>
-            <a:ext uri="{909E8E84-426E-40DD-AFC4-6F175D3DCCD1}">
-              <a14:hiddenFill xmlns:a14="http://schemas.microsoft.com/office/drawing/2010/main">
-                <a:solidFill>
-                  <a:srgbClr val="FFFFFF"/>
-                </a:solidFill>
-              </a14:hiddenFill>
-            </a:ext>
-          </a:extLst>
-        </p:spPr>
-      </p:pic>
-      <p:pic>
-        <p:nvPicPr>
-          <p:cNvPr id="1044" name="Picture 20">
-            <a:extLst>
-              <a:ext uri="{FF2B5EF4-FFF2-40B4-BE49-F238E27FC236}">
-                <a16:creationId xmlns:a16="http://schemas.microsoft.com/office/drawing/2014/main" id="{57C1C489-93EA-4F5B-92C2-97068C573E45}"/>
-              </a:ext>
-            </a:extLst>
-          </p:cNvPr>
-          <p:cNvPicPr>
-            <a:picLocks noChangeAspect="1" noChangeArrowheads="1"/>
-          </p:cNvPicPr>
-          <p:nvPr/>
-        </p:nvPicPr>
-        <p:blipFill>
-          <a:blip r:embed="rId6">
-            <a:extLst>
-              <a:ext uri="{28A0092B-C50C-407E-A947-70E740481C1C}">
-                <a14:useLocalDpi xmlns:a14="http://schemas.microsoft.com/office/drawing/2010/main" val="0"/>
-              </a:ext>
-            </a:extLst>
-          </a:blip>
-          <a:srcRect/>
-          <a:stretch>
-            <a:fillRect/>
-          </a:stretch>
-        </p:blipFill>
-        <p:spPr bwMode="auto">
-          <a:xfrm>
-            <a:off x="7531811" y="1754613"/>
-            <a:ext cx="1990340" cy="1997064"/>
-          </a:xfrm>
-          <a:prstGeom prst="rect">
-            <a:avLst/>
-          </a:prstGeom>
-          <a:noFill/>
-          <a:extLst>
-            <a:ext uri="{909E8E84-426E-40DD-AFC4-6F175D3DCCD1}">
-              <a14:hiddenFill xmlns:a14="http://schemas.microsoft.com/office/drawing/2010/main">
-                <a:solidFill>
-                  <a:srgbClr val="FFFFFF"/>
-                </a:solidFill>
-              </a14:hiddenFill>
-            </a:ext>
-          </a:extLst>
-        </p:spPr>
-      </p:pic>
-      <p:pic>
-        <p:nvPicPr>
-          <p:cNvPr id="1046" name="Picture 22">
-            <a:extLst>
-              <a:ext uri="{FF2B5EF4-FFF2-40B4-BE49-F238E27FC236}">
-                <a16:creationId xmlns:a16="http://schemas.microsoft.com/office/drawing/2014/main" id="{9B5F7F39-5AA8-43AD-98B0-2C81171ED19B}"/>
-              </a:ext>
-            </a:extLst>
-          </p:cNvPr>
-          <p:cNvPicPr>
-            <a:picLocks noChangeAspect="1" noChangeArrowheads="1"/>
-          </p:cNvPicPr>
-          <p:nvPr/>
-        </p:nvPicPr>
-        <p:blipFill>
-          <a:blip r:embed="rId7">
-            <a:extLst>
-              <a:ext uri="{28A0092B-C50C-407E-A947-70E740481C1C}">
-                <a14:useLocalDpi xmlns:a14="http://schemas.microsoft.com/office/drawing/2010/main" val="0"/>
-              </a:ext>
-            </a:extLst>
-          </a:blip>
-          <a:srcRect/>
-          <a:stretch>
-            <a:fillRect/>
-          </a:stretch>
-        </p:blipFill>
-        <p:spPr bwMode="auto">
-          <a:xfrm>
-            <a:off x="2946566" y="4426827"/>
-            <a:ext cx="2009775" cy="2009775"/>
-          </a:xfrm>
-          <a:prstGeom prst="rect">
-            <a:avLst/>
-          </a:prstGeom>
-          <a:noFill/>
-          <a:extLst>
-            <a:ext uri="{909E8E84-426E-40DD-AFC4-6F175D3DCCD1}">
-              <a14:hiddenFill xmlns:a14="http://schemas.microsoft.com/office/drawing/2010/main">
-                <a:solidFill>
-                  <a:srgbClr val="FFFFFF"/>
-                </a:solidFill>
-              </a14:hiddenFill>
-            </a:ext>
-          </a:extLst>
-        </p:spPr>
-      </p:pic>
-      <p:sp>
-        <p:nvSpPr>
-          <p:cNvPr id="30" name="Weijie (Ben) Deng">
-            <a:extLst>
-              <a:ext uri="{FF2B5EF4-FFF2-40B4-BE49-F238E27FC236}">
-                <a16:creationId xmlns:a16="http://schemas.microsoft.com/office/drawing/2014/main" id="{EDFAFCE9-4ACD-420B-9E71-44A8B9C66CB0}"/>
-              </a:ext>
-            </a:extLst>
-          </p:cNvPr>
-          <p:cNvSpPr txBox="1"/>
-          <p:nvPr/>
-        </p:nvSpPr>
-        <p:spPr>
-          <a:xfrm>
-            <a:off x="5716123" y="3898295"/>
-            <a:ext cx="1066639" cy="328295"/>
-          </a:xfrm>
-          <a:prstGeom prst="rect">
-            <a:avLst/>
-          </a:prstGeom>
-          <a:ln w="12700">
-            <a:miter lim="400000"/>
-          </a:ln>
-          <a:extLst>
-            <a:ext uri="{C572A759-6A51-4108-AA02-DFA0A04FC94B}">
-              <ma14:wrappingTextBoxFlag xmlns="" xmlns:m="http://schemas.openxmlformats.org/officeDocument/2006/math" xmlns:a14="http://schemas.microsoft.com/office/drawing/2010/main" xmlns:ma14="http://schemas.microsoft.com/office/mac/drawingml/2011/main" val="1"/>
-            </a:ext>
-          </a:extLst>
-        </p:spPr>
-        <p:txBody>
-          <a:bodyPr wrap="none" lIns="25400" tIns="25400" rIns="25400" bIns="25400" anchor="ctr">
-            <a:spAutoFit/>
-          </a:bodyPr>
-          <a:lstStyle/>
-          <a:p>
-            <a:r>
-              <a:rPr lang="en-US" dirty="0" err="1"/>
-              <a:t>Yuting</a:t>
-            </a:r>
-            <a:r>
-              <a:rPr lang="en-US" dirty="0"/>
-              <a:t> Gan</a:t>
-            </a:r>
-            <a:endParaRPr dirty="0"/>
-          </a:p>
-        </p:txBody>
-      </p:sp>
-      <p:sp>
-        <p:nvSpPr>
-          <p:cNvPr id="31" name="Weijie (Ben) Deng">
-            <a:extLst>
-              <a:ext uri="{FF2B5EF4-FFF2-40B4-BE49-F238E27FC236}">
-                <a16:creationId xmlns:a16="http://schemas.microsoft.com/office/drawing/2014/main" id="{3581BE53-57AD-4437-99F9-B899981228FE}"/>
-              </a:ext>
-            </a:extLst>
-          </p:cNvPr>
-          <p:cNvSpPr txBox="1"/>
-          <p:nvPr/>
-        </p:nvSpPr>
-        <p:spPr>
-          <a:xfrm>
-            <a:off x="5562680" y="6500713"/>
-            <a:ext cx="1245149" cy="328295"/>
-          </a:xfrm>
-          <a:prstGeom prst="rect">
-            <a:avLst/>
-          </a:prstGeom>
-          <a:ln w="12700">
-            <a:miter lim="400000"/>
-          </a:ln>
-          <a:extLst>
-            <a:ext uri="{C572A759-6A51-4108-AA02-DFA0A04FC94B}">
-              <ma14:wrappingTextBoxFlag xmlns="" xmlns:m="http://schemas.openxmlformats.org/officeDocument/2006/math" xmlns:a14="http://schemas.microsoft.com/office/drawing/2010/main" xmlns:ma14="http://schemas.microsoft.com/office/mac/drawingml/2011/main" val="1"/>
-            </a:ext>
-          </a:extLst>
-        </p:spPr>
-        <p:txBody>
-          <a:bodyPr wrap="none" lIns="25400" tIns="25400" rIns="25400" bIns="25400" anchor="ctr">
-            <a:spAutoFit/>
-          </a:bodyPr>
-          <a:lstStyle/>
-          <a:p>
-            <a:r>
-              <a:rPr lang="en-US" dirty="0"/>
-              <a:t>Ben Schultze</a:t>
-            </a:r>
-            <a:endParaRPr dirty="0"/>
-          </a:p>
-        </p:txBody>
-      </p:sp>
-      <p:pic>
-        <p:nvPicPr>
-          <p:cNvPr id="5" name="Picture 4">
-            <a:extLst>
-              <a:ext uri="{FF2B5EF4-FFF2-40B4-BE49-F238E27FC236}">
-                <a16:creationId xmlns:a16="http://schemas.microsoft.com/office/drawing/2014/main" id="{3F19322F-C786-4D32-B4C9-6739D4C067E6}"/>
-              </a:ext>
-            </a:extLst>
-          </p:cNvPr>
-          <p:cNvPicPr>
-            <a:picLocks noChangeAspect="1"/>
-          </p:cNvPicPr>
-          <p:nvPr/>
-        </p:nvPicPr>
-        <p:blipFill rotWithShape="1">
-          <a:blip r:embed="rId8">
-            <a:extLst>
-              <a:ext uri="{28A0092B-C50C-407E-A947-70E740481C1C}">
-                <a14:useLocalDpi xmlns:a14="http://schemas.microsoft.com/office/drawing/2010/main" val="0"/>
-              </a:ext>
-            </a:extLst>
-          </a:blip>
-          <a:srcRect l="19025" t="8228" r="6690" b="32674"/>
-          <a:stretch/>
-        </p:blipFill>
-        <p:spPr>
-          <a:xfrm>
-            <a:off x="5356383" y="4426827"/>
-            <a:ext cx="1887552" cy="2002230"/>
-          </a:xfrm>
-          <a:prstGeom prst="rect">
-            <a:avLst/>
-          </a:prstGeom>
-        </p:spPr>
-      </p:pic>
-      <p:pic>
-        <p:nvPicPr>
-          <p:cNvPr id="4" name="Picture 3">
-            <a:extLst>
-              <a:ext uri="{FF2B5EF4-FFF2-40B4-BE49-F238E27FC236}">
-                <a16:creationId xmlns:a16="http://schemas.microsoft.com/office/drawing/2014/main" id="{C253E4C4-061A-40E3-8B8F-1FCEE5FEF1ED}"/>
-              </a:ext>
-            </a:extLst>
-          </p:cNvPr>
-          <p:cNvPicPr>
-            <a:picLocks noChangeAspect="1"/>
-          </p:cNvPicPr>
-          <p:nvPr/>
-        </p:nvPicPr>
-        <p:blipFill>
-          <a:blip r:embed="rId9">
-            <a:extLst>
-              <a:ext uri="{28A0092B-C50C-407E-A947-70E740481C1C}">
-                <a14:useLocalDpi xmlns:a14="http://schemas.microsoft.com/office/drawing/2010/main" val="0"/>
-              </a:ext>
-            </a:extLst>
-          </a:blip>
-          <a:stretch>
-            <a:fillRect/>
-          </a:stretch>
-        </p:blipFill>
-        <p:spPr>
-          <a:xfrm>
-            <a:off x="7606711" y="4426827"/>
-            <a:ext cx="2036615" cy="2036615"/>
-          </a:xfrm>
-          <a:prstGeom prst="rect">
-            <a:avLst/>
-          </a:prstGeom>
-        </p:spPr>
-      </p:pic>
-      <p:sp>
-        <p:nvSpPr>
-          <p:cNvPr id="20" name="Weijie (Ben) Deng">
-            <a:extLst>
-              <a:ext uri="{FF2B5EF4-FFF2-40B4-BE49-F238E27FC236}">
-                <a16:creationId xmlns:a16="http://schemas.microsoft.com/office/drawing/2014/main" id="{909DEB5E-6566-4619-A192-809F53977DC2}"/>
-              </a:ext>
-            </a:extLst>
-          </p:cNvPr>
-          <p:cNvSpPr txBox="1"/>
-          <p:nvPr/>
-        </p:nvSpPr>
-        <p:spPr>
-          <a:xfrm>
-            <a:off x="7811141" y="6524646"/>
-            <a:ext cx="1627753" cy="328295"/>
-          </a:xfrm>
-          <a:prstGeom prst="rect">
-            <a:avLst/>
-          </a:prstGeom>
-          <a:ln w="12700">
-            <a:miter lim="400000"/>
-          </a:ln>
-          <a:extLst>
-            <a:ext uri="{C572A759-6A51-4108-AA02-DFA0A04FC94B}">
-              <ma14:wrappingTextBoxFlag xmlns="" xmlns:m="http://schemas.openxmlformats.org/officeDocument/2006/math" xmlns:a14="http://schemas.microsoft.com/office/drawing/2010/main" xmlns:ma14="http://schemas.microsoft.com/office/mac/drawingml/2011/main" val="1"/>
-            </a:ext>
-          </a:extLst>
-        </p:spPr>
-        <p:txBody>
-          <a:bodyPr wrap="none" lIns="25400" tIns="25400" rIns="25400" bIns="25400" anchor="ctr">
-            <a:spAutoFit/>
-          </a:bodyPr>
-          <a:lstStyle/>
-          <a:p>
-            <a:r>
-              <a:rPr lang="en-US" dirty="0"/>
-              <a:t>Sagar Madhu </a:t>
-            </a:r>
-            <a:r>
-              <a:rPr lang="en-US" dirty="0" err="1"/>
-              <a:t>Ayi</a:t>
-            </a:r>
-            <a:endParaRPr dirty="0"/>
-          </a:p>
-        </p:txBody>
-      </p:sp>
-      <p:sp>
-        <p:nvSpPr>
-          <p:cNvPr id="21" name="Rectangle 20">
-            <a:extLst>
-              <a:ext uri="{FF2B5EF4-FFF2-40B4-BE49-F238E27FC236}">
-                <a16:creationId xmlns:a16="http://schemas.microsoft.com/office/drawing/2014/main" id="{9AF1D90E-714B-41CE-AD94-6BC295FB9A11}"/>
-              </a:ext>
-            </a:extLst>
-          </p:cNvPr>
-          <p:cNvSpPr/>
-          <p:nvPr/>
-        </p:nvSpPr>
-        <p:spPr>
-          <a:xfrm>
-            <a:off x="7624689" y="647114"/>
-            <a:ext cx="3086019" cy="1325563"/>
-          </a:xfrm>
-          <a:prstGeom prst="rect">
-            <a:avLst/>
-          </a:prstGeom>
-          <a:solidFill>
-            <a:srgbClr val="FFFF00"/>
-          </a:solidFill>
-        </p:spPr>
-        <p:style>
-          <a:lnRef idx="2">
-            <a:schemeClr val="accent1">
-              <a:shade val="50000"/>
-            </a:schemeClr>
-          </a:lnRef>
-          <a:fillRef idx="1">
-            <a:schemeClr val="accent1"/>
-          </a:fillRef>
-          <a:effectRef idx="0">
-            <a:schemeClr val="accent1"/>
-          </a:effectRef>
-          <a:fontRef idx="minor">
-            <a:schemeClr val="lt1"/>
-          </a:fontRef>
-        </p:style>
-        <p:txBody>
-          <a:bodyPr rtlCol="0" anchor="ctr"/>
-          <a:lstStyle/>
-          <a:p>
-            <a:pPr algn="ctr"/>
-            <a:r>
-              <a:rPr lang="en-US" sz="2400" dirty="0">
-                <a:solidFill>
-                  <a:sysClr val="windowText" lastClr="000000"/>
-                </a:solidFill>
-              </a:rPr>
-              <a:t>Need New Pix</a:t>
-            </a:r>
           </a:p>
         </p:txBody>
       </p:sp>
@@ -11748,6 +11052,7 @@
           <a:lstStyle/>
           <a:p>
             <a:r>
+              <a:rPr dirty="0"/>
               <a:t>Software Engineering is about People</a:t>
             </a:r>
           </a:p>
@@ -11772,7 +11077,7 @@
           </a:ln>
           <a:extLst>
             <a:ext uri="{C572A759-6A51-4108-AA02-DFA0A04FC94B}">
-              <ma14:wrappingTextBoxFlag xmlns:ma14="http://schemas.microsoft.com/office/mac/drawingml/2011/main" xmlns:a14="http://schemas.microsoft.com/office/drawing/2010/main" xmlns:m="http://schemas.openxmlformats.org/officeDocument/2006/math" xmlns="" val="1"/>
+              <ma14:wrappingTextBoxFlag xmlns="" xmlns:m="http://schemas.openxmlformats.org/officeDocument/2006/math" xmlns:a14="http://schemas.microsoft.com/office/drawing/2010/main" xmlns:ma14="http://schemas.microsoft.com/office/mac/drawingml/2011/main" val="1"/>
             </a:ext>
           </a:extLst>
         </p:spPr>
@@ -11798,8 +11103,18 @@
           </a:lstStyle>
           <a:p>
             <a:r>
-              <a:rPr sz="4250"/>
-              <a:t>“Any fool can write code that a computer can understand. Good programmers write code that humans can understand”</a:t>
+              <a:rPr sz="4250" dirty="0"/>
+              <a:t>“</a:t>
+            </a:r>
+            <a:r>
+              <a:rPr sz="4250" dirty="0">
+                <a:latin typeface="+mn-lt"/>
+              </a:rPr>
+              <a:t>Any fool can write code that a computer can understand. Good programmers write code that humans can understand</a:t>
+            </a:r>
+            <a:r>
+              <a:rPr sz="4250" dirty="0"/>
+              <a:t>”</a:t>
             </a:r>
           </a:p>
         </p:txBody>
@@ -11823,7 +11138,7 @@
           </a:ln>
           <a:extLst>
             <a:ext uri="{C572A759-6A51-4108-AA02-DFA0A04FC94B}">
-              <ma14:wrappingTextBoxFlag xmlns:ma14="http://schemas.microsoft.com/office/mac/drawingml/2011/main" xmlns:a14="http://schemas.microsoft.com/office/drawing/2010/main" xmlns:m="http://schemas.openxmlformats.org/officeDocument/2006/math" xmlns="" val="1"/>
+              <ma14:wrappingTextBoxFlag xmlns="" xmlns:m="http://schemas.openxmlformats.org/officeDocument/2006/math" xmlns:a14="http://schemas.microsoft.com/office/drawing/2010/main" xmlns:ma14="http://schemas.microsoft.com/office/mac/drawingml/2011/main" val="1"/>
             </a:ext>
           </a:extLst>
         </p:spPr>
@@ -11842,7 +11157,7 @@
           </a:lstStyle>
           <a:p>
             <a:r>
-              <a:rPr sz="1800"/>
+              <a:rPr sz="1800" dirty="0"/>
               <a:t> - Martin Fowler</a:t>
             </a:r>
           </a:p>

</xml_diff>

<commit_message>
Add PDFs for week 1 slides, fix typo in week 1 slides
</commit_message>
<xml_diff>
--- a/Slides/Lesson 1.1 Course Introduction.pptx
+++ b/Slides/Lesson 1.1 Course Introduction.pptx
@@ -1223,9 +1223,9 @@
     <dgm:cxn modelId="{F2E6AF0C-1049-48B3-8918-7422BA3887EC}" srcId="{B9D1EFEC-C9B1-49E3-A34F-C01EEAC2E010}" destId="{0DEAC1FA-AC59-4FD6-A5BF-0751D0D184FC}" srcOrd="4" destOrd="0" parTransId="{3148B4B3-6C29-486A-B205-9D5BD4777571}" sibTransId="{E279BF61-6153-4A4C-884F-295BA3A19BE4}"/>
     <dgm:cxn modelId="{72316F0E-A6F5-45C5-A12A-4C62444D5E9E}" srcId="{B9D1EFEC-C9B1-49E3-A34F-C01EEAC2E010}" destId="{7141A0D0-05D7-46A2-9949-67E73A99EB4B}" srcOrd="3" destOrd="0" parTransId="{A999F715-7DC2-42C6-A0EA-5B0711E4B65A}" sibTransId="{01AFDC11-EF4F-492A-8A5D-FDE8BFC3A851}"/>
     <dgm:cxn modelId="{67EB8441-7FCF-4362-A007-BCB5647B455A}" srcId="{B9D1EFEC-C9B1-49E3-A34F-C01EEAC2E010}" destId="{AA31B552-E30C-410D-BD09-43F3E1296C60}" srcOrd="1" destOrd="0" parTransId="{D845B631-06AF-4AE5-ABB1-C5505A9C30C4}" sibTransId="{EBA8B305-5009-45AF-945B-8B1FE02D2C6F}"/>
-    <dgm:cxn modelId="{CBCBFE63-BAE8-4284-AA98-E5FF44DB3E17}" srcId="{B9D1EFEC-C9B1-49E3-A34F-C01EEAC2E010}" destId="{0C785CBB-9C75-4338-8063-F73BDAA581A7}" srcOrd="5" destOrd="0" parTransId="{0FCE6097-E231-40C7-A63A-CB2CF4063462}" sibTransId="{2FDEEBE1-BB1A-4721-899B-FC48F8E7A061}"/>
     <dgm:cxn modelId="{8A28564B-ED08-4317-83FF-D14C75CCB9CB}" type="presOf" srcId="{0DEAC1FA-AC59-4FD6-A5BF-0751D0D184FC}" destId="{1C4C8406-A3BE-42D5-875A-30B07566F869}" srcOrd="0" destOrd="0" presId="urn:microsoft.com/office/officeart/2005/8/layout/cycle5"/>
     <dgm:cxn modelId="{6EA83151-639F-42FF-9A67-E61B614E7C0A}" type="presOf" srcId="{AA31B552-E30C-410D-BD09-43F3E1296C60}" destId="{0F2EC9BA-70B9-4BF0-8A47-A5EF5FA1ABC6}" srcOrd="0" destOrd="0" presId="urn:microsoft.com/office/officeart/2005/8/layout/cycle5"/>
+    <dgm:cxn modelId="{CBCBFE63-BAE8-4284-AA98-E5FF44DB3E17}" srcId="{B9D1EFEC-C9B1-49E3-A34F-C01EEAC2E010}" destId="{0C785CBB-9C75-4338-8063-F73BDAA581A7}" srcOrd="5" destOrd="0" parTransId="{0FCE6097-E231-40C7-A63A-CB2CF4063462}" sibTransId="{2FDEEBE1-BB1A-4721-899B-FC48F8E7A061}"/>
     <dgm:cxn modelId="{4D775594-B4F5-410E-AA87-64F153D0125D}" type="presOf" srcId="{96DC8077-0E63-4215-ACB2-B36495CF0598}" destId="{3D588F75-6200-47A3-AB67-C1E8F6733162}" srcOrd="0" destOrd="0" presId="urn:microsoft.com/office/officeart/2005/8/layout/cycle5"/>
     <dgm:cxn modelId="{7975C997-913A-479E-B536-9BA13615169A}" type="presOf" srcId="{B6390E51-8E84-4D2D-ACC1-D4655523E222}" destId="{443FE72E-CE70-4F1C-A498-9BD4C6C3DA2E}" srcOrd="0" destOrd="0" presId="urn:microsoft.com/office/officeart/2005/8/layout/cycle5"/>
     <dgm:cxn modelId="{FCDA8898-CADF-4371-B9E0-5525FB0F106E}" type="presOf" srcId="{01AFDC11-EF4F-492A-8A5D-FDE8BFC3A851}" destId="{81CE1FB1-3128-4009-9340-67945B9A719B}" srcOrd="0" destOrd="0" presId="urn:microsoft.com/office/officeart/2005/8/layout/cycle5"/>
@@ -3396,7 +3396,7 @@
           <a:p>
             <a:fld id="{7C7E5181-6CF5-45F7-A87A-E0E0B1FD7549}" type="datetimeFigureOut">
               <a:rPr lang="en-US" smtClean="0"/>
-              <a:t>1/13/2022</a:t>
+              <a:t>1/13/22</a:t>
             </a:fld>
             <a:endParaRPr lang="en-US"/>
           </a:p>
@@ -3958,7 +3958,7 @@
           <a:p>
             <a:fld id="{5D2A64DE-480B-420F-9649-4F8E696E08E0}" type="datetime1">
               <a:rPr lang="en-US" smtClean="0"/>
-              <a:t>1/13/2022</a:t>
+              <a:t>1/13/22</a:t>
             </a:fld>
             <a:endParaRPr lang="en-US"/>
           </a:p>
@@ -4192,7 +4192,7 @@
           <a:p>
             <a:fld id="{0D3616D0-8311-4107-9726-6B805E7D05BA}" type="datetime1">
               <a:rPr lang="en-US" smtClean="0"/>
-              <a:t>1/13/2022</a:t>
+              <a:t>1/13/22</a:t>
             </a:fld>
             <a:endParaRPr lang="en-US"/>
           </a:p>
@@ -4400,7 +4400,7 @@
           <a:p>
             <a:fld id="{3BC2557A-5C88-417A-A763-5AC779462A5F}" type="datetime1">
               <a:rPr lang="en-US" smtClean="0"/>
-              <a:t>1/13/2022</a:t>
+              <a:t>1/13/22</a:t>
             </a:fld>
             <a:endParaRPr lang="en-US"/>
           </a:p>
@@ -4924,7 +4924,7 @@
           <a:p>
             <a:fld id="{07C7BFD4-467E-4EDE-93EA-052F5B39A4E5}" type="datetime1">
               <a:rPr lang="en-US" smtClean="0"/>
-              <a:t>1/13/2022</a:t>
+              <a:t>1/13/22</a:t>
             </a:fld>
             <a:endParaRPr lang="en-US"/>
           </a:p>
@@ -5237,7 +5237,7 @@
           <a:p>
             <a:fld id="{A533CBE2-D5BE-47AC-ADC2-9CDFC1D0CF90}" type="datetime1">
               <a:rPr lang="en-US" smtClean="0"/>
-              <a:t>1/13/2022</a:t>
+              <a:t>1/13/22</a:t>
             </a:fld>
             <a:endParaRPr lang="en-US"/>
           </a:p>
@@ -5538,7 +5538,7 @@
           <a:p>
             <a:fld id="{39B7EDB1-CE74-4951-85A2-0B01C2128E28}" type="datetime1">
               <a:rPr lang="en-US" smtClean="0"/>
-              <a:t>1/13/2022</a:t>
+              <a:t>1/13/22</a:t>
             </a:fld>
             <a:endParaRPr lang="en-US"/>
           </a:p>
@@ -5986,7 +5986,7 @@
           <a:p>
             <a:fld id="{2BC7EB92-A5C2-4807-A9DC-9EDE6CBFB241}" type="datetime1">
               <a:rPr lang="en-US" smtClean="0"/>
-              <a:t>1/13/2022</a:t>
+              <a:t>1/13/22</a:t>
             </a:fld>
             <a:endParaRPr lang="en-US"/>
           </a:p>
@@ -6132,7 +6132,7 @@
           <a:p>
             <a:fld id="{109E55A0-C911-4F03-82FC-7E5926047D46}" type="datetime1">
               <a:rPr lang="en-US" smtClean="0"/>
-              <a:t>1/13/2022</a:t>
+              <a:t>1/13/22</a:t>
             </a:fld>
             <a:endParaRPr lang="en-US"/>
           </a:p>
@@ -6281,7 +6281,7 @@
           <a:p>
             <a:fld id="{2B7B7EE0-7771-4CD5-9B2B-3550753A54A1}" type="datetime1">
               <a:rPr lang="en-US" smtClean="0"/>
-              <a:t>1/13/2022</a:t>
+              <a:t>1/13/22</a:t>
             </a:fld>
             <a:endParaRPr lang="en-US"/>
           </a:p>
@@ -6592,7 +6592,7 @@
           <a:p>
             <a:fld id="{F8B318B3-0E87-4416-A9B8-D891968C2727}" type="datetime1">
               <a:rPr lang="en-US" smtClean="0"/>
-              <a:t>1/13/2022</a:t>
+              <a:t>1/13/22</a:t>
             </a:fld>
             <a:endParaRPr lang="en-US"/>
           </a:p>
@@ -6880,7 +6880,7 @@
           <a:p>
             <a:fld id="{EA476A42-A091-4468-A075-64A31BE59948}" type="datetime1">
               <a:rPr lang="en-US" smtClean="0"/>
-              <a:t>1/13/2022</a:t>
+              <a:t>1/13/22</a:t>
             </a:fld>
             <a:endParaRPr lang="en-US"/>
           </a:p>
@@ -7121,7 +7121,7 @@
           <a:p>
             <a:fld id="{54D997E8-DDEE-43F1-8D9B-F8A1E11DE488}" type="datetime1">
               <a:rPr lang="en-US" smtClean="0"/>
-              <a:t>1/13/2022</a:t>
+              <a:t>1/13/22</a:t>
             </a:fld>
             <a:endParaRPr lang="en-US"/>
           </a:p>
@@ -7628,7 +7628,7 @@
               <a:rPr lang="en-US" altLang="en-US" sz="3200" dirty="0">
                 <a:sym typeface="Helvetica Neue" charset="0"/>
               </a:rPr>
-              <a:t>CS 4350: Fundamentals of Software Engineering</a:t>
+              <a:t>CS 4530: Fundamentals of Software Engineering</a:t>
             </a:r>
             <a:br>
               <a:rPr lang="en-US" altLang="en-US" sz="3200" dirty="0">
@@ -11077,7 +11077,7 @@
           </a:ln>
           <a:extLst>
             <a:ext uri="{C572A759-6A51-4108-AA02-DFA0A04FC94B}">
-              <ma14:wrappingTextBoxFlag xmlns="" xmlns:m="http://schemas.openxmlformats.org/officeDocument/2006/math" xmlns:a14="http://schemas.microsoft.com/office/drawing/2010/main" xmlns:ma14="http://schemas.microsoft.com/office/mac/drawingml/2011/main" val="1"/>
+              <ma14:wrappingTextBoxFlag xmlns:ma14="http://schemas.microsoft.com/office/mac/drawingml/2011/main" xmlns:a14="http://schemas.microsoft.com/office/drawing/2010/main" xmlns:m="http://schemas.openxmlformats.org/officeDocument/2006/math" xmlns="" val="1"/>
             </a:ext>
           </a:extLst>
         </p:spPr>
@@ -11138,7 +11138,7 @@
           </a:ln>
           <a:extLst>
             <a:ext uri="{C572A759-6A51-4108-AA02-DFA0A04FC94B}">
-              <ma14:wrappingTextBoxFlag xmlns="" xmlns:m="http://schemas.openxmlformats.org/officeDocument/2006/math" xmlns:a14="http://schemas.microsoft.com/office/drawing/2010/main" xmlns:ma14="http://schemas.microsoft.com/office/mac/drawingml/2011/main" val="1"/>
+              <ma14:wrappingTextBoxFlag xmlns:ma14="http://schemas.microsoft.com/office/mac/drawingml/2011/main" xmlns:a14="http://schemas.microsoft.com/office/drawing/2010/main" xmlns:m="http://schemas.openxmlformats.org/officeDocument/2006/math" xmlns="" val="1"/>
             </a:ext>
           </a:extLst>
         </p:spPr>

</xml_diff>